<commit_message>
draft of all imaegs
</commit_message>
<xml_diff>
--- a/2nd_year_int.pptx
+++ b/2nd_year_int.pptx
@@ -17,7 +17,8 @@
     <p:sldId id="263" r:id="rId11"/>
     <p:sldId id="264" r:id="rId12"/>
     <p:sldId id="265" r:id="rId13"/>
-    <p:sldId id="266" r:id="rId14"/>
+    <p:sldId id="268" r:id="rId14"/>
+    <p:sldId id="266" r:id="rId15"/>
   </p:sldIdLst>
   <p:sldSz cx="9144000" cy="6858000" type="screen4x3"/>
   <p:notesSz cx="7559675" cy="10691813"/>
@@ -4838,7 +4839,7 @@
               <a:buChar char="•"/>
             </a:pPr>
             <a:r>
-              <a:rPr lang="en-GB" sz="2800">
+              <a:rPr lang="en-GB" sz="2800" dirty="0">
                 <a:solidFill>
                   <a:srgbClr val="000000"/>
                 </a:solidFill>
@@ -4846,7 +4847,7 @@
               </a:rPr>
               <a:t>Gantt chart</a:t>
             </a:r>
-            <a:endParaRPr/>
+            <a:endParaRPr dirty="0"/>
           </a:p>
           <a:p>
             <a:pPr>
@@ -4857,7 +4858,7 @@
               <a:buChar char="•"/>
             </a:pPr>
             <a:r>
-              <a:rPr lang="en-GB" sz="2800">
+              <a:rPr lang="en-GB" sz="2800" dirty="0">
                 <a:solidFill>
                   <a:srgbClr val="000000"/>
                 </a:solidFill>
@@ -4865,7 +4866,7 @@
               </a:rPr>
               <a:t>Thesis Outline</a:t>
             </a:r>
-            <a:endParaRPr/>
+            <a:endParaRPr dirty="0"/>
           </a:p>
           <a:p>
             <a:pPr>
@@ -4876,7 +4877,7 @@
               <a:buChar char="•"/>
             </a:pPr>
             <a:r>
-              <a:rPr lang="en-GB" sz="2800">
+              <a:rPr lang="en-GB" sz="2800" dirty="0">
                 <a:solidFill>
                   <a:srgbClr val="000000"/>
                 </a:solidFill>
@@ -4884,7 +4885,7 @@
               </a:rPr>
               <a:t>More work as alternatives</a:t>
             </a:r>
-            <a:endParaRPr/>
+            <a:endParaRPr dirty="0"/>
           </a:p>
           <a:p>
             <a:pPr>
@@ -4892,7 +4893,7 @@
                 <a:spcPct val="100000"/>
               </a:lnSpc>
             </a:pPr>
-            <a:endParaRPr/>
+            <a:endParaRPr dirty="0"/>
           </a:p>
         </p:txBody>
       </p:sp>
@@ -4948,6 +4949,4181 @@
           <a:chExt cx="0" cy="0"/>
         </a:xfrm>
       </p:grpSpPr>
+      <p:cxnSp>
+        <p:nvCxnSpPr>
+          <p:cNvPr id="712" name="OTLSHAPE_M_b753854f750345028007ecac670adac1_Connector1"/>
+          <p:cNvCxnSpPr/>
+          <p:nvPr>
+            <p:custDataLst>
+              <p:tags r:id="rId2"/>
+            </p:custDataLst>
+          </p:nvPr>
+        </p:nvCxnSpPr>
+        <p:spPr>
+          <a:xfrm>
+            <a:off x="2306189" y="1391720"/>
+            <a:ext cx="0" cy="266"/>
+          </a:xfrm>
+          <a:prstGeom prst="line">
+            <a:avLst/>
+          </a:prstGeom>
+          <a:ln w="9525" cap="flat" cmpd="sng" algn="ctr">
+            <a:solidFill>
+              <a:srgbClr val="EA161E">
+                <a:alpha val="49804"/>
+              </a:srgbClr>
+            </a:solidFill>
+            <a:prstDash val="solid"/>
+            <a:round/>
+            <a:headEnd type="none" w="med" len="med"/>
+            <a:tailEnd type="none" w="med" len="med"/>
+          </a:ln>
+        </p:spPr>
+        <p:style>
+          <a:lnRef idx="1">
+            <a:schemeClr val="accent1"/>
+          </a:lnRef>
+          <a:fillRef idx="0">
+            <a:schemeClr val="accent1"/>
+          </a:fillRef>
+          <a:effectRef idx="0">
+            <a:schemeClr val="accent1"/>
+          </a:effectRef>
+          <a:fontRef idx="minor">
+            <a:schemeClr val="tx1"/>
+          </a:fontRef>
+        </p:style>
+      </p:cxnSp>
+      <p:cxnSp>
+        <p:nvCxnSpPr>
+          <p:cNvPr id="710" name="OTLSHAPE_M_0f4dd9dde0924e93b955678ac77842ad_Connector4"/>
+          <p:cNvCxnSpPr/>
+          <p:nvPr>
+            <p:custDataLst>
+              <p:tags r:id="rId3"/>
+            </p:custDataLst>
+          </p:nvPr>
+        </p:nvCxnSpPr>
+        <p:spPr>
+          <a:xfrm>
+            <a:off x="1591174" y="2355354"/>
+            <a:ext cx="0" cy="12700"/>
+          </a:xfrm>
+          <a:prstGeom prst="line">
+            <a:avLst/>
+          </a:prstGeom>
+          <a:ln w="9525" cap="flat" cmpd="sng" algn="ctr">
+            <a:solidFill>
+              <a:srgbClr val="EA161E">
+                <a:alpha val="49804"/>
+              </a:srgbClr>
+            </a:solidFill>
+            <a:prstDash val="solid"/>
+            <a:round/>
+            <a:headEnd type="none" w="med" len="med"/>
+            <a:tailEnd type="none" w="med" len="med"/>
+          </a:ln>
+        </p:spPr>
+        <p:style>
+          <a:lnRef idx="1">
+            <a:schemeClr val="accent1"/>
+          </a:lnRef>
+          <a:fillRef idx="0">
+            <a:schemeClr val="accent1"/>
+          </a:fillRef>
+          <a:effectRef idx="0">
+            <a:schemeClr val="accent1"/>
+          </a:effectRef>
+          <a:fontRef idx="minor">
+            <a:schemeClr val="tx1"/>
+          </a:fontRef>
+        </p:style>
+      </p:cxnSp>
+      <p:cxnSp>
+        <p:nvCxnSpPr>
+          <p:cNvPr id="708" name="OTLSHAPE_M_0f4dd9dde0924e93b955678ac77842ad_Connector2"/>
+          <p:cNvCxnSpPr/>
+          <p:nvPr>
+            <p:custDataLst>
+              <p:tags r:id="rId4"/>
+            </p:custDataLst>
+          </p:nvPr>
+        </p:nvCxnSpPr>
+        <p:spPr>
+          <a:xfrm>
+            <a:off x="1591174" y="1562505"/>
+            <a:ext cx="0" cy="12700"/>
+          </a:xfrm>
+          <a:prstGeom prst="line">
+            <a:avLst/>
+          </a:prstGeom>
+          <a:ln w="9525" cap="flat" cmpd="sng" algn="ctr">
+            <a:solidFill>
+              <a:srgbClr val="EA161E">
+                <a:alpha val="49804"/>
+              </a:srgbClr>
+            </a:solidFill>
+            <a:prstDash val="solid"/>
+            <a:round/>
+            <a:headEnd type="none" w="med" len="med"/>
+            <a:tailEnd type="none" w="med" len="med"/>
+          </a:ln>
+        </p:spPr>
+        <p:style>
+          <a:lnRef idx="1">
+            <a:schemeClr val="accent1"/>
+          </a:lnRef>
+          <a:fillRef idx="0">
+            <a:schemeClr val="accent1"/>
+          </a:fillRef>
+          <a:effectRef idx="0">
+            <a:schemeClr val="accent1"/>
+          </a:effectRef>
+          <a:fontRef idx="minor">
+            <a:schemeClr val="tx1"/>
+          </a:fontRef>
+        </p:style>
+      </p:cxnSp>
+      <p:sp>
+        <p:nvSpPr>
+          <p:cNvPr id="690" name="OTLSHAPE_TB_00000000000000000000000000000000_LeftEndCaps" hidden="1"/>
+          <p:cNvSpPr txBox="1"/>
+          <p:nvPr>
+            <p:custDataLst>
+              <p:tags r:id="rId5"/>
+            </p:custDataLst>
+          </p:nvPr>
+        </p:nvSpPr>
+        <p:spPr>
+          <a:xfrm>
+            <a:off x="317500" y="3098969"/>
+            <a:ext cx="469900" cy="279061"/>
+          </a:xfrm>
+          <a:prstGeom prst="rect">
+            <a:avLst/>
+          </a:prstGeom>
+          <a:noFill/>
+        </p:spPr>
+        <p:txBody>
+          <a:bodyPr vert="horz" wrap="none" lIns="0" tIns="0" rIns="0" bIns="0" rtlCol="0" anchor="ctr" anchorCtr="0">
+            <a:spAutoFit/>
+          </a:bodyPr>
+          <a:lstStyle/>
+          <a:p>
+            <a:pPr algn="ctr"/>
+            <a:r>
+              <a:rPr lang="en-US" altLang="zh-CN" b="1" smtClean="0">
+                <a:solidFill>
+                  <a:schemeClr val="accent2"/>
+                </a:solidFill>
+                <a:latin typeface="Calibri"/>
+              </a:rPr>
+              <a:t>2015</a:t>
+            </a:r>
+            <a:endParaRPr lang="zh-CN" altLang="en-US" b="1">
+              <a:solidFill>
+                <a:schemeClr val="accent2"/>
+              </a:solidFill>
+              <a:latin typeface="Calibri"/>
+            </a:endParaRPr>
+          </a:p>
+        </p:txBody>
+      </p:sp>
+      <p:sp>
+        <p:nvSpPr>
+          <p:cNvPr id="691" name="OTLSHAPE_TB_00000000000000000000000000000000_RightEndCaps" hidden="1"/>
+          <p:cNvSpPr txBox="1"/>
+          <p:nvPr>
+            <p:custDataLst>
+              <p:tags r:id="rId6"/>
+            </p:custDataLst>
+          </p:nvPr>
+        </p:nvSpPr>
+        <p:spPr>
+          <a:xfrm>
+            <a:off x="8363034" y="3098969"/>
+            <a:ext cx="469900" cy="279061"/>
+          </a:xfrm>
+          <a:prstGeom prst="rect">
+            <a:avLst/>
+          </a:prstGeom>
+          <a:noFill/>
+        </p:spPr>
+        <p:txBody>
+          <a:bodyPr vert="horz" wrap="none" lIns="0" tIns="0" rIns="0" bIns="0" rtlCol="0" anchor="ctr" anchorCtr="0">
+            <a:spAutoFit/>
+          </a:bodyPr>
+          <a:lstStyle/>
+          <a:p>
+            <a:pPr algn="ctr"/>
+            <a:r>
+              <a:rPr lang="en-US" altLang="zh-CN" b="1" smtClean="0">
+                <a:solidFill>
+                  <a:schemeClr val="accent2"/>
+                </a:solidFill>
+                <a:latin typeface="Calibri"/>
+              </a:rPr>
+              <a:t>2016</a:t>
+            </a:r>
+            <a:endParaRPr lang="zh-CN" altLang="en-US" b="1">
+              <a:solidFill>
+                <a:schemeClr val="accent2"/>
+              </a:solidFill>
+              <a:latin typeface="Calibri"/>
+            </a:endParaRPr>
+          </a:p>
+        </p:txBody>
+      </p:sp>
+      <p:sp>
+        <p:nvSpPr>
+          <p:cNvPr id="721" name="OTLSHAPE_M_4bad46065aff44fdba3359342bdb43dd_Title"/>
+          <p:cNvSpPr txBox="1"/>
+          <p:nvPr>
+            <p:custDataLst>
+              <p:tags r:id="rId7"/>
+            </p:custDataLst>
+          </p:nvPr>
+        </p:nvSpPr>
+        <p:spPr>
+          <a:xfrm>
+            <a:off x="1187623" y="1795859"/>
+            <a:ext cx="2188185" cy="215444"/>
+          </a:xfrm>
+          <a:prstGeom prst="rect">
+            <a:avLst/>
+          </a:prstGeom>
+          <a:noFill/>
+        </p:spPr>
+        <p:txBody>
+          <a:bodyPr vert="horz" wrap="square" lIns="0" tIns="0" rIns="0" bIns="0" rtlCol="0" anchor="ctr" anchorCtr="0">
+            <a:spAutoFit/>
+          </a:bodyPr>
+          <a:lstStyle/>
+          <a:p>
+            <a:r>
+              <a:rPr lang="en-US" altLang="zh-CN" sz="1400" spc="-8" dirty="0" smtClean="0">
+                <a:solidFill>
+                  <a:schemeClr val="dk1"/>
+                </a:solidFill>
+              </a:rPr>
+              <a:t>Contrastive Divergence</a:t>
+            </a:r>
+            <a:endParaRPr lang="zh-CN" altLang="en-US" sz="1400" spc="-8" dirty="0">
+              <a:solidFill>
+                <a:schemeClr val="dk1"/>
+              </a:solidFill>
+            </a:endParaRPr>
+          </a:p>
+        </p:txBody>
+      </p:sp>
+      <p:sp>
+        <p:nvSpPr>
+          <p:cNvPr id="723" name="OTLSHAPE_M_4bad46065aff44fdba3359342bdb43dd_Shape"/>
+          <p:cNvSpPr/>
+          <p:nvPr>
+            <p:custDataLst>
+              <p:tags r:id="rId8"/>
+            </p:custDataLst>
+          </p:nvPr>
+        </p:nvSpPr>
+        <p:spPr>
+          <a:xfrm rot="16200000">
+            <a:off x="971600" y="1818321"/>
+            <a:ext cx="165100" cy="165100"/>
+          </a:xfrm>
+          <a:prstGeom prst="flowChartMerge">
+            <a:avLst/>
+          </a:prstGeom>
+          <a:solidFill>
+            <a:srgbClr val="EA161E"/>
+          </a:solidFill>
+          <a:ln w="25400" cap="flat" cmpd="sng" algn="ctr">
+            <a:noFill/>
+            <a:prstDash val="solid"/>
+          </a:ln>
+          <a:effectLst/>
+          <a:scene3d>
+            <a:camera prst="orthographicFront"/>
+            <a:lightRig rig="threePt" dir="t"/>
+          </a:scene3d>
+          <a:sp3d>
+            <a:bevelT h="12700"/>
+          </a:sp3d>
+          <a:extLst>
+            <a:ext uri="{91240B29-F687-4F45-9708-019B960494DF}">
+              <a14:hiddenLine xmlns:a14="http://schemas.microsoft.com/office/drawing/2010/main" w="25400" cap="flat" cmpd="sng" algn="ctr">
+                <a:solidFill>
+                  <a:schemeClr val="accent1">
+                    <a:shade val="50000"/>
+                  </a:schemeClr>
+                </a:solidFill>
+                <a:prstDash val="solid"/>
+              </a14:hiddenLine>
+            </a:ext>
+            <a:ext uri="{AF507438-7753-43E0-B8FC-AC1667EBCBE1}">
+              <a14:hiddenEffects xmlns:a14="http://schemas.microsoft.com/office/drawing/2010/main">
+                <a:effectLst>
+                  <a:outerShdw>
+                    <a:scrgbClr r="0" g="0" b="0">
+                      <a:alpha val="50000"/>
+                    </a:scrgbClr>
+                  </a:outerShdw>
+                </a:effectLst>
+              </a14:hiddenEffects>
+            </a:ext>
+            <a:ext uri="{53640926-AAD7-44D8-BBD7-CCE9431645EC}">
+              <a14:shadowObscured xmlns:a14="http://schemas.microsoft.com/office/drawing/2010/main" val="1"/>
+            </a:ext>
+          </a:extLst>
+        </p:spPr>
+        <p:style>
+          <a:lnRef idx="2">
+            <a:schemeClr val="accent1">
+              <a:shade val="50000"/>
+            </a:schemeClr>
+          </a:lnRef>
+          <a:fillRef idx="1">
+            <a:schemeClr val="accent1"/>
+          </a:fillRef>
+          <a:effectRef idx="0">
+            <a:schemeClr val="accent1"/>
+          </a:effectRef>
+          <a:fontRef idx="minor">
+            <a:schemeClr val="lt1"/>
+          </a:fontRef>
+        </p:style>
+        <p:txBody>
+          <a:bodyPr rtlCol="0" anchor="ctr"/>
+          <a:lstStyle/>
+          <a:p>
+            <a:pPr algn="ctr"/>
+            <a:endParaRPr lang="zh-CN" altLang="en-US" sz="1400"/>
+          </a:p>
+        </p:txBody>
+      </p:sp>
+      <p:sp>
+        <p:nvSpPr>
+          <p:cNvPr id="724" name="OTLSHAPE_M_bc028b01b9a143e9ad12947fa3a1de22_Title"/>
+          <p:cNvSpPr txBox="1"/>
+          <p:nvPr>
+            <p:custDataLst>
+              <p:tags r:id="rId9"/>
+            </p:custDataLst>
+          </p:nvPr>
+        </p:nvSpPr>
+        <p:spPr>
+          <a:xfrm>
+            <a:off x="1527417" y="1989420"/>
+            <a:ext cx="2313677" cy="215444"/>
+          </a:xfrm>
+          <a:prstGeom prst="rect">
+            <a:avLst/>
+          </a:prstGeom>
+          <a:noFill/>
+        </p:spPr>
+        <p:txBody>
+          <a:bodyPr vert="horz" wrap="square" lIns="0" tIns="0" rIns="0" bIns="0" rtlCol="0" anchor="ctr" anchorCtr="0">
+            <a:spAutoFit/>
+          </a:bodyPr>
+          <a:lstStyle/>
+          <a:p>
+            <a:r>
+              <a:rPr lang="en-US" altLang="zh-CN" sz="1400" spc="-10" dirty="0" smtClean="0">
+                <a:solidFill>
+                  <a:schemeClr val="dk1"/>
+                </a:solidFill>
+              </a:rPr>
+              <a:t>RBM Validation</a:t>
+            </a:r>
+            <a:endParaRPr lang="zh-CN" altLang="en-US" sz="1400" spc="-10" dirty="0">
+              <a:solidFill>
+                <a:schemeClr val="dk1"/>
+              </a:solidFill>
+            </a:endParaRPr>
+          </a:p>
+        </p:txBody>
+      </p:sp>
+      <p:sp>
+        <p:nvSpPr>
+          <p:cNvPr id="726" name="OTLSHAPE_M_bc028b01b9a143e9ad12947fa3a1de22_Shape"/>
+          <p:cNvSpPr/>
+          <p:nvPr>
+            <p:custDataLst>
+              <p:tags r:id="rId10"/>
+            </p:custDataLst>
+          </p:nvPr>
+        </p:nvSpPr>
+        <p:spPr>
+          <a:xfrm rot="16200000">
+            <a:off x="1330568" y="2008775"/>
+            <a:ext cx="165100" cy="165100"/>
+          </a:xfrm>
+          <a:prstGeom prst="flowChartMerge">
+            <a:avLst/>
+          </a:prstGeom>
+          <a:solidFill>
+            <a:srgbClr val="EA161E"/>
+          </a:solidFill>
+          <a:ln w="25400" cap="flat" cmpd="sng" algn="ctr">
+            <a:noFill/>
+            <a:prstDash val="solid"/>
+          </a:ln>
+          <a:effectLst/>
+          <a:scene3d>
+            <a:camera prst="orthographicFront"/>
+            <a:lightRig rig="threePt" dir="t"/>
+          </a:scene3d>
+          <a:sp3d>
+            <a:bevelT h="12700"/>
+          </a:sp3d>
+          <a:extLst>
+            <a:ext uri="{91240B29-F687-4F45-9708-019B960494DF}">
+              <a14:hiddenLine xmlns:a14="http://schemas.microsoft.com/office/drawing/2010/main" w="25400" cap="flat" cmpd="sng" algn="ctr">
+                <a:solidFill>
+                  <a:schemeClr val="accent1">
+                    <a:shade val="50000"/>
+                  </a:schemeClr>
+                </a:solidFill>
+                <a:prstDash val="solid"/>
+              </a14:hiddenLine>
+            </a:ext>
+            <a:ext uri="{AF507438-7753-43E0-B8FC-AC1667EBCBE1}">
+              <a14:hiddenEffects xmlns:a14="http://schemas.microsoft.com/office/drawing/2010/main">
+                <a:effectLst>
+                  <a:outerShdw>
+                    <a:scrgbClr r="0" g="0" b="0">
+                      <a:alpha val="50000"/>
+                    </a:scrgbClr>
+                  </a:outerShdw>
+                </a:effectLst>
+              </a14:hiddenEffects>
+            </a:ext>
+            <a:ext uri="{53640926-AAD7-44D8-BBD7-CCE9431645EC}">
+              <a14:shadowObscured xmlns:a14="http://schemas.microsoft.com/office/drawing/2010/main" val="1"/>
+            </a:ext>
+          </a:extLst>
+        </p:spPr>
+        <p:style>
+          <a:lnRef idx="2">
+            <a:schemeClr val="accent1">
+              <a:shade val="50000"/>
+            </a:schemeClr>
+          </a:lnRef>
+          <a:fillRef idx="1">
+            <a:schemeClr val="accent1"/>
+          </a:fillRef>
+          <a:effectRef idx="0">
+            <a:schemeClr val="accent1"/>
+          </a:effectRef>
+          <a:fontRef idx="minor">
+            <a:schemeClr val="lt1"/>
+          </a:fontRef>
+        </p:style>
+        <p:txBody>
+          <a:bodyPr rtlCol="0" anchor="ctr"/>
+          <a:lstStyle/>
+          <a:p>
+            <a:pPr algn="ctr"/>
+            <a:endParaRPr lang="zh-CN" altLang="en-US" sz="1400"/>
+          </a:p>
+        </p:txBody>
+      </p:sp>
+      <p:sp>
+        <p:nvSpPr>
+          <p:cNvPr id="727" name="OTLSHAPE_M_0f4dd9dde0924e93b955678ac77842ad_Title"/>
+          <p:cNvSpPr txBox="1"/>
+          <p:nvPr>
+            <p:custDataLst>
+              <p:tags r:id="rId11"/>
+            </p:custDataLst>
+          </p:nvPr>
+        </p:nvSpPr>
+        <p:spPr>
+          <a:xfrm>
+            <a:off x="1835695" y="2182402"/>
+            <a:ext cx="2742569" cy="215444"/>
+          </a:xfrm>
+          <a:prstGeom prst="rect">
+            <a:avLst/>
+          </a:prstGeom>
+          <a:noFill/>
+        </p:spPr>
+        <p:txBody>
+          <a:bodyPr vert="horz" wrap="square" lIns="0" tIns="0" rIns="0" bIns="0" rtlCol="0" anchor="ctr" anchorCtr="0">
+            <a:spAutoFit/>
+          </a:bodyPr>
+          <a:lstStyle/>
+          <a:p>
+            <a:r>
+              <a:rPr lang="en-US" altLang="zh-CN" sz="1400" spc="-4" dirty="0" err="1" smtClean="0">
+                <a:solidFill>
+                  <a:schemeClr val="dk1"/>
+                </a:solidFill>
+              </a:rPr>
+              <a:t>Maths</a:t>
+            </a:r>
+            <a:r>
+              <a:rPr lang="en-US" altLang="zh-CN" sz="1400" spc="-4" dirty="0" smtClean="0">
+                <a:solidFill>
+                  <a:schemeClr val="dk1"/>
+                </a:solidFill>
+              </a:rPr>
+              <a:t> of DBN</a:t>
+            </a:r>
+            <a:endParaRPr lang="zh-CN" altLang="en-US" sz="1400" spc="-4" dirty="0">
+              <a:solidFill>
+                <a:schemeClr val="dk1"/>
+              </a:solidFill>
+            </a:endParaRPr>
+          </a:p>
+        </p:txBody>
+      </p:sp>
+      <p:sp>
+        <p:nvSpPr>
+          <p:cNvPr id="729" name="OTLSHAPE_M_0f4dd9dde0924e93b955678ac77842ad_Shape"/>
+          <p:cNvSpPr/>
+          <p:nvPr>
+            <p:custDataLst>
+              <p:tags r:id="rId12"/>
+            </p:custDataLst>
+          </p:nvPr>
+        </p:nvSpPr>
+        <p:spPr>
+          <a:xfrm rot="16200000">
+            <a:off x="1619672" y="2210283"/>
+            <a:ext cx="165100" cy="165100"/>
+          </a:xfrm>
+          <a:prstGeom prst="flowChartMerge">
+            <a:avLst/>
+          </a:prstGeom>
+          <a:solidFill>
+            <a:srgbClr val="EA161E"/>
+          </a:solidFill>
+          <a:ln w="25400" cap="flat" cmpd="sng" algn="ctr">
+            <a:noFill/>
+            <a:prstDash val="solid"/>
+          </a:ln>
+          <a:effectLst/>
+          <a:scene3d>
+            <a:camera prst="orthographicFront"/>
+            <a:lightRig rig="threePt" dir="t"/>
+          </a:scene3d>
+          <a:sp3d>
+            <a:bevelT h="12700"/>
+          </a:sp3d>
+          <a:extLst>
+            <a:ext uri="{91240B29-F687-4F45-9708-019B960494DF}">
+              <a14:hiddenLine xmlns:a14="http://schemas.microsoft.com/office/drawing/2010/main" w="25400" cap="flat" cmpd="sng" algn="ctr">
+                <a:solidFill>
+                  <a:schemeClr val="accent1">
+                    <a:shade val="50000"/>
+                  </a:schemeClr>
+                </a:solidFill>
+                <a:prstDash val="solid"/>
+              </a14:hiddenLine>
+            </a:ext>
+            <a:ext uri="{AF507438-7753-43E0-B8FC-AC1667EBCBE1}">
+              <a14:hiddenEffects xmlns:a14="http://schemas.microsoft.com/office/drawing/2010/main">
+                <a:effectLst>
+                  <a:outerShdw>
+                    <a:scrgbClr r="0" g="0" b="0">
+                      <a:alpha val="50000"/>
+                    </a:scrgbClr>
+                  </a:outerShdw>
+                </a:effectLst>
+              </a14:hiddenEffects>
+            </a:ext>
+            <a:ext uri="{53640926-AAD7-44D8-BBD7-CCE9431645EC}">
+              <a14:shadowObscured xmlns:a14="http://schemas.microsoft.com/office/drawing/2010/main" val="1"/>
+            </a:ext>
+          </a:extLst>
+        </p:spPr>
+        <p:style>
+          <a:lnRef idx="2">
+            <a:schemeClr val="accent1">
+              <a:shade val="50000"/>
+            </a:schemeClr>
+          </a:lnRef>
+          <a:fillRef idx="1">
+            <a:schemeClr val="accent1"/>
+          </a:fillRef>
+          <a:effectRef idx="0">
+            <a:schemeClr val="accent1"/>
+          </a:effectRef>
+          <a:fontRef idx="minor">
+            <a:schemeClr val="lt1"/>
+          </a:fontRef>
+        </p:style>
+        <p:txBody>
+          <a:bodyPr rtlCol="0" anchor="ctr"/>
+          <a:lstStyle/>
+          <a:p>
+            <a:pPr algn="ctr"/>
+            <a:endParaRPr lang="zh-CN" altLang="en-US" sz="1400"/>
+          </a:p>
+        </p:txBody>
+      </p:sp>
+      <p:sp>
+        <p:nvSpPr>
+          <p:cNvPr id="730" name="OTLSHAPE_M_b753854f750345028007ecac670adac1_Title"/>
+          <p:cNvSpPr txBox="1"/>
+          <p:nvPr>
+            <p:custDataLst>
+              <p:tags r:id="rId13"/>
+            </p:custDataLst>
+          </p:nvPr>
+        </p:nvSpPr>
+        <p:spPr>
+          <a:xfrm>
+            <a:off x="2123727" y="2398426"/>
+            <a:ext cx="2160241" cy="215444"/>
+          </a:xfrm>
+          <a:prstGeom prst="rect">
+            <a:avLst/>
+          </a:prstGeom>
+          <a:noFill/>
+        </p:spPr>
+        <p:txBody>
+          <a:bodyPr vert="horz" wrap="square" lIns="0" tIns="0" rIns="0" bIns="0" rtlCol="0" anchor="ctr" anchorCtr="0">
+            <a:spAutoFit/>
+          </a:bodyPr>
+          <a:lstStyle/>
+          <a:p>
+            <a:r>
+              <a:rPr lang="en-US" altLang="zh-CN" sz="1400" spc="-8" dirty="0" smtClean="0">
+                <a:solidFill>
+                  <a:schemeClr val="dk1"/>
+                </a:solidFill>
+              </a:rPr>
+              <a:t>Practical Training Methods</a:t>
+            </a:r>
+            <a:endParaRPr lang="zh-CN" altLang="en-US" sz="1400" spc="-8" dirty="0">
+              <a:solidFill>
+                <a:schemeClr val="dk1"/>
+              </a:solidFill>
+            </a:endParaRPr>
+          </a:p>
+        </p:txBody>
+      </p:sp>
+      <p:sp>
+        <p:nvSpPr>
+          <p:cNvPr id="732" name="OTLSHAPE_M_b753854f750345028007ecac670adac1_Shape"/>
+          <p:cNvSpPr/>
+          <p:nvPr>
+            <p:custDataLst>
+              <p:tags r:id="rId14"/>
+            </p:custDataLst>
+          </p:nvPr>
+        </p:nvSpPr>
+        <p:spPr>
+          <a:xfrm rot="16200000">
+            <a:off x="1886619" y="2426307"/>
+            <a:ext cx="165100" cy="165100"/>
+          </a:xfrm>
+          <a:prstGeom prst="flowChartMerge">
+            <a:avLst/>
+          </a:prstGeom>
+          <a:solidFill>
+            <a:srgbClr val="EA161E"/>
+          </a:solidFill>
+          <a:ln w="25400" cap="flat" cmpd="sng" algn="ctr">
+            <a:noFill/>
+            <a:prstDash val="solid"/>
+          </a:ln>
+          <a:effectLst/>
+          <a:scene3d>
+            <a:camera prst="orthographicFront"/>
+            <a:lightRig rig="threePt" dir="t"/>
+          </a:scene3d>
+          <a:sp3d>
+            <a:bevelT h="12700"/>
+          </a:sp3d>
+          <a:extLst>
+            <a:ext uri="{91240B29-F687-4F45-9708-019B960494DF}">
+              <a14:hiddenLine xmlns:a14="http://schemas.microsoft.com/office/drawing/2010/main" w="25400" cap="flat" cmpd="sng" algn="ctr">
+                <a:solidFill>
+                  <a:schemeClr val="accent1">
+                    <a:shade val="50000"/>
+                  </a:schemeClr>
+                </a:solidFill>
+                <a:prstDash val="solid"/>
+              </a14:hiddenLine>
+            </a:ext>
+            <a:ext uri="{AF507438-7753-43E0-B8FC-AC1667EBCBE1}">
+              <a14:hiddenEffects xmlns:a14="http://schemas.microsoft.com/office/drawing/2010/main">
+                <a:effectLst>
+                  <a:outerShdw>
+                    <a:scrgbClr r="0" g="0" b="0">
+                      <a:alpha val="50000"/>
+                    </a:scrgbClr>
+                  </a:outerShdw>
+                </a:effectLst>
+              </a14:hiddenEffects>
+            </a:ext>
+            <a:ext uri="{53640926-AAD7-44D8-BBD7-CCE9431645EC}">
+              <a14:shadowObscured xmlns:a14="http://schemas.microsoft.com/office/drawing/2010/main" val="1"/>
+            </a:ext>
+          </a:extLst>
+        </p:spPr>
+        <p:style>
+          <a:lnRef idx="2">
+            <a:schemeClr val="accent1">
+              <a:shade val="50000"/>
+            </a:schemeClr>
+          </a:lnRef>
+          <a:fillRef idx="1">
+            <a:schemeClr val="accent1"/>
+          </a:fillRef>
+          <a:effectRef idx="0">
+            <a:schemeClr val="accent1"/>
+          </a:effectRef>
+          <a:fontRef idx="minor">
+            <a:schemeClr val="lt1"/>
+          </a:fontRef>
+        </p:style>
+        <p:txBody>
+          <a:bodyPr rtlCol="0" anchor="ctr"/>
+          <a:lstStyle/>
+          <a:p>
+            <a:pPr algn="ctr"/>
+            <a:endParaRPr lang="zh-CN" altLang="en-US" sz="1400"/>
+          </a:p>
+        </p:txBody>
+      </p:sp>
+      <p:sp>
+        <p:nvSpPr>
+          <p:cNvPr id="734" name="OTLSHAPE_T_af8aba6694844f26b92929dd16af13bb_ShapePercentage" hidden="1"/>
+          <p:cNvSpPr/>
+          <p:nvPr>
+            <p:custDataLst>
+              <p:tags r:id="rId15"/>
+            </p:custDataLst>
+          </p:nvPr>
+        </p:nvSpPr>
+        <p:spPr>
+          <a:xfrm>
+            <a:off x="933365" y="3945255"/>
+            <a:ext cx="0" cy="0"/>
+          </a:xfrm>
+          <a:prstGeom prst="rect">
+            <a:avLst/>
+          </a:prstGeom>
+        </p:spPr>
+        <p:style>
+          <a:lnRef idx="2">
+            <a:schemeClr val="accent1">
+              <a:shade val="50000"/>
+            </a:schemeClr>
+          </a:lnRef>
+          <a:fillRef idx="1">
+            <a:schemeClr val="accent1"/>
+          </a:fillRef>
+          <a:effectRef idx="0">
+            <a:schemeClr val="accent1"/>
+          </a:effectRef>
+          <a:fontRef idx="minor">
+            <a:schemeClr val="lt1"/>
+          </a:fontRef>
+        </p:style>
+        <p:txBody>
+          <a:bodyPr rtlCol="0" anchor="ctr"/>
+          <a:lstStyle/>
+          <a:p>
+            <a:pPr algn="ctr"/>
+            <a:endParaRPr lang="zh-CN" altLang="en-US"/>
+          </a:p>
+        </p:txBody>
+      </p:sp>
+      <p:sp>
+        <p:nvSpPr>
+          <p:cNvPr id="735" name="OTLSHAPE_T_af8aba6694844f26b92929dd16af13bb_Duration" hidden="1"/>
+          <p:cNvSpPr txBox="1"/>
+          <p:nvPr>
+            <p:custDataLst>
+              <p:tags r:id="rId16"/>
+            </p:custDataLst>
+          </p:nvPr>
+        </p:nvSpPr>
+        <p:spPr>
+          <a:xfrm>
+            <a:off x="0" y="3945255"/>
+            <a:ext cx="393700" cy="155025"/>
+          </a:xfrm>
+          <a:prstGeom prst="rect">
+            <a:avLst/>
+          </a:prstGeom>
+          <a:noFill/>
+        </p:spPr>
+        <p:txBody>
+          <a:bodyPr vert="horz" wrap="square" lIns="0" tIns="0" rIns="0" bIns="0" rtlCol="0" anchor="ctr" anchorCtr="0">
+            <a:spAutoFit/>
+          </a:bodyPr>
+          <a:lstStyle/>
+          <a:p>
+            <a:pPr algn="ctr"/>
+            <a:r>
+              <a:rPr lang="en-US" altLang="zh-CN" sz="1000" smtClean="0">
+                <a:solidFill>
+                  <a:schemeClr val="accent2"/>
+                </a:solidFill>
+                <a:latin typeface="Calibri"/>
+              </a:rPr>
+              <a:t>32 days</a:t>
+            </a:r>
+            <a:endParaRPr lang="zh-CN" altLang="en-US" sz="1000">
+              <a:solidFill>
+                <a:schemeClr val="accent2"/>
+              </a:solidFill>
+              <a:latin typeface="Calibri"/>
+            </a:endParaRPr>
+          </a:p>
+        </p:txBody>
+      </p:sp>
+      <p:sp>
+        <p:nvSpPr>
+          <p:cNvPr id="736" name="OTLSHAPE_T_af8aba6694844f26b92929dd16af13bb_TextPercentage" hidden="1"/>
+          <p:cNvSpPr txBox="1"/>
+          <p:nvPr>
+            <p:custDataLst>
+              <p:tags r:id="rId17"/>
+            </p:custDataLst>
+          </p:nvPr>
+        </p:nvSpPr>
+        <p:spPr>
+          <a:xfrm>
+            <a:off x="0" y="4100280"/>
+            <a:ext cx="1588" cy="153888"/>
+          </a:xfrm>
+          <a:prstGeom prst="rect">
+            <a:avLst/>
+          </a:prstGeom>
+          <a:noFill/>
+        </p:spPr>
+        <p:txBody>
+          <a:bodyPr vert="horz" wrap="square" lIns="0" tIns="0" rIns="0" bIns="0" rtlCol="0" anchor="ctr" anchorCtr="0">
+            <a:spAutoFit/>
+          </a:bodyPr>
+          <a:lstStyle/>
+          <a:p>
+            <a:pPr algn="ctr"/>
+            <a:endParaRPr lang="zh-CN" altLang="en-US" sz="1000">
+              <a:solidFill>
+                <a:schemeClr val="accent2"/>
+              </a:solidFill>
+              <a:latin typeface="Calibri"/>
+            </a:endParaRPr>
+          </a:p>
+        </p:txBody>
+      </p:sp>
+      <p:sp>
+        <p:nvSpPr>
+          <p:cNvPr id="737" name="OTLSHAPE_T_af8aba6694844f26b92929dd16af13bb_StartDate" hidden="1"/>
+          <p:cNvSpPr txBox="1"/>
+          <p:nvPr>
+            <p:custDataLst>
+              <p:tags r:id="rId18"/>
+            </p:custDataLst>
+          </p:nvPr>
+        </p:nvSpPr>
+        <p:spPr>
+          <a:xfrm>
+            <a:off x="0" y="4100280"/>
+            <a:ext cx="1588" cy="153888"/>
+          </a:xfrm>
+          <a:prstGeom prst="rect">
+            <a:avLst/>
+          </a:prstGeom>
+          <a:noFill/>
+        </p:spPr>
+        <p:txBody>
+          <a:bodyPr vert="horz" wrap="square" lIns="0" tIns="0" rIns="0" bIns="0" rtlCol="0" anchor="ctr" anchorCtr="0">
+            <a:spAutoFit/>
+          </a:bodyPr>
+          <a:lstStyle/>
+          <a:p>
+            <a:pPr algn="ctr"/>
+            <a:endParaRPr lang="zh-CN" altLang="en-US" sz="1000">
+              <a:solidFill>
+                <a:srgbClr val="1F497E"/>
+              </a:solidFill>
+              <a:latin typeface="Calibri"/>
+            </a:endParaRPr>
+          </a:p>
+        </p:txBody>
+      </p:sp>
+      <p:sp>
+        <p:nvSpPr>
+          <p:cNvPr id="738" name="OTLSHAPE_T_af8aba6694844f26b92929dd16af13bb_EndDate" hidden="1"/>
+          <p:cNvSpPr txBox="1"/>
+          <p:nvPr>
+            <p:custDataLst>
+              <p:tags r:id="rId19"/>
+            </p:custDataLst>
+          </p:nvPr>
+        </p:nvSpPr>
+        <p:spPr>
+          <a:xfrm>
+            <a:off x="0" y="4100280"/>
+            <a:ext cx="1588" cy="153888"/>
+          </a:xfrm>
+          <a:prstGeom prst="rect">
+            <a:avLst/>
+          </a:prstGeom>
+          <a:noFill/>
+        </p:spPr>
+        <p:txBody>
+          <a:bodyPr vert="horz" wrap="square" lIns="0" tIns="0" rIns="0" bIns="0" rtlCol="0" anchor="ctr" anchorCtr="0">
+            <a:spAutoFit/>
+          </a:bodyPr>
+          <a:lstStyle/>
+          <a:p>
+            <a:pPr algn="ctr"/>
+            <a:endParaRPr lang="zh-CN" altLang="en-US" sz="1000">
+              <a:solidFill>
+                <a:srgbClr val="1F497E"/>
+              </a:solidFill>
+              <a:latin typeface="Calibri"/>
+            </a:endParaRPr>
+          </a:p>
+        </p:txBody>
+      </p:sp>
+      <p:sp>
+        <p:nvSpPr>
+          <p:cNvPr id="742" name="OTLSHAPE_T_235e46f474164d06a05367a49d5026a8_ShapePercentage" hidden="1"/>
+          <p:cNvSpPr/>
+          <p:nvPr>
+            <p:custDataLst>
+              <p:tags r:id="rId20"/>
+            </p:custDataLst>
+          </p:nvPr>
+        </p:nvSpPr>
+        <p:spPr>
+          <a:xfrm>
+            <a:off x="1425932" y="4211955"/>
+            <a:ext cx="0" cy="0"/>
+          </a:xfrm>
+          <a:prstGeom prst="rect">
+            <a:avLst/>
+          </a:prstGeom>
+        </p:spPr>
+        <p:style>
+          <a:lnRef idx="2">
+            <a:schemeClr val="accent1">
+              <a:shade val="50000"/>
+            </a:schemeClr>
+          </a:lnRef>
+          <a:fillRef idx="1">
+            <a:schemeClr val="accent1"/>
+          </a:fillRef>
+          <a:effectRef idx="0">
+            <a:schemeClr val="accent1"/>
+          </a:effectRef>
+          <a:fontRef idx="minor">
+            <a:schemeClr val="lt1"/>
+          </a:fontRef>
+        </p:style>
+        <p:txBody>
+          <a:bodyPr rtlCol="0" anchor="ctr"/>
+          <a:lstStyle/>
+          <a:p>
+            <a:pPr algn="ctr"/>
+            <a:endParaRPr lang="zh-CN" altLang="en-US"/>
+          </a:p>
+        </p:txBody>
+      </p:sp>
+      <p:sp>
+        <p:nvSpPr>
+          <p:cNvPr id="743" name="OTLSHAPE_T_235e46f474164d06a05367a49d5026a8_Duration" hidden="1"/>
+          <p:cNvSpPr txBox="1"/>
+          <p:nvPr>
+            <p:custDataLst>
+              <p:tags r:id="rId21"/>
+            </p:custDataLst>
+          </p:nvPr>
+        </p:nvSpPr>
+        <p:spPr>
+          <a:xfrm>
+            <a:off x="0" y="4211955"/>
+            <a:ext cx="393700" cy="155025"/>
+          </a:xfrm>
+          <a:prstGeom prst="rect">
+            <a:avLst/>
+          </a:prstGeom>
+          <a:noFill/>
+        </p:spPr>
+        <p:txBody>
+          <a:bodyPr vert="horz" wrap="square" lIns="0" tIns="0" rIns="0" bIns="0" rtlCol="0" anchor="ctr" anchorCtr="0">
+            <a:spAutoFit/>
+          </a:bodyPr>
+          <a:lstStyle/>
+          <a:p>
+            <a:pPr algn="ctr"/>
+            <a:r>
+              <a:rPr lang="en-US" altLang="zh-CN" sz="1000" smtClean="0">
+                <a:solidFill>
+                  <a:schemeClr val="accent2"/>
+                </a:solidFill>
+                <a:latin typeface="Calibri"/>
+              </a:rPr>
+              <a:t>31 days</a:t>
+            </a:r>
+            <a:endParaRPr lang="zh-CN" altLang="en-US" sz="1000">
+              <a:solidFill>
+                <a:schemeClr val="accent2"/>
+              </a:solidFill>
+              <a:latin typeface="Calibri"/>
+            </a:endParaRPr>
+          </a:p>
+        </p:txBody>
+      </p:sp>
+      <p:sp>
+        <p:nvSpPr>
+          <p:cNvPr id="744" name="OTLSHAPE_T_235e46f474164d06a05367a49d5026a8_TextPercentage" hidden="1"/>
+          <p:cNvSpPr txBox="1"/>
+          <p:nvPr>
+            <p:custDataLst>
+              <p:tags r:id="rId22"/>
+            </p:custDataLst>
+          </p:nvPr>
+        </p:nvSpPr>
+        <p:spPr>
+          <a:xfrm>
+            <a:off x="0" y="4366980"/>
+            <a:ext cx="1588" cy="153888"/>
+          </a:xfrm>
+          <a:prstGeom prst="rect">
+            <a:avLst/>
+          </a:prstGeom>
+          <a:noFill/>
+        </p:spPr>
+        <p:txBody>
+          <a:bodyPr vert="horz" wrap="square" lIns="0" tIns="0" rIns="0" bIns="0" rtlCol="0" anchor="ctr" anchorCtr="0">
+            <a:spAutoFit/>
+          </a:bodyPr>
+          <a:lstStyle/>
+          <a:p>
+            <a:pPr algn="ctr"/>
+            <a:endParaRPr lang="zh-CN" altLang="en-US" sz="1000">
+              <a:solidFill>
+                <a:schemeClr val="accent2"/>
+              </a:solidFill>
+              <a:latin typeface="Calibri"/>
+            </a:endParaRPr>
+          </a:p>
+        </p:txBody>
+      </p:sp>
+      <p:sp>
+        <p:nvSpPr>
+          <p:cNvPr id="745" name="OTLSHAPE_T_235e46f474164d06a05367a49d5026a8_StartDate" hidden="1"/>
+          <p:cNvSpPr txBox="1"/>
+          <p:nvPr>
+            <p:custDataLst>
+              <p:tags r:id="rId23"/>
+            </p:custDataLst>
+          </p:nvPr>
+        </p:nvSpPr>
+        <p:spPr>
+          <a:xfrm>
+            <a:off x="0" y="4366980"/>
+            <a:ext cx="1588" cy="153888"/>
+          </a:xfrm>
+          <a:prstGeom prst="rect">
+            <a:avLst/>
+          </a:prstGeom>
+          <a:noFill/>
+        </p:spPr>
+        <p:txBody>
+          <a:bodyPr vert="horz" wrap="square" lIns="0" tIns="0" rIns="0" bIns="0" rtlCol="0" anchor="ctr" anchorCtr="0">
+            <a:spAutoFit/>
+          </a:bodyPr>
+          <a:lstStyle/>
+          <a:p>
+            <a:pPr algn="ctr"/>
+            <a:endParaRPr lang="zh-CN" altLang="en-US" sz="1000">
+              <a:solidFill>
+                <a:srgbClr val="1F497E"/>
+              </a:solidFill>
+              <a:latin typeface="Calibri"/>
+            </a:endParaRPr>
+          </a:p>
+        </p:txBody>
+      </p:sp>
+      <p:sp>
+        <p:nvSpPr>
+          <p:cNvPr id="746" name="OTLSHAPE_T_235e46f474164d06a05367a49d5026a8_EndDate" hidden="1"/>
+          <p:cNvSpPr txBox="1"/>
+          <p:nvPr>
+            <p:custDataLst>
+              <p:tags r:id="rId24"/>
+            </p:custDataLst>
+          </p:nvPr>
+        </p:nvSpPr>
+        <p:spPr>
+          <a:xfrm>
+            <a:off x="0" y="4366980"/>
+            <a:ext cx="1588" cy="153888"/>
+          </a:xfrm>
+          <a:prstGeom prst="rect">
+            <a:avLst/>
+          </a:prstGeom>
+          <a:noFill/>
+        </p:spPr>
+        <p:txBody>
+          <a:bodyPr vert="horz" wrap="square" lIns="0" tIns="0" rIns="0" bIns="0" rtlCol="0" anchor="ctr" anchorCtr="0">
+            <a:spAutoFit/>
+          </a:bodyPr>
+          <a:lstStyle/>
+          <a:p>
+            <a:pPr algn="ctr"/>
+            <a:endParaRPr lang="zh-CN" altLang="en-US" sz="1000">
+              <a:solidFill>
+                <a:srgbClr val="1F497E"/>
+              </a:solidFill>
+              <a:latin typeface="Calibri"/>
+            </a:endParaRPr>
+          </a:p>
+        </p:txBody>
+      </p:sp>
+      <p:sp>
+        <p:nvSpPr>
+          <p:cNvPr id="750" name="OTLSHAPE_T_77eb22e7cd0b4dc299a4200d7b7f12eb_ShapePercentage" hidden="1"/>
+          <p:cNvSpPr/>
+          <p:nvPr>
+            <p:custDataLst>
+              <p:tags r:id="rId25"/>
+            </p:custDataLst>
+          </p:nvPr>
+        </p:nvSpPr>
+        <p:spPr>
+          <a:xfrm>
+            <a:off x="1902609" y="4478655"/>
+            <a:ext cx="0" cy="0"/>
+          </a:xfrm>
+          <a:prstGeom prst="rect">
+            <a:avLst/>
+          </a:prstGeom>
+        </p:spPr>
+        <p:style>
+          <a:lnRef idx="2">
+            <a:schemeClr val="accent1">
+              <a:shade val="50000"/>
+            </a:schemeClr>
+          </a:lnRef>
+          <a:fillRef idx="1">
+            <a:schemeClr val="accent1"/>
+          </a:fillRef>
+          <a:effectRef idx="0">
+            <a:schemeClr val="accent1"/>
+          </a:effectRef>
+          <a:fontRef idx="minor">
+            <a:schemeClr val="lt1"/>
+          </a:fontRef>
+        </p:style>
+        <p:txBody>
+          <a:bodyPr rtlCol="0" anchor="ctr"/>
+          <a:lstStyle/>
+          <a:p>
+            <a:pPr algn="ctr"/>
+            <a:endParaRPr lang="zh-CN" altLang="en-US"/>
+          </a:p>
+        </p:txBody>
+      </p:sp>
+      <p:sp>
+        <p:nvSpPr>
+          <p:cNvPr id="751" name="OTLSHAPE_T_77eb22e7cd0b4dc299a4200d7b7f12eb_Duration" hidden="1"/>
+          <p:cNvSpPr txBox="1"/>
+          <p:nvPr>
+            <p:custDataLst>
+              <p:tags r:id="rId26"/>
+            </p:custDataLst>
+          </p:nvPr>
+        </p:nvSpPr>
+        <p:spPr>
+          <a:xfrm>
+            <a:off x="0" y="4478655"/>
+            <a:ext cx="393700" cy="155025"/>
+          </a:xfrm>
+          <a:prstGeom prst="rect">
+            <a:avLst/>
+          </a:prstGeom>
+          <a:noFill/>
+        </p:spPr>
+        <p:txBody>
+          <a:bodyPr vert="horz" wrap="square" lIns="0" tIns="0" rIns="0" bIns="0" rtlCol="0" anchor="ctr" anchorCtr="0">
+            <a:spAutoFit/>
+          </a:bodyPr>
+          <a:lstStyle/>
+          <a:p>
+            <a:pPr algn="ctr"/>
+            <a:r>
+              <a:rPr lang="en-US" altLang="zh-CN" sz="1000" smtClean="0">
+                <a:solidFill>
+                  <a:schemeClr val="accent2"/>
+                </a:solidFill>
+                <a:latin typeface="Calibri"/>
+              </a:rPr>
+              <a:t>92 days</a:t>
+            </a:r>
+            <a:endParaRPr lang="zh-CN" altLang="en-US" sz="1000">
+              <a:solidFill>
+                <a:schemeClr val="accent2"/>
+              </a:solidFill>
+              <a:latin typeface="Calibri"/>
+            </a:endParaRPr>
+          </a:p>
+        </p:txBody>
+      </p:sp>
+      <p:sp>
+        <p:nvSpPr>
+          <p:cNvPr id="752" name="OTLSHAPE_T_77eb22e7cd0b4dc299a4200d7b7f12eb_TextPercentage" hidden="1"/>
+          <p:cNvSpPr txBox="1"/>
+          <p:nvPr>
+            <p:custDataLst>
+              <p:tags r:id="rId27"/>
+            </p:custDataLst>
+          </p:nvPr>
+        </p:nvSpPr>
+        <p:spPr>
+          <a:xfrm>
+            <a:off x="0" y="4633680"/>
+            <a:ext cx="1588" cy="153888"/>
+          </a:xfrm>
+          <a:prstGeom prst="rect">
+            <a:avLst/>
+          </a:prstGeom>
+          <a:noFill/>
+        </p:spPr>
+        <p:txBody>
+          <a:bodyPr vert="horz" wrap="square" lIns="0" tIns="0" rIns="0" bIns="0" rtlCol="0" anchor="ctr" anchorCtr="0">
+            <a:spAutoFit/>
+          </a:bodyPr>
+          <a:lstStyle/>
+          <a:p>
+            <a:pPr algn="ctr"/>
+            <a:endParaRPr lang="zh-CN" altLang="en-US" sz="1000">
+              <a:solidFill>
+                <a:schemeClr val="accent2"/>
+              </a:solidFill>
+              <a:latin typeface="Calibri"/>
+            </a:endParaRPr>
+          </a:p>
+        </p:txBody>
+      </p:sp>
+      <p:sp>
+        <p:nvSpPr>
+          <p:cNvPr id="753" name="OTLSHAPE_T_77eb22e7cd0b4dc299a4200d7b7f12eb_StartDate" hidden="1"/>
+          <p:cNvSpPr txBox="1"/>
+          <p:nvPr>
+            <p:custDataLst>
+              <p:tags r:id="rId28"/>
+            </p:custDataLst>
+          </p:nvPr>
+        </p:nvSpPr>
+        <p:spPr>
+          <a:xfrm>
+            <a:off x="0" y="4633680"/>
+            <a:ext cx="1588" cy="153888"/>
+          </a:xfrm>
+          <a:prstGeom prst="rect">
+            <a:avLst/>
+          </a:prstGeom>
+          <a:noFill/>
+        </p:spPr>
+        <p:txBody>
+          <a:bodyPr vert="horz" wrap="square" lIns="0" tIns="0" rIns="0" bIns="0" rtlCol="0" anchor="ctr" anchorCtr="0">
+            <a:spAutoFit/>
+          </a:bodyPr>
+          <a:lstStyle/>
+          <a:p>
+            <a:pPr algn="ctr"/>
+            <a:endParaRPr lang="zh-CN" altLang="en-US" sz="1000">
+              <a:solidFill>
+                <a:srgbClr val="1F497E"/>
+              </a:solidFill>
+              <a:latin typeface="Calibri"/>
+            </a:endParaRPr>
+          </a:p>
+        </p:txBody>
+      </p:sp>
+      <p:sp>
+        <p:nvSpPr>
+          <p:cNvPr id="754" name="OTLSHAPE_T_77eb22e7cd0b4dc299a4200d7b7f12eb_EndDate" hidden="1"/>
+          <p:cNvSpPr txBox="1"/>
+          <p:nvPr>
+            <p:custDataLst>
+              <p:tags r:id="rId29"/>
+            </p:custDataLst>
+          </p:nvPr>
+        </p:nvSpPr>
+        <p:spPr>
+          <a:xfrm>
+            <a:off x="0" y="4633680"/>
+            <a:ext cx="1588" cy="153888"/>
+          </a:xfrm>
+          <a:prstGeom prst="rect">
+            <a:avLst/>
+          </a:prstGeom>
+          <a:noFill/>
+        </p:spPr>
+        <p:txBody>
+          <a:bodyPr vert="horz" wrap="square" lIns="0" tIns="0" rIns="0" bIns="0" rtlCol="0" anchor="ctr" anchorCtr="0">
+            <a:spAutoFit/>
+          </a:bodyPr>
+          <a:lstStyle/>
+          <a:p>
+            <a:pPr algn="ctr"/>
+            <a:endParaRPr lang="zh-CN" altLang="en-US" sz="1000">
+              <a:solidFill>
+                <a:srgbClr val="1F497E"/>
+              </a:solidFill>
+              <a:latin typeface="Calibri"/>
+            </a:endParaRPr>
+          </a:p>
+        </p:txBody>
+      </p:sp>
+      <p:sp>
+        <p:nvSpPr>
+          <p:cNvPr id="758" name="OTLSHAPE_T_0862fbcce6f74c47b96391573e00609d_ShapePercentage" hidden="1"/>
+          <p:cNvSpPr/>
+          <p:nvPr>
+            <p:custDataLst>
+              <p:tags r:id="rId30"/>
+            </p:custDataLst>
+          </p:nvPr>
+        </p:nvSpPr>
+        <p:spPr>
+          <a:xfrm>
+            <a:off x="3348529" y="4745355"/>
+            <a:ext cx="0" cy="0"/>
+          </a:xfrm>
+          <a:prstGeom prst="rect">
+            <a:avLst/>
+          </a:prstGeom>
+        </p:spPr>
+        <p:style>
+          <a:lnRef idx="2">
+            <a:schemeClr val="accent1">
+              <a:shade val="50000"/>
+            </a:schemeClr>
+          </a:lnRef>
+          <a:fillRef idx="1">
+            <a:schemeClr val="accent1"/>
+          </a:fillRef>
+          <a:effectRef idx="0">
+            <a:schemeClr val="accent1"/>
+          </a:effectRef>
+          <a:fontRef idx="minor">
+            <a:schemeClr val="lt1"/>
+          </a:fontRef>
+        </p:style>
+        <p:txBody>
+          <a:bodyPr rtlCol="0" anchor="ctr"/>
+          <a:lstStyle/>
+          <a:p>
+            <a:pPr algn="ctr"/>
+            <a:endParaRPr lang="zh-CN" altLang="en-US"/>
+          </a:p>
+        </p:txBody>
+      </p:sp>
+      <p:sp>
+        <p:nvSpPr>
+          <p:cNvPr id="759" name="OTLSHAPE_T_0862fbcce6f74c47b96391573e00609d_Duration" hidden="1"/>
+          <p:cNvSpPr txBox="1"/>
+          <p:nvPr>
+            <p:custDataLst>
+              <p:tags r:id="rId31"/>
+            </p:custDataLst>
+          </p:nvPr>
+        </p:nvSpPr>
+        <p:spPr>
+          <a:xfrm>
+            <a:off x="0" y="4745355"/>
+            <a:ext cx="393700" cy="155025"/>
+          </a:xfrm>
+          <a:prstGeom prst="rect">
+            <a:avLst/>
+          </a:prstGeom>
+          <a:noFill/>
+        </p:spPr>
+        <p:txBody>
+          <a:bodyPr vert="horz" wrap="square" lIns="0" tIns="0" rIns="0" bIns="0" rtlCol="0" anchor="ctr" anchorCtr="0">
+            <a:spAutoFit/>
+          </a:bodyPr>
+          <a:lstStyle/>
+          <a:p>
+            <a:pPr algn="ctr"/>
+            <a:r>
+              <a:rPr lang="en-US" altLang="zh-CN" sz="1000" smtClean="0">
+                <a:solidFill>
+                  <a:schemeClr val="accent2"/>
+                </a:solidFill>
+                <a:latin typeface="Calibri"/>
+              </a:rPr>
+              <a:t>93 days</a:t>
+            </a:r>
+            <a:endParaRPr lang="zh-CN" altLang="en-US" sz="1000">
+              <a:solidFill>
+                <a:schemeClr val="accent2"/>
+              </a:solidFill>
+              <a:latin typeface="Calibri"/>
+            </a:endParaRPr>
+          </a:p>
+        </p:txBody>
+      </p:sp>
+      <p:sp>
+        <p:nvSpPr>
+          <p:cNvPr id="760" name="OTLSHAPE_T_0862fbcce6f74c47b96391573e00609d_TextPercentage" hidden="1"/>
+          <p:cNvSpPr txBox="1"/>
+          <p:nvPr>
+            <p:custDataLst>
+              <p:tags r:id="rId32"/>
+            </p:custDataLst>
+          </p:nvPr>
+        </p:nvSpPr>
+        <p:spPr>
+          <a:xfrm>
+            <a:off x="0" y="4900380"/>
+            <a:ext cx="1588" cy="153888"/>
+          </a:xfrm>
+          <a:prstGeom prst="rect">
+            <a:avLst/>
+          </a:prstGeom>
+          <a:noFill/>
+        </p:spPr>
+        <p:txBody>
+          <a:bodyPr vert="horz" wrap="square" lIns="0" tIns="0" rIns="0" bIns="0" rtlCol="0" anchor="ctr" anchorCtr="0">
+            <a:spAutoFit/>
+          </a:bodyPr>
+          <a:lstStyle/>
+          <a:p>
+            <a:pPr algn="ctr"/>
+            <a:endParaRPr lang="zh-CN" altLang="en-US" sz="1000">
+              <a:solidFill>
+                <a:schemeClr val="accent2"/>
+              </a:solidFill>
+              <a:latin typeface="Calibri"/>
+            </a:endParaRPr>
+          </a:p>
+        </p:txBody>
+      </p:sp>
+      <p:sp>
+        <p:nvSpPr>
+          <p:cNvPr id="761" name="OTLSHAPE_T_0862fbcce6f74c47b96391573e00609d_StartDate" hidden="1"/>
+          <p:cNvSpPr txBox="1"/>
+          <p:nvPr>
+            <p:custDataLst>
+              <p:tags r:id="rId33"/>
+            </p:custDataLst>
+          </p:nvPr>
+        </p:nvSpPr>
+        <p:spPr>
+          <a:xfrm>
+            <a:off x="0" y="4900380"/>
+            <a:ext cx="1588" cy="153888"/>
+          </a:xfrm>
+          <a:prstGeom prst="rect">
+            <a:avLst/>
+          </a:prstGeom>
+          <a:noFill/>
+        </p:spPr>
+        <p:txBody>
+          <a:bodyPr vert="horz" wrap="square" lIns="0" tIns="0" rIns="0" bIns="0" rtlCol="0" anchor="ctr" anchorCtr="0">
+            <a:spAutoFit/>
+          </a:bodyPr>
+          <a:lstStyle/>
+          <a:p>
+            <a:pPr algn="ctr"/>
+            <a:endParaRPr lang="zh-CN" altLang="en-US" sz="1000">
+              <a:solidFill>
+                <a:srgbClr val="1F497E"/>
+              </a:solidFill>
+              <a:latin typeface="Calibri"/>
+            </a:endParaRPr>
+          </a:p>
+        </p:txBody>
+      </p:sp>
+      <p:sp>
+        <p:nvSpPr>
+          <p:cNvPr id="762" name="OTLSHAPE_T_0862fbcce6f74c47b96391573e00609d_EndDate" hidden="1"/>
+          <p:cNvSpPr txBox="1"/>
+          <p:nvPr>
+            <p:custDataLst>
+              <p:tags r:id="rId34"/>
+            </p:custDataLst>
+          </p:nvPr>
+        </p:nvSpPr>
+        <p:spPr>
+          <a:xfrm>
+            <a:off x="0" y="4900380"/>
+            <a:ext cx="1588" cy="153888"/>
+          </a:xfrm>
+          <a:prstGeom prst="rect">
+            <a:avLst/>
+          </a:prstGeom>
+          <a:noFill/>
+        </p:spPr>
+        <p:txBody>
+          <a:bodyPr vert="horz" wrap="square" lIns="0" tIns="0" rIns="0" bIns="0" rtlCol="0" anchor="ctr" anchorCtr="0">
+            <a:spAutoFit/>
+          </a:bodyPr>
+          <a:lstStyle/>
+          <a:p>
+            <a:pPr algn="ctr"/>
+            <a:endParaRPr lang="zh-CN" altLang="en-US" sz="1000">
+              <a:solidFill>
+                <a:srgbClr val="1F497E"/>
+              </a:solidFill>
+              <a:latin typeface="Calibri"/>
+            </a:endParaRPr>
+          </a:p>
+        </p:txBody>
+      </p:sp>
+      <p:sp>
+        <p:nvSpPr>
+          <p:cNvPr id="766" name="OTLSHAPE_T_9ac8d18186e74035a2730a3a6e774ee6_ShapePercentage" hidden="1"/>
+          <p:cNvSpPr/>
+          <p:nvPr>
+            <p:custDataLst>
+              <p:tags r:id="rId35"/>
+            </p:custDataLst>
+          </p:nvPr>
+        </p:nvSpPr>
+        <p:spPr>
+          <a:xfrm>
+            <a:off x="3841095" y="5012055"/>
+            <a:ext cx="0" cy="0"/>
+          </a:xfrm>
+          <a:prstGeom prst="rect">
+            <a:avLst/>
+          </a:prstGeom>
+        </p:spPr>
+        <p:style>
+          <a:lnRef idx="2">
+            <a:schemeClr val="accent1">
+              <a:shade val="50000"/>
+            </a:schemeClr>
+          </a:lnRef>
+          <a:fillRef idx="1">
+            <a:schemeClr val="accent1"/>
+          </a:fillRef>
+          <a:effectRef idx="0">
+            <a:schemeClr val="accent1"/>
+          </a:effectRef>
+          <a:fontRef idx="minor">
+            <a:schemeClr val="lt1"/>
+          </a:fontRef>
+        </p:style>
+        <p:txBody>
+          <a:bodyPr rtlCol="0" anchor="ctr"/>
+          <a:lstStyle/>
+          <a:p>
+            <a:pPr algn="ctr"/>
+            <a:endParaRPr lang="zh-CN" altLang="en-US"/>
+          </a:p>
+        </p:txBody>
+      </p:sp>
+      <p:sp>
+        <p:nvSpPr>
+          <p:cNvPr id="767" name="OTLSHAPE_T_9ac8d18186e74035a2730a3a6e774ee6_Duration" hidden="1"/>
+          <p:cNvSpPr txBox="1"/>
+          <p:nvPr>
+            <p:custDataLst>
+              <p:tags r:id="rId36"/>
+            </p:custDataLst>
+          </p:nvPr>
+        </p:nvSpPr>
+        <p:spPr>
+          <a:xfrm>
+            <a:off x="0" y="5012055"/>
+            <a:ext cx="393700" cy="155025"/>
+          </a:xfrm>
+          <a:prstGeom prst="rect">
+            <a:avLst/>
+          </a:prstGeom>
+          <a:noFill/>
+        </p:spPr>
+        <p:txBody>
+          <a:bodyPr vert="horz" wrap="square" lIns="0" tIns="0" rIns="0" bIns="0" rtlCol="0" anchor="ctr" anchorCtr="0">
+            <a:spAutoFit/>
+          </a:bodyPr>
+          <a:lstStyle/>
+          <a:p>
+            <a:pPr algn="ctr"/>
+            <a:r>
+              <a:rPr lang="en-US" altLang="zh-CN" sz="1000" smtClean="0">
+                <a:solidFill>
+                  <a:schemeClr val="accent2"/>
+                </a:solidFill>
+                <a:latin typeface="Calibri"/>
+              </a:rPr>
+              <a:t>92 days</a:t>
+            </a:r>
+            <a:endParaRPr lang="zh-CN" altLang="en-US" sz="1000">
+              <a:solidFill>
+                <a:schemeClr val="accent2"/>
+              </a:solidFill>
+              <a:latin typeface="Calibri"/>
+            </a:endParaRPr>
+          </a:p>
+        </p:txBody>
+      </p:sp>
+      <p:sp>
+        <p:nvSpPr>
+          <p:cNvPr id="768" name="OTLSHAPE_T_9ac8d18186e74035a2730a3a6e774ee6_TextPercentage" hidden="1"/>
+          <p:cNvSpPr txBox="1"/>
+          <p:nvPr>
+            <p:custDataLst>
+              <p:tags r:id="rId37"/>
+            </p:custDataLst>
+          </p:nvPr>
+        </p:nvSpPr>
+        <p:spPr>
+          <a:xfrm>
+            <a:off x="0" y="5167080"/>
+            <a:ext cx="1588" cy="153888"/>
+          </a:xfrm>
+          <a:prstGeom prst="rect">
+            <a:avLst/>
+          </a:prstGeom>
+          <a:noFill/>
+        </p:spPr>
+        <p:txBody>
+          <a:bodyPr vert="horz" wrap="square" lIns="0" tIns="0" rIns="0" bIns="0" rtlCol="0" anchor="ctr" anchorCtr="0">
+            <a:spAutoFit/>
+          </a:bodyPr>
+          <a:lstStyle/>
+          <a:p>
+            <a:pPr algn="ctr"/>
+            <a:endParaRPr lang="zh-CN" altLang="en-US" sz="1000">
+              <a:solidFill>
+                <a:schemeClr val="accent2"/>
+              </a:solidFill>
+              <a:latin typeface="Calibri"/>
+            </a:endParaRPr>
+          </a:p>
+        </p:txBody>
+      </p:sp>
+      <p:sp>
+        <p:nvSpPr>
+          <p:cNvPr id="769" name="OTLSHAPE_T_9ac8d18186e74035a2730a3a6e774ee6_StartDate" hidden="1"/>
+          <p:cNvSpPr txBox="1"/>
+          <p:nvPr>
+            <p:custDataLst>
+              <p:tags r:id="rId38"/>
+            </p:custDataLst>
+          </p:nvPr>
+        </p:nvSpPr>
+        <p:spPr>
+          <a:xfrm>
+            <a:off x="0" y="5167080"/>
+            <a:ext cx="1588" cy="153888"/>
+          </a:xfrm>
+          <a:prstGeom prst="rect">
+            <a:avLst/>
+          </a:prstGeom>
+          <a:noFill/>
+        </p:spPr>
+        <p:txBody>
+          <a:bodyPr vert="horz" wrap="square" lIns="0" tIns="0" rIns="0" bIns="0" rtlCol="0" anchor="ctr" anchorCtr="0">
+            <a:spAutoFit/>
+          </a:bodyPr>
+          <a:lstStyle/>
+          <a:p>
+            <a:pPr algn="ctr"/>
+            <a:endParaRPr lang="zh-CN" altLang="en-US" sz="1000">
+              <a:solidFill>
+                <a:srgbClr val="1F497E"/>
+              </a:solidFill>
+              <a:latin typeface="Calibri"/>
+            </a:endParaRPr>
+          </a:p>
+        </p:txBody>
+      </p:sp>
+      <p:sp>
+        <p:nvSpPr>
+          <p:cNvPr id="770" name="OTLSHAPE_T_9ac8d18186e74035a2730a3a6e774ee6_EndDate" hidden="1"/>
+          <p:cNvSpPr txBox="1"/>
+          <p:nvPr>
+            <p:custDataLst>
+              <p:tags r:id="rId39"/>
+            </p:custDataLst>
+          </p:nvPr>
+        </p:nvSpPr>
+        <p:spPr>
+          <a:xfrm>
+            <a:off x="0" y="5167080"/>
+            <a:ext cx="1588" cy="153888"/>
+          </a:xfrm>
+          <a:prstGeom prst="rect">
+            <a:avLst/>
+          </a:prstGeom>
+          <a:noFill/>
+        </p:spPr>
+        <p:txBody>
+          <a:bodyPr vert="horz" wrap="square" lIns="0" tIns="0" rIns="0" bIns="0" rtlCol="0" anchor="ctr" anchorCtr="0">
+            <a:spAutoFit/>
+          </a:bodyPr>
+          <a:lstStyle/>
+          <a:p>
+            <a:pPr algn="ctr"/>
+            <a:endParaRPr lang="zh-CN" altLang="en-US" sz="1000">
+              <a:solidFill>
+                <a:srgbClr val="1F497E"/>
+              </a:solidFill>
+              <a:latin typeface="Calibri"/>
+            </a:endParaRPr>
+          </a:p>
+        </p:txBody>
+      </p:sp>
+      <p:sp>
+        <p:nvSpPr>
+          <p:cNvPr id="774" name="OTLSHAPE_T_e1ab46e8d17045f9946a8af8892c50f8_ShapePercentage" hidden="1"/>
+          <p:cNvSpPr/>
+          <p:nvPr>
+            <p:custDataLst>
+              <p:tags r:id="rId40"/>
+            </p:custDataLst>
+          </p:nvPr>
+        </p:nvSpPr>
+        <p:spPr>
+          <a:xfrm>
+            <a:off x="4810339" y="5278755"/>
+            <a:ext cx="0" cy="0"/>
+          </a:xfrm>
+          <a:prstGeom prst="rect">
+            <a:avLst/>
+          </a:prstGeom>
+        </p:spPr>
+        <p:style>
+          <a:lnRef idx="2">
+            <a:schemeClr val="accent1">
+              <a:shade val="50000"/>
+            </a:schemeClr>
+          </a:lnRef>
+          <a:fillRef idx="1">
+            <a:schemeClr val="accent1"/>
+          </a:fillRef>
+          <a:effectRef idx="0">
+            <a:schemeClr val="accent1"/>
+          </a:effectRef>
+          <a:fontRef idx="minor">
+            <a:schemeClr val="lt1"/>
+          </a:fontRef>
+        </p:style>
+        <p:txBody>
+          <a:bodyPr rtlCol="0" anchor="ctr"/>
+          <a:lstStyle/>
+          <a:p>
+            <a:pPr algn="ctr"/>
+            <a:endParaRPr lang="zh-CN" altLang="en-US"/>
+          </a:p>
+        </p:txBody>
+      </p:sp>
+      <p:sp>
+        <p:nvSpPr>
+          <p:cNvPr id="775" name="OTLSHAPE_T_e1ab46e8d17045f9946a8af8892c50f8_Duration" hidden="1"/>
+          <p:cNvSpPr txBox="1"/>
+          <p:nvPr>
+            <p:custDataLst>
+              <p:tags r:id="rId41"/>
+            </p:custDataLst>
+          </p:nvPr>
+        </p:nvSpPr>
+        <p:spPr>
+          <a:xfrm>
+            <a:off x="0" y="5278755"/>
+            <a:ext cx="457200" cy="155025"/>
+          </a:xfrm>
+          <a:prstGeom prst="rect">
+            <a:avLst/>
+          </a:prstGeom>
+          <a:noFill/>
+        </p:spPr>
+        <p:txBody>
+          <a:bodyPr vert="horz" wrap="square" lIns="0" tIns="0" rIns="0" bIns="0" rtlCol="0" anchor="ctr" anchorCtr="0">
+            <a:spAutoFit/>
+          </a:bodyPr>
+          <a:lstStyle/>
+          <a:p>
+            <a:pPr algn="ctr"/>
+            <a:r>
+              <a:rPr lang="en-US" altLang="zh-CN" sz="1000" smtClean="0">
+                <a:solidFill>
+                  <a:schemeClr val="accent2"/>
+                </a:solidFill>
+                <a:latin typeface="Calibri"/>
+              </a:rPr>
+              <a:t>184 days</a:t>
+            </a:r>
+            <a:endParaRPr lang="zh-CN" altLang="en-US" sz="1000">
+              <a:solidFill>
+                <a:schemeClr val="accent2"/>
+              </a:solidFill>
+              <a:latin typeface="Calibri"/>
+            </a:endParaRPr>
+          </a:p>
+        </p:txBody>
+      </p:sp>
+      <p:sp>
+        <p:nvSpPr>
+          <p:cNvPr id="776" name="OTLSHAPE_T_e1ab46e8d17045f9946a8af8892c50f8_TextPercentage" hidden="1"/>
+          <p:cNvSpPr txBox="1"/>
+          <p:nvPr>
+            <p:custDataLst>
+              <p:tags r:id="rId42"/>
+            </p:custDataLst>
+          </p:nvPr>
+        </p:nvSpPr>
+        <p:spPr>
+          <a:xfrm>
+            <a:off x="0" y="5433780"/>
+            <a:ext cx="1588" cy="153888"/>
+          </a:xfrm>
+          <a:prstGeom prst="rect">
+            <a:avLst/>
+          </a:prstGeom>
+          <a:noFill/>
+        </p:spPr>
+        <p:txBody>
+          <a:bodyPr vert="horz" wrap="square" lIns="0" tIns="0" rIns="0" bIns="0" rtlCol="0" anchor="ctr" anchorCtr="0">
+            <a:spAutoFit/>
+          </a:bodyPr>
+          <a:lstStyle/>
+          <a:p>
+            <a:pPr algn="ctr"/>
+            <a:endParaRPr lang="zh-CN" altLang="en-US" sz="1000">
+              <a:solidFill>
+                <a:schemeClr val="accent2"/>
+              </a:solidFill>
+              <a:latin typeface="Calibri"/>
+            </a:endParaRPr>
+          </a:p>
+        </p:txBody>
+      </p:sp>
+      <p:sp>
+        <p:nvSpPr>
+          <p:cNvPr id="777" name="OTLSHAPE_T_e1ab46e8d17045f9946a8af8892c50f8_StartDate" hidden="1"/>
+          <p:cNvSpPr txBox="1"/>
+          <p:nvPr>
+            <p:custDataLst>
+              <p:tags r:id="rId43"/>
+            </p:custDataLst>
+          </p:nvPr>
+        </p:nvSpPr>
+        <p:spPr>
+          <a:xfrm>
+            <a:off x="0" y="5433780"/>
+            <a:ext cx="1588" cy="153888"/>
+          </a:xfrm>
+          <a:prstGeom prst="rect">
+            <a:avLst/>
+          </a:prstGeom>
+          <a:noFill/>
+        </p:spPr>
+        <p:txBody>
+          <a:bodyPr vert="horz" wrap="square" lIns="0" tIns="0" rIns="0" bIns="0" rtlCol="0" anchor="ctr" anchorCtr="0">
+            <a:spAutoFit/>
+          </a:bodyPr>
+          <a:lstStyle/>
+          <a:p>
+            <a:pPr algn="ctr"/>
+            <a:endParaRPr lang="zh-CN" altLang="en-US" sz="1000">
+              <a:solidFill>
+                <a:srgbClr val="1F497E"/>
+              </a:solidFill>
+              <a:latin typeface="Calibri"/>
+            </a:endParaRPr>
+          </a:p>
+        </p:txBody>
+      </p:sp>
+      <p:sp>
+        <p:nvSpPr>
+          <p:cNvPr id="778" name="OTLSHAPE_T_e1ab46e8d17045f9946a8af8892c50f8_EndDate" hidden="1"/>
+          <p:cNvSpPr txBox="1"/>
+          <p:nvPr>
+            <p:custDataLst>
+              <p:tags r:id="rId44"/>
+            </p:custDataLst>
+          </p:nvPr>
+        </p:nvSpPr>
+        <p:spPr>
+          <a:xfrm>
+            <a:off x="0" y="5433780"/>
+            <a:ext cx="1588" cy="153888"/>
+          </a:xfrm>
+          <a:prstGeom prst="rect">
+            <a:avLst/>
+          </a:prstGeom>
+          <a:noFill/>
+        </p:spPr>
+        <p:txBody>
+          <a:bodyPr vert="horz" wrap="square" lIns="0" tIns="0" rIns="0" bIns="0" rtlCol="0" anchor="ctr" anchorCtr="0">
+            <a:spAutoFit/>
+          </a:bodyPr>
+          <a:lstStyle/>
+          <a:p>
+            <a:pPr algn="ctr"/>
+            <a:endParaRPr lang="zh-CN" altLang="en-US" sz="1000">
+              <a:solidFill>
+                <a:srgbClr val="1F497E"/>
+              </a:solidFill>
+              <a:latin typeface="Calibri"/>
+            </a:endParaRPr>
+          </a:p>
+        </p:txBody>
+      </p:sp>
+      <p:grpSp>
+        <p:nvGrpSpPr>
+          <p:cNvPr id="801" name="组合 800"/>
+          <p:cNvGrpSpPr/>
+          <p:nvPr/>
+        </p:nvGrpSpPr>
+        <p:grpSpPr>
+          <a:xfrm>
+            <a:off x="126999" y="3048000"/>
+            <a:ext cx="8096166" cy="2440078"/>
+            <a:chOff x="126999" y="3048000"/>
+            <a:chExt cx="8096166" cy="2440078"/>
+          </a:xfrm>
+        </p:grpSpPr>
+        <p:cxnSp>
+          <p:nvCxnSpPr>
+            <p:cNvPr id="720" name="OTLSHAPE_T_e1ab46e8d17045f9946a8af8892c50f8_HorizontalConnector1"/>
+            <p:cNvCxnSpPr>
+              <a:stCxn id="780" idx="3"/>
+            </p:cNvCxnSpPr>
+            <p:nvPr>
+              <p:custDataLst>
+                <p:tags r:id="rId53"/>
+              </p:custDataLst>
+            </p:nvPr>
+          </p:nvCxnSpPr>
+          <p:spPr>
+            <a:xfrm flipV="1">
+              <a:off x="1330568" y="5380355"/>
+              <a:ext cx="3479770" cy="1"/>
+            </a:xfrm>
+            <a:prstGeom prst="line">
+              <a:avLst/>
+            </a:prstGeom>
+            <a:ln w="9525" cap="flat" cmpd="sng" algn="ctr">
+              <a:solidFill>
+                <a:srgbClr val="CCCCCC"/>
+              </a:solidFill>
+              <a:prstDash val="solid"/>
+              <a:round/>
+              <a:headEnd type="none" w="med" len="med"/>
+              <a:tailEnd type="none" w="med" len="med"/>
+            </a:ln>
+          </p:spPr>
+          <p:style>
+            <a:lnRef idx="1">
+              <a:schemeClr val="accent1"/>
+            </a:lnRef>
+            <a:fillRef idx="0">
+              <a:schemeClr val="accent1"/>
+            </a:fillRef>
+            <a:effectRef idx="0">
+              <a:schemeClr val="accent1"/>
+            </a:effectRef>
+            <a:fontRef idx="minor">
+              <a:schemeClr val="tx1"/>
+            </a:fontRef>
+          </p:style>
+        </p:cxnSp>
+        <p:cxnSp>
+          <p:nvCxnSpPr>
+            <p:cNvPr id="719" name="OTLSHAPE_T_9ac8d18186e74035a2730a3a6e774ee6_HorizontalConnector1"/>
+            <p:cNvCxnSpPr/>
+            <p:nvPr>
+              <p:custDataLst>
+                <p:tags r:id="rId54"/>
+              </p:custDataLst>
+            </p:nvPr>
+          </p:nvCxnSpPr>
+          <p:spPr>
+            <a:xfrm>
+              <a:off x="1136700" y="5113655"/>
+              <a:ext cx="2704395" cy="0"/>
+            </a:xfrm>
+            <a:prstGeom prst="line">
+              <a:avLst/>
+            </a:prstGeom>
+            <a:ln w="9525" cap="flat" cmpd="sng" algn="ctr">
+              <a:solidFill>
+                <a:srgbClr val="CCCCCC"/>
+              </a:solidFill>
+              <a:prstDash val="solid"/>
+              <a:round/>
+              <a:headEnd type="none" w="med" len="med"/>
+              <a:tailEnd type="none" w="med" len="med"/>
+            </a:ln>
+          </p:spPr>
+          <p:style>
+            <a:lnRef idx="1">
+              <a:schemeClr val="accent1"/>
+            </a:lnRef>
+            <a:fillRef idx="0">
+              <a:schemeClr val="accent1"/>
+            </a:fillRef>
+            <a:effectRef idx="0">
+              <a:schemeClr val="accent1"/>
+            </a:effectRef>
+            <a:fontRef idx="minor">
+              <a:schemeClr val="tx1"/>
+            </a:fontRef>
+          </p:style>
+        </p:cxnSp>
+        <p:cxnSp>
+          <p:nvCxnSpPr>
+            <p:cNvPr id="718" name="OTLSHAPE_T_0862fbcce6f74c47b96391573e00609d_HorizontalConnector1"/>
+            <p:cNvCxnSpPr/>
+            <p:nvPr>
+              <p:custDataLst>
+                <p:tags r:id="rId55"/>
+              </p:custDataLst>
+            </p:nvPr>
+          </p:nvCxnSpPr>
+          <p:spPr>
+            <a:xfrm flipV="1">
+              <a:off x="724281" y="4846955"/>
+              <a:ext cx="2624248" cy="1"/>
+            </a:xfrm>
+            <a:prstGeom prst="line">
+              <a:avLst/>
+            </a:prstGeom>
+            <a:ln w="9525" cap="flat" cmpd="sng" algn="ctr">
+              <a:solidFill>
+                <a:srgbClr val="CCCCCC"/>
+              </a:solidFill>
+              <a:prstDash val="solid"/>
+              <a:round/>
+              <a:headEnd type="none" w="med" len="med"/>
+              <a:tailEnd type="none" w="med" len="med"/>
+            </a:ln>
+          </p:spPr>
+          <p:style>
+            <a:lnRef idx="1">
+              <a:schemeClr val="accent1"/>
+            </a:lnRef>
+            <a:fillRef idx="0">
+              <a:schemeClr val="accent1"/>
+            </a:fillRef>
+            <a:effectRef idx="0">
+              <a:schemeClr val="accent1"/>
+            </a:effectRef>
+            <a:fontRef idx="minor">
+              <a:schemeClr val="tx1"/>
+            </a:fontRef>
+          </p:style>
+        </p:cxnSp>
+        <p:cxnSp>
+          <p:nvCxnSpPr>
+            <p:cNvPr id="717" name="OTLSHAPE_T_77eb22e7cd0b4dc299a4200d7b7f12eb_HorizontalConnector1"/>
+            <p:cNvCxnSpPr/>
+            <p:nvPr>
+              <p:custDataLst>
+                <p:tags r:id="rId56"/>
+              </p:custDataLst>
+            </p:nvPr>
+          </p:nvCxnSpPr>
+          <p:spPr>
+            <a:xfrm flipV="1">
+              <a:off x="724281" y="4580255"/>
+              <a:ext cx="1178328" cy="1"/>
+            </a:xfrm>
+            <a:prstGeom prst="line">
+              <a:avLst/>
+            </a:prstGeom>
+            <a:ln w="9525" cap="flat" cmpd="sng" algn="ctr">
+              <a:solidFill>
+                <a:srgbClr val="CCCCCC"/>
+              </a:solidFill>
+              <a:prstDash val="solid"/>
+              <a:round/>
+              <a:headEnd type="none" w="med" len="med"/>
+              <a:tailEnd type="none" w="med" len="med"/>
+            </a:ln>
+          </p:spPr>
+          <p:style>
+            <a:lnRef idx="1">
+              <a:schemeClr val="accent1"/>
+            </a:lnRef>
+            <a:fillRef idx="0">
+              <a:schemeClr val="accent1"/>
+            </a:fillRef>
+            <a:effectRef idx="0">
+              <a:schemeClr val="accent1"/>
+            </a:effectRef>
+            <a:fontRef idx="minor">
+              <a:schemeClr val="tx1"/>
+            </a:fontRef>
+          </p:style>
+        </p:cxnSp>
+        <p:cxnSp>
+          <p:nvCxnSpPr>
+            <p:cNvPr id="716" name="OTLSHAPE_T_235e46f474164d06a05367a49d5026a8_HorizontalConnector1"/>
+            <p:cNvCxnSpPr>
+              <a:stCxn id="748" idx="3"/>
+            </p:cNvCxnSpPr>
+            <p:nvPr>
+              <p:custDataLst>
+                <p:tags r:id="rId57"/>
+              </p:custDataLst>
+            </p:nvPr>
+          </p:nvCxnSpPr>
+          <p:spPr>
+            <a:xfrm flipV="1">
+              <a:off x="669712" y="4313555"/>
+              <a:ext cx="756220" cy="1"/>
+            </a:xfrm>
+            <a:prstGeom prst="line">
+              <a:avLst/>
+            </a:prstGeom>
+            <a:ln w="9525" cap="flat" cmpd="sng" algn="ctr">
+              <a:solidFill>
+                <a:srgbClr val="CCCCCC"/>
+              </a:solidFill>
+              <a:prstDash val="solid"/>
+              <a:round/>
+              <a:headEnd type="none" w="med" len="med"/>
+              <a:tailEnd type="none" w="med" len="med"/>
+            </a:ln>
+          </p:spPr>
+          <p:style>
+            <a:lnRef idx="1">
+              <a:schemeClr val="accent1"/>
+            </a:lnRef>
+            <a:fillRef idx="0">
+              <a:schemeClr val="accent1"/>
+            </a:fillRef>
+            <a:effectRef idx="0">
+              <a:schemeClr val="accent1"/>
+            </a:effectRef>
+            <a:fontRef idx="minor">
+              <a:schemeClr val="tx1"/>
+            </a:fontRef>
+          </p:style>
+        </p:cxnSp>
+        <p:cxnSp>
+          <p:nvCxnSpPr>
+            <p:cNvPr id="715" name="OTLSHAPE_T_af8aba6694844f26b92929dd16af13bb_HorizontalConnector1"/>
+            <p:cNvCxnSpPr>
+              <a:stCxn id="740" idx="3"/>
+            </p:cNvCxnSpPr>
+            <p:nvPr>
+              <p:custDataLst>
+                <p:tags r:id="rId58"/>
+              </p:custDataLst>
+            </p:nvPr>
+          </p:nvCxnSpPr>
+          <p:spPr>
+            <a:xfrm flipV="1">
+              <a:off x="669712" y="4046855"/>
+              <a:ext cx="263653" cy="1"/>
+            </a:xfrm>
+            <a:prstGeom prst="line">
+              <a:avLst/>
+            </a:prstGeom>
+            <a:ln w="9525" cap="flat" cmpd="sng" algn="ctr">
+              <a:solidFill>
+                <a:srgbClr val="CCCCCC"/>
+              </a:solidFill>
+              <a:prstDash val="solid"/>
+              <a:round/>
+              <a:headEnd type="none" w="med" len="med"/>
+              <a:tailEnd type="none" w="med" len="med"/>
+            </a:ln>
+          </p:spPr>
+          <p:style>
+            <a:lnRef idx="1">
+              <a:schemeClr val="accent1"/>
+            </a:lnRef>
+            <a:fillRef idx="0">
+              <a:schemeClr val="accent1"/>
+            </a:fillRef>
+            <a:effectRef idx="0">
+              <a:schemeClr val="accent1"/>
+            </a:effectRef>
+            <a:fontRef idx="minor">
+              <a:schemeClr val="tx1"/>
+            </a:fontRef>
+          </p:style>
+        </p:cxnSp>
+        <p:sp>
+          <p:nvSpPr>
+            <p:cNvPr id="692" name="OTLSHAPE_TB_00000000000000000000000000000000_ScaleContainer"/>
+            <p:cNvSpPr/>
+            <p:nvPr>
+              <p:custDataLst>
+                <p:tags r:id="rId59"/>
+              </p:custDataLst>
+            </p:nvPr>
+          </p:nvSpPr>
+          <p:spPr>
+            <a:xfrm>
+              <a:off x="933365" y="3048000"/>
+              <a:ext cx="7289800" cy="381000"/>
+            </a:xfrm>
+            <a:prstGeom prst="rect">
+              <a:avLst/>
+            </a:prstGeom>
+            <a:gradFill flip="none" rotWithShape="1">
+              <a:gsLst>
+                <a:gs pos="0">
+                  <a:srgbClr val="500E7D"/>
+                </a:gs>
+                <a:gs pos="0">
+                  <a:srgbClr val="500E7D"/>
+                </a:gs>
+              </a:gsLst>
+              <a:lin ang="5400000" scaled="1"/>
+              <a:tileRect/>
+            </a:gradFill>
+            <a:ln w="25400" cap="flat" cmpd="sng" algn="ctr">
+              <a:noFill/>
+              <a:prstDash val="solid"/>
+            </a:ln>
+            <a:effectLst>
+              <a:reflection blurRad="6350" stA="50000" endA="300" endPos="55500" dist="50800" dir="5400000" sy="-100000" algn="bl" rotWithShape="0"/>
+            </a:effectLst>
+            <a:scene3d>
+              <a:camera prst="orthographicFront"/>
+              <a:lightRig rig="threePt" dir="t">
+                <a:rot lat="0" lon="0" rev="8700000"/>
+              </a:lightRig>
+            </a:scene3d>
+            <a:sp3d>
+              <a:bevelT w="165100" h="19050"/>
+            </a:sp3d>
+            <a:extLst>
+              <a:ext uri="{91240B29-F687-4F45-9708-019B960494DF}">
+                <a14:hiddenLine xmlns:a14="http://schemas.microsoft.com/office/drawing/2010/main" w="25400" cap="flat" cmpd="sng" algn="ctr">
+                  <a:solidFill>
+                    <a:schemeClr val="accent1">
+                      <a:shade val="50000"/>
+                    </a:schemeClr>
+                  </a:solidFill>
+                  <a:prstDash val="solid"/>
+                </a14:hiddenLine>
+              </a:ext>
+            </a:extLst>
+          </p:spPr>
+          <p:style>
+            <a:lnRef idx="2">
+              <a:schemeClr val="accent1">
+                <a:shade val="50000"/>
+              </a:schemeClr>
+            </a:lnRef>
+            <a:fillRef idx="1">
+              <a:schemeClr val="accent1"/>
+            </a:fillRef>
+            <a:effectRef idx="0">
+              <a:schemeClr val="accent1"/>
+            </a:effectRef>
+            <a:fontRef idx="minor">
+              <a:schemeClr val="lt1"/>
+            </a:fontRef>
+          </p:style>
+          <p:txBody>
+            <a:bodyPr rtlCol="0" anchor="ctr"/>
+            <a:lstStyle/>
+            <a:p>
+              <a:pPr algn="ctr"/>
+              <a:endParaRPr lang="zh-CN" altLang="en-US" sz="1400"/>
+            </a:p>
+          </p:txBody>
+        </p:sp>
+        <p:sp>
+          <p:nvSpPr>
+            <p:cNvPr id="693" name="OTLSHAPE_TB_00000000000000000000000000000000_ElapsedTime"/>
+            <p:cNvSpPr/>
+            <p:nvPr>
+              <p:custDataLst>
+                <p:tags r:id="rId60"/>
+              </p:custDataLst>
+            </p:nvPr>
+          </p:nvSpPr>
+          <p:spPr>
+            <a:xfrm>
+              <a:off x="933365" y="3352800"/>
+              <a:ext cx="952500" cy="76200"/>
+            </a:xfrm>
+            <a:prstGeom prst="rect">
+              <a:avLst/>
+            </a:prstGeom>
+            <a:solidFill>
+              <a:srgbClr val="FF0000">
+                <a:alpha val="74902"/>
+              </a:srgbClr>
+            </a:solidFill>
+            <a:ln w="25400" cap="flat" cmpd="sng" algn="ctr">
+              <a:noFill/>
+              <a:prstDash val="solid"/>
+            </a:ln>
+            <a:effectLst/>
+            <a:scene3d>
+              <a:camera prst="orthographicFront"/>
+              <a:lightRig rig="threePt" dir="t">
+                <a:rot lat="0" lon="0" rev="0"/>
+              </a:lightRig>
+            </a:scene3d>
+            <a:sp3d>
+              <a:bevelT w="12700" h="139700"/>
+            </a:sp3d>
+            <a:extLst>
+              <a:ext uri="{91240B29-F687-4F45-9708-019B960494DF}">
+                <a14:hiddenLine xmlns:a14="http://schemas.microsoft.com/office/drawing/2010/main" w="25400" cap="flat" cmpd="sng" algn="ctr">
+                  <a:solidFill>
+                    <a:schemeClr val="accent1">
+                      <a:shade val="50000"/>
+                    </a:schemeClr>
+                  </a:solidFill>
+                  <a:prstDash val="solid"/>
+                </a14:hiddenLine>
+              </a:ext>
+            </a:extLst>
+          </p:spPr>
+          <p:style>
+            <a:lnRef idx="2">
+              <a:schemeClr val="accent1">
+                <a:shade val="50000"/>
+              </a:schemeClr>
+            </a:lnRef>
+            <a:fillRef idx="1">
+              <a:schemeClr val="accent1"/>
+            </a:fillRef>
+            <a:effectRef idx="0">
+              <a:schemeClr val="accent1"/>
+            </a:effectRef>
+            <a:fontRef idx="minor">
+              <a:schemeClr val="lt1"/>
+            </a:fontRef>
+          </p:style>
+          <p:txBody>
+            <a:bodyPr rtlCol="0" anchor="ctr"/>
+            <a:lstStyle/>
+            <a:p>
+              <a:pPr algn="ctr"/>
+              <a:endParaRPr lang="zh-CN" altLang="en-US" sz="1400"/>
+            </a:p>
+          </p:txBody>
+        </p:sp>
+        <p:sp>
+          <p:nvSpPr>
+            <p:cNvPr id="694" name="OTLSHAPE_TB_00000000000000000000000000000000_TodayMarkerShape"/>
+            <p:cNvSpPr/>
+            <p:nvPr>
+              <p:custDataLst>
+                <p:tags r:id="rId61"/>
+              </p:custDataLst>
+            </p:nvPr>
+          </p:nvSpPr>
+          <p:spPr>
+            <a:xfrm>
+              <a:off x="1829878" y="3429000"/>
+              <a:ext cx="114300" cy="127000"/>
+            </a:xfrm>
+            <a:prstGeom prst="triangle">
+              <a:avLst/>
+            </a:prstGeom>
+            <a:solidFill>
+              <a:srgbClr val="FF0000"/>
+            </a:solidFill>
+            <a:ln w="25400" cap="flat" cmpd="sng" algn="ctr">
+              <a:noFill/>
+              <a:prstDash val="solid"/>
+            </a:ln>
+            <a:effectLst>
+              <a:outerShdw>
+                <a:scrgbClr r="0" g="0" b="0">
+                  <a:alpha val="50000"/>
+                </a:scrgbClr>
+              </a:outerShdw>
+            </a:effectLst>
+            <a:extLst>
+              <a:ext uri="{91240B29-F687-4F45-9708-019B960494DF}">
+                <a14:hiddenLine xmlns:a14="http://schemas.microsoft.com/office/drawing/2010/main" w="25400" cap="flat" cmpd="sng" algn="ctr">
+                  <a:solidFill>
+                    <a:schemeClr val="accent1">
+                      <a:shade val="50000"/>
+                    </a:schemeClr>
+                  </a:solidFill>
+                  <a:prstDash val="solid"/>
+                </a14:hiddenLine>
+              </a:ext>
+              <a:ext uri="{53640926-AAD7-44D8-BBD7-CCE9431645EC}">
+                <a14:shadowObscured xmlns:a14="http://schemas.microsoft.com/office/drawing/2010/main" val="1"/>
+              </a:ext>
+            </a:extLst>
+          </p:spPr>
+          <p:style>
+            <a:lnRef idx="2">
+              <a:schemeClr val="accent1">
+                <a:shade val="50000"/>
+              </a:schemeClr>
+            </a:lnRef>
+            <a:fillRef idx="1">
+              <a:schemeClr val="accent1"/>
+            </a:fillRef>
+            <a:effectRef idx="0">
+              <a:schemeClr val="accent1"/>
+            </a:effectRef>
+            <a:fontRef idx="minor">
+              <a:schemeClr val="lt1"/>
+            </a:fontRef>
+          </p:style>
+          <p:txBody>
+            <a:bodyPr rtlCol="0" anchor="ctr"/>
+            <a:lstStyle/>
+            <a:p>
+              <a:pPr algn="ctr"/>
+              <a:endParaRPr lang="zh-CN" altLang="en-US" sz="1400"/>
+            </a:p>
+          </p:txBody>
+        </p:sp>
+        <p:sp>
+          <p:nvSpPr>
+            <p:cNvPr id="695" name="OTLSHAPE_TB_00000000000000000000000000000000_TodayMarkerText"/>
+            <p:cNvSpPr txBox="1"/>
+            <p:nvPr>
+              <p:custDataLst>
+                <p:tags r:id="rId62"/>
+              </p:custDataLst>
+            </p:nvPr>
+          </p:nvSpPr>
+          <p:spPr>
+            <a:xfrm>
+              <a:off x="1653648" y="3541305"/>
+              <a:ext cx="469360" cy="215444"/>
+            </a:xfrm>
+            <a:prstGeom prst="rect">
+              <a:avLst/>
+            </a:prstGeom>
+            <a:noFill/>
+          </p:spPr>
+          <p:txBody>
+            <a:bodyPr vert="horz" wrap="none" lIns="0" tIns="0" rIns="0" bIns="0" rtlCol="0" anchor="ctr" anchorCtr="0">
+              <a:spAutoFit/>
+            </a:bodyPr>
+            <a:lstStyle/>
+            <a:p>
+              <a:pPr algn="ctr"/>
+              <a:r>
+                <a:rPr lang="en-US" altLang="zh-CN" sz="1400" spc="-12" smtClean="0">
+                  <a:solidFill>
+                    <a:schemeClr val="dk1"/>
+                  </a:solidFill>
+                </a:rPr>
+                <a:t>Today</a:t>
+              </a:r>
+              <a:endParaRPr lang="zh-CN" altLang="en-US" sz="1400" spc="-12">
+                <a:solidFill>
+                  <a:schemeClr val="dk1"/>
+                </a:solidFill>
+              </a:endParaRPr>
+            </a:p>
+          </p:txBody>
+        </p:sp>
+        <p:sp>
+          <p:nvSpPr>
+            <p:cNvPr id="696" name="OTLSHAPE_TB_00000000000000000000000000000000_TimescaleInterval1"/>
+            <p:cNvSpPr txBox="1"/>
+            <p:nvPr>
+              <p:custDataLst>
+                <p:tags r:id="rId63"/>
+              </p:custDataLst>
+            </p:nvPr>
+          </p:nvSpPr>
+          <p:spPr>
+            <a:xfrm>
+              <a:off x="996865" y="3145473"/>
+              <a:ext cx="182742" cy="186055"/>
+            </a:xfrm>
+            <a:prstGeom prst="rect">
+              <a:avLst/>
+            </a:prstGeom>
+            <a:noFill/>
+          </p:spPr>
+          <p:txBody>
+            <a:bodyPr vert="horz" wrap="none" lIns="0" tIns="0" rIns="0" bIns="0" rtlCol="0" anchor="ctr" anchorCtr="0">
+              <a:noAutofit/>
+            </a:bodyPr>
+            <a:lstStyle/>
+            <a:p>
+              <a:r>
+                <a:rPr lang="en-US" altLang="zh-CN" sz="1400" spc="-26" smtClean="0">
+                  <a:solidFill>
+                    <a:schemeClr val="lt1"/>
+                  </a:solidFill>
+                </a:rPr>
+                <a:t>Q4</a:t>
+              </a:r>
+              <a:endParaRPr lang="zh-CN" altLang="en-US" sz="1400" spc="-26">
+                <a:solidFill>
+                  <a:schemeClr val="lt1"/>
+                </a:solidFill>
+              </a:endParaRPr>
+            </a:p>
+          </p:txBody>
+        </p:sp>
+        <p:cxnSp>
+          <p:nvCxnSpPr>
+            <p:cNvPr id="697" name="OTLSHAPE_TB_00000000000000000000000000000000_Separator1"/>
+            <p:cNvCxnSpPr/>
+            <p:nvPr>
+              <p:custDataLst>
+                <p:tags r:id="rId64"/>
+              </p:custDataLst>
+            </p:nvPr>
+          </p:nvCxnSpPr>
+          <p:spPr>
+            <a:xfrm>
+              <a:off x="2395175" y="3136900"/>
+              <a:ext cx="0" cy="203200"/>
+            </a:xfrm>
+            <a:prstGeom prst="line">
+              <a:avLst/>
+            </a:prstGeom>
+            <a:ln w="9525" cap="flat" cmpd="sng" algn="ctr">
+              <a:solidFill>
+                <a:schemeClr val="lt1">
+                  <a:alpha val="29804"/>
+                </a:schemeClr>
+              </a:solidFill>
+              <a:prstDash val="solid"/>
+              <a:round/>
+              <a:headEnd type="none" w="med" len="med"/>
+              <a:tailEnd type="none" w="med" len="med"/>
+            </a:ln>
+          </p:spPr>
+          <p:style>
+            <a:lnRef idx="1">
+              <a:schemeClr val="accent1"/>
+            </a:lnRef>
+            <a:fillRef idx="0">
+              <a:schemeClr val="accent1"/>
+            </a:fillRef>
+            <a:effectRef idx="0">
+              <a:schemeClr val="accent1"/>
+            </a:effectRef>
+            <a:fontRef idx="minor">
+              <a:schemeClr val="tx1"/>
+            </a:fontRef>
+          </p:style>
+        </p:cxnSp>
+        <p:sp>
+          <p:nvSpPr>
+            <p:cNvPr id="698" name="OTLSHAPE_TB_00000000000000000000000000000000_TimescaleInterval2"/>
+            <p:cNvSpPr txBox="1"/>
+            <p:nvPr>
+              <p:custDataLst>
+                <p:tags r:id="rId65"/>
+              </p:custDataLst>
+            </p:nvPr>
+          </p:nvSpPr>
+          <p:spPr>
+            <a:xfrm>
+              <a:off x="2458675" y="3111500"/>
+              <a:ext cx="301878" cy="254000"/>
+            </a:xfrm>
+            <a:prstGeom prst="rect">
+              <a:avLst/>
+            </a:prstGeom>
+            <a:noFill/>
+          </p:spPr>
+          <p:txBody>
+            <a:bodyPr vert="horz" wrap="none" lIns="0" tIns="0" rIns="0" bIns="0" rtlCol="0" anchor="ctr" anchorCtr="0">
+              <a:noAutofit/>
+            </a:bodyPr>
+            <a:lstStyle/>
+            <a:p>
+              <a:r>
+                <a:rPr lang="en-US" altLang="zh-CN" sz="1400" spc="-26" smtClean="0">
+                  <a:solidFill>
+                    <a:schemeClr val="lt1"/>
+                  </a:solidFill>
+                </a:rPr>
+                <a:t>Q1
+2016</a:t>
+              </a:r>
+              <a:endParaRPr lang="zh-CN" altLang="en-US" sz="1400" spc="-26">
+                <a:solidFill>
+                  <a:schemeClr val="lt1"/>
+                </a:solidFill>
+              </a:endParaRPr>
+            </a:p>
+          </p:txBody>
+        </p:sp>
+        <p:cxnSp>
+          <p:nvCxnSpPr>
+            <p:cNvPr id="699" name="OTLSHAPE_TB_00000000000000000000000000000000_Separator2"/>
+            <p:cNvCxnSpPr/>
+            <p:nvPr>
+              <p:custDataLst>
+                <p:tags r:id="rId66"/>
+              </p:custDataLst>
+            </p:nvPr>
+          </p:nvCxnSpPr>
+          <p:spPr>
+            <a:xfrm>
+              <a:off x="3841095" y="3136900"/>
+              <a:ext cx="0" cy="203200"/>
+            </a:xfrm>
+            <a:prstGeom prst="line">
+              <a:avLst/>
+            </a:prstGeom>
+            <a:ln w="9525" cap="flat" cmpd="sng" algn="ctr">
+              <a:solidFill>
+                <a:schemeClr val="lt1">
+                  <a:alpha val="29804"/>
+                </a:schemeClr>
+              </a:solidFill>
+              <a:prstDash val="solid"/>
+              <a:round/>
+              <a:headEnd type="none" w="med" len="med"/>
+              <a:tailEnd type="none" w="med" len="med"/>
+            </a:ln>
+          </p:spPr>
+          <p:style>
+            <a:lnRef idx="1">
+              <a:schemeClr val="accent1"/>
+            </a:lnRef>
+            <a:fillRef idx="0">
+              <a:schemeClr val="accent1"/>
+            </a:fillRef>
+            <a:effectRef idx="0">
+              <a:schemeClr val="accent1"/>
+            </a:effectRef>
+            <a:fontRef idx="minor">
+              <a:schemeClr val="tx1"/>
+            </a:fontRef>
+          </p:style>
+        </p:cxnSp>
+        <p:sp>
+          <p:nvSpPr>
+            <p:cNvPr id="700" name="OTLSHAPE_TB_00000000000000000000000000000000_TimescaleInterval3"/>
+            <p:cNvSpPr txBox="1"/>
+            <p:nvPr>
+              <p:custDataLst>
+                <p:tags r:id="rId67"/>
+              </p:custDataLst>
+            </p:nvPr>
+          </p:nvSpPr>
+          <p:spPr>
+            <a:xfrm>
+              <a:off x="3904595" y="3145473"/>
+              <a:ext cx="182742" cy="186055"/>
+            </a:xfrm>
+            <a:prstGeom prst="rect">
+              <a:avLst/>
+            </a:prstGeom>
+            <a:noFill/>
+          </p:spPr>
+          <p:txBody>
+            <a:bodyPr vert="horz" wrap="none" lIns="0" tIns="0" rIns="0" bIns="0" rtlCol="0" anchor="ctr" anchorCtr="0">
+              <a:noAutofit/>
+            </a:bodyPr>
+            <a:lstStyle/>
+            <a:p>
+              <a:r>
+                <a:rPr lang="en-US" altLang="zh-CN" sz="1400" spc="-26" smtClean="0">
+                  <a:solidFill>
+                    <a:schemeClr val="lt1"/>
+                  </a:solidFill>
+                </a:rPr>
+                <a:t>Q2</a:t>
+              </a:r>
+              <a:endParaRPr lang="zh-CN" altLang="en-US" sz="1400" spc="-26">
+                <a:solidFill>
+                  <a:schemeClr val="lt1"/>
+                </a:solidFill>
+              </a:endParaRPr>
+            </a:p>
+          </p:txBody>
+        </p:sp>
+        <p:cxnSp>
+          <p:nvCxnSpPr>
+            <p:cNvPr id="701" name="OTLSHAPE_TB_00000000000000000000000000000000_Separator3"/>
+            <p:cNvCxnSpPr/>
+            <p:nvPr>
+              <p:custDataLst>
+                <p:tags r:id="rId68"/>
+              </p:custDataLst>
+            </p:nvPr>
+          </p:nvCxnSpPr>
+          <p:spPr>
+            <a:xfrm>
+              <a:off x="5287016" y="3136900"/>
+              <a:ext cx="0" cy="203200"/>
+            </a:xfrm>
+            <a:prstGeom prst="line">
+              <a:avLst/>
+            </a:prstGeom>
+            <a:ln w="9525" cap="flat" cmpd="sng" algn="ctr">
+              <a:solidFill>
+                <a:schemeClr val="lt1">
+                  <a:alpha val="29804"/>
+                </a:schemeClr>
+              </a:solidFill>
+              <a:prstDash val="solid"/>
+              <a:round/>
+              <a:headEnd type="none" w="med" len="med"/>
+              <a:tailEnd type="none" w="med" len="med"/>
+            </a:ln>
+          </p:spPr>
+          <p:style>
+            <a:lnRef idx="1">
+              <a:schemeClr val="accent1"/>
+            </a:lnRef>
+            <a:fillRef idx="0">
+              <a:schemeClr val="accent1"/>
+            </a:fillRef>
+            <a:effectRef idx="0">
+              <a:schemeClr val="accent1"/>
+            </a:effectRef>
+            <a:fontRef idx="minor">
+              <a:schemeClr val="tx1"/>
+            </a:fontRef>
+          </p:style>
+        </p:cxnSp>
+        <p:sp>
+          <p:nvSpPr>
+            <p:cNvPr id="702" name="OTLSHAPE_TB_00000000000000000000000000000000_TimescaleInterval4"/>
+            <p:cNvSpPr txBox="1"/>
+            <p:nvPr>
+              <p:custDataLst>
+                <p:tags r:id="rId69"/>
+              </p:custDataLst>
+            </p:nvPr>
+          </p:nvSpPr>
+          <p:spPr>
+            <a:xfrm>
+              <a:off x="5350516" y="3145473"/>
+              <a:ext cx="182742" cy="186055"/>
+            </a:xfrm>
+            <a:prstGeom prst="rect">
+              <a:avLst/>
+            </a:prstGeom>
+            <a:noFill/>
+          </p:spPr>
+          <p:txBody>
+            <a:bodyPr vert="horz" wrap="none" lIns="0" tIns="0" rIns="0" bIns="0" rtlCol="0" anchor="ctr" anchorCtr="0">
+              <a:noAutofit/>
+            </a:bodyPr>
+            <a:lstStyle/>
+            <a:p>
+              <a:r>
+                <a:rPr lang="en-US" altLang="zh-CN" sz="1400" spc="-26" smtClean="0">
+                  <a:solidFill>
+                    <a:schemeClr val="lt1"/>
+                  </a:solidFill>
+                </a:rPr>
+                <a:t>Q3</a:t>
+              </a:r>
+              <a:endParaRPr lang="zh-CN" altLang="en-US" sz="1400" spc="-26">
+                <a:solidFill>
+                  <a:schemeClr val="lt1"/>
+                </a:solidFill>
+              </a:endParaRPr>
+            </a:p>
+          </p:txBody>
+        </p:sp>
+        <p:cxnSp>
+          <p:nvCxnSpPr>
+            <p:cNvPr id="703" name="OTLSHAPE_TB_00000000000000000000000000000000_Separator4"/>
+            <p:cNvCxnSpPr/>
+            <p:nvPr>
+              <p:custDataLst>
+                <p:tags r:id="rId70"/>
+              </p:custDataLst>
+            </p:nvPr>
+          </p:nvCxnSpPr>
+          <p:spPr>
+            <a:xfrm>
+              <a:off x="6748825" y="3136900"/>
+              <a:ext cx="0" cy="203200"/>
+            </a:xfrm>
+            <a:prstGeom prst="line">
+              <a:avLst/>
+            </a:prstGeom>
+            <a:ln w="9525" cap="flat" cmpd="sng" algn="ctr">
+              <a:solidFill>
+                <a:schemeClr val="lt1">
+                  <a:alpha val="29804"/>
+                </a:schemeClr>
+              </a:solidFill>
+              <a:prstDash val="solid"/>
+              <a:round/>
+              <a:headEnd type="none" w="med" len="med"/>
+              <a:tailEnd type="none" w="med" len="med"/>
+            </a:ln>
+          </p:spPr>
+          <p:style>
+            <a:lnRef idx="1">
+              <a:schemeClr val="accent1"/>
+            </a:lnRef>
+            <a:fillRef idx="0">
+              <a:schemeClr val="accent1"/>
+            </a:fillRef>
+            <a:effectRef idx="0">
+              <a:schemeClr val="accent1"/>
+            </a:effectRef>
+            <a:fontRef idx="minor">
+              <a:schemeClr val="tx1"/>
+            </a:fontRef>
+          </p:style>
+        </p:cxnSp>
+        <p:sp>
+          <p:nvSpPr>
+            <p:cNvPr id="704" name="OTLSHAPE_TB_00000000000000000000000000000000_TimescaleInterval5"/>
+            <p:cNvSpPr txBox="1"/>
+            <p:nvPr>
+              <p:custDataLst>
+                <p:tags r:id="rId71"/>
+              </p:custDataLst>
+            </p:nvPr>
+          </p:nvSpPr>
+          <p:spPr>
+            <a:xfrm>
+              <a:off x="6812325" y="3145473"/>
+              <a:ext cx="182742" cy="186055"/>
+            </a:xfrm>
+            <a:prstGeom prst="rect">
+              <a:avLst/>
+            </a:prstGeom>
+            <a:noFill/>
+          </p:spPr>
+          <p:txBody>
+            <a:bodyPr vert="horz" wrap="none" lIns="0" tIns="0" rIns="0" bIns="0" rtlCol="0" anchor="ctr" anchorCtr="0">
+              <a:noAutofit/>
+            </a:bodyPr>
+            <a:lstStyle/>
+            <a:p>
+              <a:r>
+                <a:rPr lang="en-US" altLang="zh-CN" sz="1400" spc="-26" smtClean="0">
+                  <a:solidFill>
+                    <a:schemeClr val="lt1"/>
+                  </a:solidFill>
+                </a:rPr>
+                <a:t>Q4</a:t>
+              </a:r>
+              <a:endParaRPr lang="zh-CN" altLang="en-US" sz="1400" spc="-26">
+                <a:solidFill>
+                  <a:schemeClr val="lt1"/>
+                </a:solidFill>
+              </a:endParaRPr>
+            </a:p>
+          </p:txBody>
+        </p:sp>
+        <p:sp>
+          <p:nvSpPr>
+            <p:cNvPr id="733" name="OTLSHAPE_T_af8aba6694844f26b92929dd16af13bb_Shape"/>
+            <p:cNvSpPr/>
+            <p:nvPr>
+              <p:custDataLst>
+                <p:tags r:id="rId72"/>
+              </p:custDataLst>
+            </p:nvPr>
+          </p:nvSpPr>
+          <p:spPr>
+            <a:xfrm>
+              <a:off x="933365" y="3945255"/>
+              <a:ext cx="520700" cy="203200"/>
+            </a:xfrm>
+            <a:prstGeom prst="rect">
+              <a:avLst/>
+            </a:prstGeom>
+            <a:solidFill>
+              <a:srgbClr val="96D642"/>
+            </a:solidFill>
+            <a:ln w="25400" cap="flat" cmpd="sng" algn="ctr">
+              <a:noFill/>
+              <a:prstDash val="solid"/>
+            </a:ln>
+            <a:effectLst/>
+            <a:scene3d>
+              <a:camera prst="orthographicFront"/>
+              <a:lightRig rig="balanced" dir="t">
+                <a:rot lat="0" lon="0" rev="8700000"/>
+              </a:lightRig>
+            </a:scene3d>
+            <a:sp3d>
+              <a:bevelT w="165100" h="12700"/>
+            </a:sp3d>
+            <a:extLst>
+              <a:ext uri="{91240B29-F687-4F45-9708-019B960494DF}">
+                <a14:hiddenLine xmlns:a14="http://schemas.microsoft.com/office/drawing/2010/main" w="25400" cap="flat" cmpd="sng" algn="ctr">
+                  <a:solidFill>
+                    <a:schemeClr val="accent1">
+                      <a:shade val="50000"/>
+                    </a:schemeClr>
+                  </a:solidFill>
+                  <a:prstDash val="solid"/>
+                </a14:hiddenLine>
+              </a:ext>
+              <a:ext uri="{AF507438-7753-43E0-B8FC-AC1667EBCBE1}">
+                <a14:hiddenEffects xmlns:a14="http://schemas.microsoft.com/office/drawing/2010/main">
+                  <a:effectLst>
+                    <a:outerShdw>
+                      <a:scrgbClr r="0" g="0" b="0">
+                        <a:alpha val="50000"/>
+                      </a:scrgbClr>
+                    </a:outerShdw>
+                  </a:effectLst>
+                </a14:hiddenEffects>
+              </a:ext>
+              <a:ext uri="{53640926-AAD7-44D8-BBD7-CCE9431645EC}">
+                <a14:shadowObscured xmlns:a14="http://schemas.microsoft.com/office/drawing/2010/main" val="1"/>
+              </a:ext>
+            </a:extLst>
+          </p:spPr>
+          <p:style>
+            <a:lnRef idx="2">
+              <a:schemeClr val="accent1">
+                <a:shade val="50000"/>
+              </a:schemeClr>
+            </a:lnRef>
+            <a:fillRef idx="1">
+              <a:schemeClr val="accent1"/>
+            </a:fillRef>
+            <a:effectRef idx="0">
+              <a:schemeClr val="accent1"/>
+            </a:effectRef>
+            <a:fontRef idx="minor">
+              <a:schemeClr val="lt1"/>
+            </a:fontRef>
+          </p:style>
+          <p:txBody>
+            <a:bodyPr rtlCol="0" anchor="ctr"/>
+            <a:lstStyle/>
+            <a:p>
+              <a:pPr algn="ctr"/>
+              <a:endParaRPr lang="zh-CN" altLang="en-US" sz="1400"/>
+            </a:p>
+          </p:txBody>
+        </p:sp>
+        <p:sp>
+          <p:nvSpPr>
+            <p:cNvPr id="740" name="OTLSHAPE_T_af8aba6694844f26b92929dd16af13bb_Title"/>
+            <p:cNvSpPr txBox="1"/>
+            <p:nvPr>
+              <p:custDataLst>
+                <p:tags r:id="rId73"/>
+              </p:custDataLst>
+            </p:nvPr>
+          </p:nvSpPr>
+          <p:spPr>
+            <a:xfrm>
+              <a:off x="126999" y="3939134"/>
+              <a:ext cx="542713" cy="215444"/>
+            </a:xfrm>
+            <a:prstGeom prst="rect">
+              <a:avLst/>
+            </a:prstGeom>
+            <a:noFill/>
+          </p:spPr>
+          <p:txBody>
+            <a:bodyPr vert="horz" wrap="square" lIns="0" tIns="0" rIns="0" bIns="0" rtlCol="0" anchor="ctr" anchorCtr="0">
+              <a:spAutoFit/>
+            </a:bodyPr>
+            <a:lstStyle/>
+            <a:p>
+              <a:r>
+                <a:rPr lang="en-US" altLang="zh-CN" sz="1400" b="1" spc="-14" dirty="0" smtClean="0">
+                  <a:solidFill>
+                    <a:schemeClr val="dk1"/>
+                  </a:solidFill>
+                </a:rPr>
+                <a:t>RBM</a:t>
+              </a:r>
+              <a:endParaRPr lang="zh-CN" altLang="en-US" sz="1400" b="1" spc="-14" dirty="0">
+                <a:solidFill>
+                  <a:schemeClr val="dk1"/>
+                </a:solidFill>
+              </a:endParaRPr>
+            </a:p>
+          </p:txBody>
+        </p:sp>
+        <p:sp>
+          <p:nvSpPr>
+            <p:cNvPr id="741" name="OTLSHAPE_T_235e46f474164d06a05367a49d5026a8_Shape"/>
+            <p:cNvSpPr/>
+            <p:nvPr>
+              <p:custDataLst>
+                <p:tags r:id="rId74"/>
+              </p:custDataLst>
+            </p:nvPr>
+          </p:nvSpPr>
+          <p:spPr>
+            <a:xfrm>
+              <a:off x="1425932" y="4211955"/>
+              <a:ext cx="495300" cy="203200"/>
+            </a:xfrm>
+            <a:prstGeom prst="rect">
+              <a:avLst/>
+            </a:prstGeom>
+            <a:solidFill>
+              <a:srgbClr val="96D642"/>
+            </a:solidFill>
+            <a:ln w="25400" cap="flat" cmpd="sng" algn="ctr">
+              <a:noFill/>
+              <a:prstDash val="solid"/>
+            </a:ln>
+            <a:effectLst/>
+            <a:scene3d>
+              <a:camera prst="orthographicFront"/>
+              <a:lightRig rig="balanced" dir="t">
+                <a:rot lat="0" lon="0" rev="8700000"/>
+              </a:lightRig>
+            </a:scene3d>
+            <a:sp3d>
+              <a:bevelT w="165100" h="12700"/>
+            </a:sp3d>
+            <a:extLst>
+              <a:ext uri="{91240B29-F687-4F45-9708-019B960494DF}">
+                <a14:hiddenLine xmlns:a14="http://schemas.microsoft.com/office/drawing/2010/main" w="25400" cap="flat" cmpd="sng" algn="ctr">
+                  <a:solidFill>
+                    <a:schemeClr val="accent1">
+                      <a:shade val="50000"/>
+                    </a:schemeClr>
+                  </a:solidFill>
+                  <a:prstDash val="solid"/>
+                </a14:hiddenLine>
+              </a:ext>
+              <a:ext uri="{AF507438-7753-43E0-B8FC-AC1667EBCBE1}">
+                <a14:hiddenEffects xmlns:a14="http://schemas.microsoft.com/office/drawing/2010/main">
+                  <a:effectLst>
+                    <a:outerShdw>
+                      <a:scrgbClr r="0" g="0" b="0">
+                        <a:alpha val="50000"/>
+                      </a:scrgbClr>
+                    </a:outerShdw>
+                  </a:effectLst>
+                </a14:hiddenEffects>
+              </a:ext>
+              <a:ext uri="{53640926-AAD7-44D8-BBD7-CCE9431645EC}">
+                <a14:shadowObscured xmlns:a14="http://schemas.microsoft.com/office/drawing/2010/main" val="1"/>
+              </a:ext>
+            </a:extLst>
+          </p:spPr>
+          <p:style>
+            <a:lnRef idx="2">
+              <a:schemeClr val="accent1">
+                <a:shade val="50000"/>
+              </a:schemeClr>
+            </a:lnRef>
+            <a:fillRef idx="1">
+              <a:schemeClr val="accent1"/>
+            </a:fillRef>
+            <a:effectRef idx="0">
+              <a:schemeClr val="accent1"/>
+            </a:effectRef>
+            <a:fontRef idx="minor">
+              <a:schemeClr val="lt1"/>
+            </a:fontRef>
+          </p:style>
+          <p:txBody>
+            <a:bodyPr rtlCol="0" anchor="ctr"/>
+            <a:lstStyle/>
+            <a:p>
+              <a:pPr algn="ctr"/>
+              <a:endParaRPr lang="zh-CN" altLang="en-US" sz="1400"/>
+            </a:p>
+          </p:txBody>
+        </p:sp>
+        <p:sp>
+          <p:nvSpPr>
+            <p:cNvPr id="748" name="OTLSHAPE_T_235e46f474164d06a05367a49d5026a8_Title"/>
+            <p:cNvSpPr txBox="1"/>
+            <p:nvPr>
+              <p:custDataLst>
+                <p:tags r:id="rId75"/>
+              </p:custDataLst>
+            </p:nvPr>
+          </p:nvSpPr>
+          <p:spPr>
+            <a:xfrm>
+              <a:off x="127000" y="4205834"/>
+              <a:ext cx="542712" cy="215444"/>
+            </a:xfrm>
+            <a:prstGeom prst="rect">
+              <a:avLst/>
+            </a:prstGeom>
+            <a:noFill/>
+          </p:spPr>
+          <p:txBody>
+            <a:bodyPr vert="horz" wrap="square" lIns="0" tIns="0" rIns="0" bIns="0" rtlCol="0" anchor="ctr" anchorCtr="0">
+              <a:spAutoFit/>
+            </a:bodyPr>
+            <a:lstStyle/>
+            <a:p>
+              <a:r>
+                <a:rPr lang="en-US" altLang="zh-CN" sz="1400" b="1" spc="-12" dirty="0" smtClean="0">
+                  <a:solidFill>
+                    <a:schemeClr val="dk1"/>
+                  </a:solidFill>
+                </a:rPr>
+                <a:t>DBN</a:t>
+              </a:r>
+              <a:endParaRPr lang="zh-CN" altLang="en-US" sz="1400" b="1" spc="-12" dirty="0">
+                <a:solidFill>
+                  <a:schemeClr val="dk1"/>
+                </a:solidFill>
+              </a:endParaRPr>
+            </a:p>
+          </p:txBody>
+        </p:sp>
+        <p:sp>
+          <p:nvSpPr>
+            <p:cNvPr id="749" name="OTLSHAPE_T_77eb22e7cd0b4dc299a4200d7b7f12eb_Shape"/>
+            <p:cNvSpPr/>
+            <p:nvPr>
+              <p:custDataLst>
+                <p:tags r:id="rId76"/>
+              </p:custDataLst>
+            </p:nvPr>
+          </p:nvSpPr>
+          <p:spPr>
+            <a:xfrm>
+              <a:off x="1902609" y="4478655"/>
+              <a:ext cx="1473200" cy="203200"/>
+            </a:xfrm>
+            <a:prstGeom prst="rect">
+              <a:avLst/>
+            </a:prstGeom>
+            <a:solidFill>
+              <a:srgbClr val="2F3699"/>
+            </a:solidFill>
+            <a:ln w="25400" cap="flat" cmpd="sng" algn="ctr">
+              <a:noFill/>
+              <a:prstDash val="solid"/>
+            </a:ln>
+            <a:effectLst/>
+            <a:scene3d>
+              <a:camera prst="orthographicFront"/>
+              <a:lightRig rig="balanced" dir="t">
+                <a:rot lat="0" lon="0" rev="8700000"/>
+              </a:lightRig>
+            </a:scene3d>
+            <a:sp3d>
+              <a:bevelT w="165100" h="12700"/>
+            </a:sp3d>
+            <a:extLst>
+              <a:ext uri="{91240B29-F687-4F45-9708-019B960494DF}">
+                <a14:hiddenLine xmlns:a14="http://schemas.microsoft.com/office/drawing/2010/main" w="25400" cap="flat" cmpd="sng" algn="ctr">
+                  <a:solidFill>
+                    <a:schemeClr val="accent1">
+                      <a:shade val="50000"/>
+                    </a:schemeClr>
+                  </a:solidFill>
+                  <a:prstDash val="solid"/>
+                </a14:hiddenLine>
+              </a:ext>
+              <a:ext uri="{AF507438-7753-43E0-B8FC-AC1667EBCBE1}">
+                <a14:hiddenEffects xmlns:a14="http://schemas.microsoft.com/office/drawing/2010/main">
+                  <a:effectLst>
+                    <a:outerShdw>
+                      <a:scrgbClr r="0" g="0" b="0">
+                        <a:alpha val="50000"/>
+                      </a:scrgbClr>
+                    </a:outerShdw>
+                  </a:effectLst>
+                </a14:hiddenEffects>
+              </a:ext>
+              <a:ext uri="{53640926-AAD7-44D8-BBD7-CCE9431645EC}">
+                <a14:shadowObscured xmlns:a14="http://schemas.microsoft.com/office/drawing/2010/main" val="1"/>
+              </a:ext>
+            </a:extLst>
+          </p:spPr>
+          <p:style>
+            <a:lnRef idx="2">
+              <a:schemeClr val="accent1">
+                <a:shade val="50000"/>
+              </a:schemeClr>
+            </a:lnRef>
+            <a:fillRef idx="1">
+              <a:schemeClr val="accent1"/>
+            </a:fillRef>
+            <a:effectRef idx="0">
+              <a:schemeClr val="accent1"/>
+            </a:effectRef>
+            <a:fontRef idx="minor">
+              <a:schemeClr val="lt1"/>
+            </a:fontRef>
+          </p:style>
+          <p:txBody>
+            <a:bodyPr rtlCol="0" anchor="ctr"/>
+            <a:lstStyle/>
+            <a:p>
+              <a:pPr algn="ctr"/>
+              <a:endParaRPr lang="zh-CN" altLang="en-US" sz="1400"/>
+            </a:p>
+          </p:txBody>
+        </p:sp>
+        <p:sp>
+          <p:nvSpPr>
+            <p:cNvPr id="756" name="OTLSHAPE_T_77eb22e7cd0b4dc299a4200d7b7f12eb_Title"/>
+            <p:cNvSpPr txBox="1"/>
+            <p:nvPr>
+              <p:custDataLst>
+                <p:tags r:id="rId77"/>
+              </p:custDataLst>
+            </p:nvPr>
+          </p:nvSpPr>
+          <p:spPr>
+            <a:xfrm>
+              <a:off x="126999" y="4472534"/>
+              <a:ext cx="778667" cy="215444"/>
+            </a:xfrm>
+            <a:prstGeom prst="rect">
+              <a:avLst/>
+            </a:prstGeom>
+            <a:noFill/>
+          </p:spPr>
+          <p:txBody>
+            <a:bodyPr vert="horz" wrap="square" lIns="0" tIns="0" rIns="0" bIns="0" rtlCol="0" anchor="ctr" anchorCtr="0">
+              <a:spAutoFit/>
+            </a:bodyPr>
+            <a:lstStyle/>
+            <a:p>
+              <a:r>
+                <a:rPr lang="en-US" altLang="zh-CN" sz="1400" b="1" spc="-12" dirty="0" smtClean="0">
+                  <a:solidFill>
+                    <a:schemeClr val="dk1"/>
+                  </a:solidFill>
+                </a:rPr>
+                <a:t>SRBM</a:t>
+              </a:r>
+              <a:endParaRPr lang="zh-CN" altLang="en-US" sz="1400" b="1" spc="-12" dirty="0">
+                <a:solidFill>
+                  <a:schemeClr val="dk1"/>
+                </a:solidFill>
+              </a:endParaRPr>
+            </a:p>
+          </p:txBody>
+        </p:sp>
+        <p:sp>
+          <p:nvSpPr>
+            <p:cNvPr id="757" name="OTLSHAPE_T_0862fbcce6f74c47b96391573e00609d_Shape"/>
+            <p:cNvSpPr/>
+            <p:nvPr>
+              <p:custDataLst>
+                <p:tags r:id="rId78"/>
+              </p:custDataLst>
+            </p:nvPr>
+          </p:nvSpPr>
+          <p:spPr>
+            <a:xfrm>
+              <a:off x="3348529" y="4745355"/>
+              <a:ext cx="1485900" cy="203200"/>
+            </a:xfrm>
+            <a:prstGeom prst="rect">
+              <a:avLst/>
+            </a:prstGeom>
+            <a:solidFill>
+              <a:srgbClr val="2F3699"/>
+            </a:solidFill>
+            <a:ln w="25400" cap="flat" cmpd="sng" algn="ctr">
+              <a:noFill/>
+              <a:prstDash val="solid"/>
+            </a:ln>
+            <a:effectLst/>
+            <a:scene3d>
+              <a:camera prst="orthographicFront"/>
+              <a:lightRig rig="balanced" dir="t">
+                <a:rot lat="0" lon="0" rev="8700000"/>
+              </a:lightRig>
+            </a:scene3d>
+            <a:sp3d>
+              <a:bevelT w="165100" h="12700"/>
+            </a:sp3d>
+            <a:extLst>
+              <a:ext uri="{91240B29-F687-4F45-9708-019B960494DF}">
+                <a14:hiddenLine xmlns:a14="http://schemas.microsoft.com/office/drawing/2010/main" w="25400" cap="flat" cmpd="sng" algn="ctr">
+                  <a:solidFill>
+                    <a:schemeClr val="accent1">
+                      <a:shade val="50000"/>
+                    </a:schemeClr>
+                  </a:solidFill>
+                  <a:prstDash val="solid"/>
+                </a14:hiddenLine>
+              </a:ext>
+              <a:ext uri="{AF507438-7753-43E0-B8FC-AC1667EBCBE1}">
+                <a14:hiddenEffects xmlns:a14="http://schemas.microsoft.com/office/drawing/2010/main">
+                  <a:effectLst>
+                    <a:outerShdw>
+                      <a:scrgbClr r="0" g="0" b="0">
+                        <a:alpha val="50000"/>
+                      </a:scrgbClr>
+                    </a:outerShdw>
+                  </a:effectLst>
+                </a14:hiddenEffects>
+              </a:ext>
+              <a:ext uri="{53640926-AAD7-44D8-BBD7-CCE9431645EC}">
+                <a14:shadowObscured xmlns:a14="http://schemas.microsoft.com/office/drawing/2010/main" val="1"/>
+              </a:ext>
+            </a:extLst>
+          </p:spPr>
+          <p:style>
+            <a:lnRef idx="2">
+              <a:schemeClr val="accent1">
+                <a:shade val="50000"/>
+              </a:schemeClr>
+            </a:lnRef>
+            <a:fillRef idx="1">
+              <a:schemeClr val="accent1"/>
+            </a:fillRef>
+            <a:effectRef idx="0">
+              <a:schemeClr val="accent1"/>
+            </a:effectRef>
+            <a:fontRef idx="minor">
+              <a:schemeClr val="lt1"/>
+            </a:fontRef>
+          </p:style>
+          <p:txBody>
+            <a:bodyPr rtlCol="0" anchor="ctr"/>
+            <a:lstStyle/>
+            <a:p>
+              <a:pPr algn="ctr"/>
+              <a:endParaRPr lang="zh-CN" altLang="en-US" sz="1400"/>
+            </a:p>
+          </p:txBody>
+        </p:sp>
+        <p:sp>
+          <p:nvSpPr>
+            <p:cNvPr id="764" name="OTLSHAPE_T_0862fbcce6f74c47b96391573e00609d_Title"/>
+            <p:cNvSpPr txBox="1"/>
+            <p:nvPr>
+              <p:custDataLst>
+                <p:tags r:id="rId79"/>
+              </p:custDataLst>
+            </p:nvPr>
+          </p:nvSpPr>
+          <p:spPr>
+            <a:xfrm>
+              <a:off x="127000" y="4739234"/>
+              <a:ext cx="821478" cy="215444"/>
+            </a:xfrm>
+            <a:prstGeom prst="rect">
+              <a:avLst/>
+            </a:prstGeom>
+            <a:noFill/>
+          </p:spPr>
+          <p:txBody>
+            <a:bodyPr vert="horz" wrap="square" lIns="0" tIns="0" rIns="0" bIns="0" rtlCol="0" anchor="ctr" anchorCtr="0">
+              <a:spAutoFit/>
+            </a:bodyPr>
+            <a:lstStyle/>
+            <a:p>
+              <a:r>
+                <a:rPr lang="en-US" altLang="zh-CN" sz="1400" b="1" spc="-10" dirty="0" smtClean="0">
+                  <a:solidFill>
+                    <a:schemeClr val="dk1"/>
+                  </a:solidFill>
+                </a:rPr>
+                <a:t>SDBN</a:t>
+              </a:r>
+              <a:endParaRPr lang="zh-CN" altLang="en-US" sz="1400" b="1" spc="-10" dirty="0">
+                <a:solidFill>
+                  <a:schemeClr val="dk1"/>
+                </a:solidFill>
+              </a:endParaRPr>
+            </a:p>
+          </p:txBody>
+        </p:sp>
+        <p:sp>
+          <p:nvSpPr>
+            <p:cNvPr id="765" name="OTLSHAPE_T_9ac8d18186e74035a2730a3a6e774ee6_Shape"/>
+            <p:cNvSpPr/>
+            <p:nvPr>
+              <p:custDataLst>
+                <p:tags r:id="rId80"/>
+              </p:custDataLst>
+            </p:nvPr>
+          </p:nvSpPr>
+          <p:spPr>
+            <a:xfrm>
+              <a:off x="3841095" y="5012055"/>
+              <a:ext cx="1473200" cy="203200"/>
+            </a:xfrm>
+            <a:prstGeom prst="rect">
+              <a:avLst/>
+            </a:prstGeom>
+            <a:solidFill>
+              <a:srgbClr val="2F3699"/>
+            </a:solidFill>
+            <a:ln w="25400" cap="flat" cmpd="sng" algn="ctr">
+              <a:noFill/>
+              <a:prstDash val="solid"/>
+            </a:ln>
+            <a:effectLst/>
+            <a:scene3d>
+              <a:camera prst="orthographicFront"/>
+              <a:lightRig rig="balanced" dir="t">
+                <a:rot lat="0" lon="0" rev="8700000"/>
+              </a:lightRig>
+            </a:scene3d>
+            <a:sp3d>
+              <a:bevelT w="165100" h="12700"/>
+            </a:sp3d>
+            <a:extLst>
+              <a:ext uri="{91240B29-F687-4F45-9708-019B960494DF}">
+                <a14:hiddenLine xmlns:a14="http://schemas.microsoft.com/office/drawing/2010/main" w="25400" cap="flat" cmpd="sng" algn="ctr">
+                  <a:solidFill>
+                    <a:schemeClr val="accent1">
+                      <a:shade val="50000"/>
+                    </a:schemeClr>
+                  </a:solidFill>
+                  <a:prstDash val="solid"/>
+                </a14:hiddenLine>
+              </a:ext>
+              <a:ext uri="{AF507438-7753-43E0-B8FC-AC1667EBCBE1}">
+                <a14:hiddenEffects xmlns:a14="http://schemas.microsoft.com/office/drawing/2010/main">
+                  <a:effectLst>
+                    <a:outerShdw>
+                      <a:scrgbClr r="0" g="0" b="0">
+                        <a:alpha val="50000"/>
+                      </a:scrgbClr>
+                    </a:outerShdw>
+                  </a:effectLst>
+                </a14:hiddenEffects>
+              </a:ext>
+              <a:ext uri="{53640926-AAD7-44D8-BBD7-CCE9431645EC}">
+                <a14:shadowObscured xmlns:a14="http://schemas.microsoft.com/office/drawing/2010/main" val="1"/>
+              </a:ext>
+            </a:extLst>
+          </p:spPr>
+          <p:style>
+            <a:lnRef idx="2">
+              <a:schemeClr val="accent1">
+                <a:shade val="50000"/>
+              </a:schemeClr>
+            </a:lnRef>
+            <a:fillRef idx="1">
+              <a:schemeClr val="accent1"/>
+            </a:fillRef>
+            <a:effectRef idx="0">
+              <a:schemeClr val="accent1"/>
+            </a:effectRef>
+            <a:fontRef idx="minor">
+              <a:schemeClr val="lt1"/>
+            </a:fontRef>
+          </p:style>
+          <p:txBody>
+            <a:bodyPr rtlCol="0" anchor="ctr"/>
+            <a:lstStyle/>
+            <a:p>
+              <a:pPr algn="ctr"/>
+              <a:endParaRPr lang="zh-CN" altLang="en-US" sz="1400"/>
+            </a:p>
+          </p:txBody>
+        </p:sp>
+        <p:sp>
+          <p:nvSpPr>
+            <p:cNvPr id="772" name="OTLSHAPE_T_9ac8d18186e74035a2730a3a6e774ee6_Title"/>
+            <p:cNvSpPr txBox="1"/>
+            <p:nvPr>
+              <p:custDataLst>
+                <p:tags r:id="rId81"/>
+              </p:custDataLst>
+            </p:nvPr>
+          </p:nvSpPr>
+          <p:spPr>
+            <a:xfrm>
+              <a:off x="127000" y="5005934"/>
+              <a:ext cx="1203568" cy="215444"/>
+            </a:xfrm>
+            <a:prstGeom prst="rect">
+              <a:avLst/>
+            </a:prstGeom>
+            <a:noFill/>
+          </p:spPr>
+          <p:txBody>
+            <a:bodyPr vert="horz" wrap="square" lIns="0" tIns="0" rIns="0" bIns="0" rtlCol="0" anchor="ctr" anchorCtr="0">
+              <a:spAutoFit/>
+            </a:bodyPr>
+            <a:lstStyle/>
+            <a:p>
+              <a:r>
+                <a:rPr lang="en-US" altLang="zh-CN" sz="1400" b="1" spc="-4" dirty="0" smtClean="0">
+                  <a:solidFill>
+                    <a:schemeClr val="dk1"/>
+                  </a:solidFill>
+                </a:rPr>
+                <a:t>Benchmarks</a:t>
+              </a:r>
+              <a:endParaRPr lang="zh-CN" altLang="en-US" sz="1400" b="1" spc="-4" dirty="0">
+                <a:solidFill>
+                  <a:schemeClr val="dk1"/>
+                </a:solidFill>
+              </a:endParaRPr>
+            </a:p>
+          </p:txBody>
+        </p:sp>
+        <p:sp>
+          <p:nvSpPr>
+            <p:cNvPr id="773" name="OTLSHAPE_T_e1ab46e8d17045f9946a8af8892c50f8_Shape"/>
+            <p:cNvSpPr/>
+            <p:nvPr>
+              <p:custDataLst>
+                <p:tags r:id="rId82"/>
+              </p:custDataLst>
+            </p:nvPr>
+          </p:nvSpPr>
+          <p:spPr>
+            <a:xfrm>
+              <a:off x="4810339" y="5278755"/>
+              <a:ext cx="2933700" cy="203200"/>
+            </a:xfrm>
+            <a:prstGeom prst="rect">
+              <a:avLst/>
+            </a:prstGeom>
+            <a:solidFill>
+              <a:srgbClr val="2F3699"/>
+            </a:solidFill>
+            <a:ln w="25400" cap="flat" cmpd="sng" algn="ctr">
+              <a:noFill/>
+              <a:prstDash val="solid"/>
+            </a:ln>
+            <a:effectLst/>
+            <a:scene3d>
+              <a:camera prst="orthographicFront"/>
+              <a:lightRig rig="balanced" dir="t">
+                <a:rot lat="0" lon="0" rev="8700000"/>
+              </a:lightRig>
+            </a:scene3d>
+            <a:sp3d>
+              <a:bevelT w="165100" h="12700"/>
+            </a:sp3d>
+            <a:extLst>
+              <a:ext uri="{91240B29-F687-4F45-9708-019B960494DF}">
+                <a14:hiddenLine xmlns:a14="http://schemas.microsoft.com/office/drawing/2010/main" w="25400" cap="flat" cmpd="sng" algn="ctr">
+                  <a:solidFill>
+                    <a:schemeClr val="accent1">
+                      <a:shade val="50000"/>
+                    </a:schemeClr>
+                  </a:solidFill>
+                  <a:prstDash val="solid"/>
+                </a14:hiddenLine>
+              </a:ext>
+              <a:ext uri="{AF507438-7753-43E0-B8FC-AC1667EBCBE1}">
+                <a14:hiddenEffects xmlns:a14="http://schemas.microsoft.com/office/drawing/2010/main">
+                  <a:effectLst>
+                    <a:outerShdw>
+                      <a:scrgbClr r="0" g="0" b="0">
+                        <a:alpha val="50000"/>
+                      </a:scrgbClr>
+                    </a:outerShdw>
+                  </a:effectLst>
+                </a14:hiddenEffects>
+              </a:ext>
+              <a:ext uri="{53640926-AAD7-44D8-BBD7-CCE9431645EC}">
+                <a14:shadowObscured xmlns:a14="http://schemas.microsoft.com/office/drawing/2010/main" val="1"/>
+              </a:ext>
+            </a:extLst>
+          </p:spPr>
+          <p:style>
+            <a:lnRef idx="2">
+              <a:schemeClr val="accent1">
+                <a:shade val="50000"/>
+              </a:schemeClr>
+            </a:lnRef>
+            <a:fillRef idx="1">
+              <a:schemeClr val="accent1"/>
+            </a:fillRef>
+            <a:effectRef idx="0">
+              <a:schemeClr val="accent1"/>
+            </a:effectRef>
+            <a:fontRef idx="minor">
+              <a:schemeClr val="lt1"/>
+            </a:fontRef>
+          </p:style>
+          <p:txBody>
+            <a:bodyPr rtlCol="0" anchor="ctr"/>
+            <a:lstStyle/>
+            <a:p>
+              <a:pPr algn="ctr"/>
+              <a:endParaRPr lang="zh-CN" altLang="en-US" sz="1400"/>
+            </a:p>
+          </p:txBody>
+        </p:sp>
+        <p:sp>
+          <p:nvSpPr>
+            <p:cNvPr id="780" name="OTLSHAPE_T_e1ab46e8d17045f9946a8af8892c50f8_Title"/>
+            <p:cNvSpPr txBox="1"/>
+            <p:nvPr>
+              <p:custDataLst>
+                <p:tags r:id="rId83"/>
+              </p:custDataLst>
+            </p:nvPr>
+          </p:nvSpPr>
+          <p:spPr>
+            <a:xfrm>
+              <a:off x="127000" y="5272634"/>
+              <a:ext cx="1203568" cy="215444"/>
+            </a:xfrm>
+            <a:prstGeom prst="rect">
+              <a:avLst/>
+            </a:prstGeom>
+            <a:noFill/>
+          </p:spPr>
+          <p:txBody>
+            <a:bodyPr vert="horz" wrap="square" lIns="0" tIns="0" rIns="0" bIns="0" rtlCol="0" anchor="ctr" anchorCtr="0">
+              <a:spAutoFit/>
+            </a:bodyPr>
+            <a:lstStyle/>
+            <a:p>
+              <a:r>
+                <a:rPr lang="en-US" altLang="zh-CN" sz="1400" b="1" spc="-8" dirty="0" smtClean="0">
+                  <a:solidFill>
+                    <a:schemeClr val="dk1"/>
+                  </a:solidFill>
+                </a:rPr>
+                <a:t>Thesis Writing</a:t>
+              </a:r>
+              <a:endParaRPr lang="zh-CN" altLang="en-US" sz="1400" b="1" spc="-8" dirty="0">
+                <a:solidFill>
+                  <a:schemeClr val="dk1"/>
+                </a:solidFill>
+              </a:endParaRPr>
+            </a:p>
+          </p:txBody>
+        </p:sp>
+      </p:grpSp>
+      <p:sp>
+        <p:nvSpPr>
+          <p:cNvPr id="784" name="矩形 783"/>
+          <p:cNvSpPr/>
+          <p:nvPr/>
+        </p:nvSpPr>
+        <p:spPr>
+          <a:xfrm>
+            <a:off x="876534" y="1377839"/>
+            <a:ext cx="2783839" cy="369332"/>
+          </a:xfrm>
+          <a:prstGeom prst="rect">
+            <a:avLst/>
+          </a:prstGeom>
+        </p:spPr>
+        <p:txBody>
+          <a:bodyPr wrap="none">
+            <a:spAutoFit/>
+          </a:bodyPr>
+          <a:lstStyle/>
+          <a:p>
+            <a:pPr>
+              <a:lnSpc>
+                <a:spcPct val="100000"/>
+              </a:lnSpc>
+            </a:pPr>
+            <a:r>
+              <a:rPr lang="en-GB" altLang="zh-CN" dirty="0" smtClean="0">
+                <a:solidFill>
+                  <a:srgbClr val="000000"/>
+                </a:solidFill>
+              </a:rPr>
+              <a:t>Potential Research Tasks</a:t>
+            </a:r>
+            <a:endParaRPr lang="en-GB" altLang="zh-CN" dirty="0"/>
+          </a:p>
+        </p:txBody>
+      </p:sp>
+      <p:sp>
+        <p:nvSpPr>
+          <p:cNvPr id="785" name="矩形 784"/>
+          <p:cNvSpPr/>
+          <p:nvPr/>
+        </p:nvSpPr>
+        <p:spPr>
+          <a:xfrm>
+            <a:off x="4283968" y="1340768"/>
+            <a:ext cx="1501437" cy="369332"/>
+          </a:xfrm>
+          <a:prstGeom prst="rect">
+            <a:avLst/>
+          </a:prstGeom>
+        </p:spPr>
+        <p:txBody>
+          <a:bodyPr wrap="none">
+            <a:spAutoFit/>
+          </a:bodyPr>
+          <a:lstStyle/>
+          <a:p>
+            <a:pPr>
+              <a:lnSpc>
+                <a:spcPct val="100000"/>
+              </a:lnSpc>
+            </a:pPr>
+            <a:r>
+              <a:rPr lang="en-GB" altLang="zh-CN" dirty="0" smtClean="0">
+                <a:solidFill>
+                  <a:srgbClr val="000000"/>
+                </a:solidFill>
+              </a:rPr>
+              <a:t>Future Tasks</a:t>
+            </a:r>
+            <a:endParaRPr lang="en-GB" altLang="zh-CN" dirty="0"/>
+          </a:p>
+        </p:txBody>
+      </p:sp>
+      <p:sp>
+        <p:nvSpPr>
+          <p:cNvPr id="787" name="OTLSHAPE_M_4bad46065aff44fdba3359342bdb43dd_Shape"/>
+          <p:cNvSpPr/>
+          <p:nvPr>
+            <p:custDataLst>
+              <p:tags r:id="rId45"/>
+            </p:custDataLst>
+          </p:nvPr>
+        </p:nvSpPr>
+        <p:spPr>
+          <a:xfrm rot="16200000">
+            <a:off x="4283968" y="1751732"/>
+            <a:ext cx="165100" cy="165100"/>
+          </a:xfrm>
+          <a:prstGeom prst="flowChartMerge">
+            <a:avLst/>
+          </a:prstGeom>
+          <a:solidFill>
+            <a:srgbClr val="0070C0"/>
+          </a:solidFill>
+          <a:ln w="25400" cap="flat" cmpd="sng" algn="ctr">
+            <a:noFill/>
+            <a:prstDash val="solid"/>
+          </a:ln>
+          <a:effectLst/>
+          <a:scene3d>
+            <a:camera prst="orthographicFront"/>
+            <a:lightRig rig="threePt" dir="t"/>
+          </a:scene3d>
+          <a:sp3d>
+            <a:bevelT h="12700"/>
+          </a:sp3d>
+          <a:extLst>
+            <a:ext uri="{53640926-AAD7-44D8-BBD7-CCE9431645EC}">
+              <a14:shadowObscured xmlns:a14="http://schemas.microsoft.com/office/drawing/2010/main" val="1"/>
+            </a:ext>
+          </a:extLst>
+        </p:spPr>
+        <p:style>
+          <a:lnRef idx="2">
+            <a:schemeClr val="accent1">
+              <a:shade val="50000"/>
+            </a:schemeClr>
+          </a:lnRef>
+          <a:fillRef idx="1">
+            <a:schemeClr val="accent1"/>
+          </a:fillRef>
+          <a:effectRef idx="0">
+            <a:schemeClr val="accent1"/>
+          </a:effectRef>
+          <a:fontRef idx="minor">
+            <a:schemeClr val="lt1"/>
+          </a:fontRef>
+        </p:style>
+        <p:txBody>
+          <a:bodyPr rtlCol="0" anchor="ctr"/>
+          <a:lstStyle/>
+          <a:p>
+            <a:pPr algn="ctr"/>
+            <a:endParaRPr lang="zh-CN" altLang="en-US" sz="1400"/>
+          </a:p>
+        </p:txBody>
+      </p:sp>
+      <p:sp>
+        <p:nvSpPr>
+          <p:cNvPr id="788" name="OTLSHAPE_M_4bad46065aff44fdba3359342bdb43dd_Title"/>
+          <p:cNvSpPr txBox="1"/>
+          <p:nvPr>
+            <p:custDataLst>
+              <p:tags r:id="rId46"/>
+            </p:custDataLst>
+          </p:nvPr>
+        </p:nvSpPr>
+        <p:spPr>
+          <a:xfrm>
+            <a:off x="4499992" y="1723851"/>
+            <a:ext cx="2952328" cy="215444"/>
+          </a:xfrm>
+          <a:prstGeom prst="rect">
+            <a:avLst/>
+          </a:prstGeom>
+          <a:noFill/>
+        </p:spPr>
+        <p:txBody>
+          <a:bodyPr vert="horz" wrap="square" lIns="0" tIns="0" rIns="0" bIns="0" rtlCol="0" anchor="ctr" anchorCtr="0">
+            <a:spAutoFit/>
+          </a:bodyPr>
+          <a:lstStyle/>
+          <a:p>
+            <a:r>
+              <a:rPr lang="en-US" altLang="zh-CN" sz="1400" spc="-8" dirty="0" smtClean="0">
+                <a:solidFill>
+                  <a:schemeClr val="dk1"/>
+                </a:solidFill>
+              </a:rPr>
+              <a:t>Mean-Field Theory</a:t>
+            </a:r>
+            <a:endParaRPr lang="zh-CN" altLang="en-US" sz="1400" spc="-8" dirty="0">
+              <a:solidFill>
+                <a:schemeClr val="dk1"/>
+              </a:solidFill>
+            </a:endParaRPr>
+          </a:p>
+        </p:txBody>
+      </p:sp>
+      <p:sp>
+        <p:nvSpPr>
+          <p:cNvPr id="789" name="OTLSHAPE_M_4bad46065aff44fdba3359342bdb43dd_Shape"/>
+          <p:cNvSpPr/>
+          <p:nvPr>
+            <p:custDataLst>
+              <p:tags r:id="rId47"/>
+            </p:custDataLst>
+          </p:nvPr>
+        </p:nvSpPr>
+        <p:spPr>
+          <a:xfrm rot="16200000">
+            <a:off x="4572000" y="1967756"/>
+            <a:ext cx="165100" cy="165100"/>
+          </a:xfrm>
+          <a:prstGeom prst="flowChartMerge">
+            <a:avLst/>
+          </a:prstGeom>
+          <a:solidFill>
+            <a:srgbClr val="0070C0"/>
+          </a:solidFill>
+          <a:ln w="25400" cap="flat" cmpd="sng" algn="ctr">
+            <a:noFill/>
+            <a:prstDash val="solid"/>
+          </a:ln>
+          <a:effectLst/>
+          <a:scene3d>
+            <a:camera prst="orthographicFront"/>
+            <a:lightRig rig="threePt" dir="t"/>
+          </a:scene3d>
+          <a:sp3d>
+            <a:bevelT h="12700"/>
+          </a:sp3d>
+          <a:extLst>
+            <a:ext uri="{53640926-AAD7-44D8-BBD7-CCE9431645EC}">
+              <a14:shadowObscured xmlns:a14="http://schemas.microsoft.com/office/drawing/2010/main" val="1"/>
+            </a:ext>
+          </a:extLst>
+        </p:spPr>
+        <p:style>
+          <a:lnRef idx="2">
+            <a:schemeClr val="accent1">
+              <a:shade val="50000"/>
+            </a:schemeClr>
+          </a:lnRef>
+          <a:fillRef idx="1">
+            <a:schemeClr val="accent1"/>
+          </a:fillRef>
+          <a:effectRef idx="0">
+            <a:schemeClr val="accent1"/>
+          </a:effectRef>
+          <a:fontRef idx="minor">
+            <a:schemeClr val="lt1"/>
+          </a:fontRef>
+        </p:style>
+        <p:txBody>
+          <a:bodyPr rtlCol="0" anchor="ctr"/>
+          <a:lstStyle/>
+          <a:p>
+            <a:pPr algn="ctr"/>
+            <a:endParaRPr lang="zh-CN" altLang="en-US" sz="1400"/>
+          </a:p>
+        </p:txBody>
+      </p:sp>
+      <p:sp>
+        <p:nvSpPr>
+          <p:cNvPr id="790" name="OTLSHAPE_M_4bad46065aff44fdba3359342bdb43dd_Title"/>
+          <p:cNvSpPr txBox="1"/>
+          <p:nvPr>
+            <p:custDataLst>
+              <p:tags r:id="rId48"/>
+            </p:custDataLst>
+          </p:nvPr>
+        </p:nvSpPr>
+        <p:spPr>
+          <a:xfrm>
+            <a:off x="4788024" y="1939875"/>
+            <a:ext cx="1346200" cy="215444"/>
+          </a:xfrm>
+          <a:prstGeom prst="rect">
+            <a:avLst/>
+          </a:prstGeom>
+          <a:noFill/>
+        </p:spPr>
+        <p:txBody>
+          <a:bodyPr vert="horz" wrap="square" lIns="0" tIns="0" rIns="0" bIns="0" rtlCol="0" anchor="ctr" anchorCtr="0">
+            <a:spAutoFit/>
+          </a:bodyPr>
+          <a:lstStyle/>
+          <a:p>
+            <a:r>
+              <a:rPr lang="en-US" altLang="zh-CN" sz="1400" spc="-8" dirty="0" smtClean="0">
+                <a:solidFill>
+                  <a:schemeClr val="dk1"/>
+                </a:solidFill>
+              </a:rPr>
+              <a:t>SRBM Structure</a:t>
+            </a:r>
+            <a:endParaRPr lang="zh-CN" altLang="en-US" sz="1400" spc="-8" dirty="0">
+              <a:solidFill>
+                <a:schemeClr val="dk1"/>
+              </a:solidFill>
+            </a:endParaRPr>
+          </a:p>
+        </p:txBody>
+      </p:sp>
+      <p:sp>
+        <p:nvSpPr>
+          <p:cNvPr id="791" name="OTLSHAPE_M_4bad46065aff44fdba3359342bdb43dd_Shape"/>
+          <p:cNvSpPr/>
+          <p:nvPr>
+            <p:custDataLst>
+              <p:tags r:id="rId49"/>
+            </p:custDataLst>
+          </p:nvPr>
+        </p:nvSpPr>
+        <p:spPr>
+          <a:xfrm rot="16200000">
+            <a:off x="4932040" y="2183780"/>
+            <a:ext cx="165100" cy="165100"/>
+          </a:xfrm>
+          <a:prstGeom prst="flowChartMerge">
+            <a:avLst/>
+          </a:prstGeom>
+          <a:solidFill>
+            <a:srgbClr val="0070C0"/>
+          </a:solidFill>
+          <a:ln w="25400" cap="flat" cmpd="sng" algn="ctr">
+            <a:noFill/>
+            <a:prstDash val="solid"/>
+          </a:ln>
+          <a:effectLst/>
+          <a:scene3d>
+            <a:camera prst="orthographicFront"/>
+            <a:lightRig rig="threePt" dir="t"/>
+          </a:scene3d>
+          <a:sp3d>
+            <a:bevelT h="12700"/>
+          </a:sp3d>
+          <a:extLst>
+            <a:ext uri="{53640926-AAD7-44D8-BBD7-CCE9431645EC}">
+              <a14:shadowObscured xmlns:a14="http://schemas.microsoft.com/office/drawing/2010/main" val="1"/>
+            </a:ext>
+          </a:extLst>
+        </p:spPr>
+        <p:style>
+          <a:lnRef idx="2">
+            <a:schemeClr val="accent1">
+              <a:shade val="50000"/>
+            </a:schemeClr>
+          </a:lnRef>
+          <a:fillRef idx="1">
+            <a:schemeClr val="accent1"/>
+          </a:fillRef>
+          <a:effectRef idx="0">
+            <a:schemeClr val="accent1"/>
+          </a:effectRef>
+          <a:fontRef idx="minor">
+            <a:schemeClr val="lt1"/>
+          </a:fontRef>
+        </p:style>
+        <p:txBody>
+          <a:bodyPr rtlCol="0" anchor="ctr"/>
+          <a:lstStyle/>
+          <a:p>
+            <a:pPr algn="ctr"/>
+            <a:endParaRPr lang="zh-CN" altLang="en-US" sz="1400"/>
+          </a:p>
+        </p:txBody>
+      </p:sp>
+      <p:sp>
+        <p:nvSpPr>
+          <p:cNvPr id="792" name="OTLSHAPE_M_4bad46065aff44fdba3359342bdb43dd_Title"/>
+          <p:cNvSpPr txBox="1"/>
+          <p:nvPr>
+            <p:custDataLst>
+              <p:tags r:id="rId50"/>
+            </p:custDataLst>
+          </p:nvPr>
+        </p:nvSpPr>
+        <p:spPr>
+          <a:xfrm>
+            <a:off x="5148064" y="2155899"/>
+            <a:ext cx="2304256" cy="215444"/>
+          </a:xfrm>
+          <a:prstGeom prst="rect">
+            <a:avLst/>
+          </a:prstGeom>
+          <a:noFill/>
+        </p:spPr>
+        <p:txBody>
+          <a:bodyPr vert="horz" wrap="square" lIns="0" tIns="0" rIns="0" bIns="0" rtlCol="0" anchor="ctr" anchorCtr="0">
+            <a:spAutoFit/>
+          </a:bodyPr>
+          <a:lstStyle/>
+          <a:p>
+            <a:r>
+              <a:rPr lang="en-US" altLang="zh-CN" sz="1400" spc="-8" dirty="0" smtClean="0">
+                <a:solidFill>
+                  <a:schemeClr val="dk1"/>
+                </a:solidFill>
+              </a:rPr>
+              <a:t>STDP Learning for CD</a:t>
+            </a:r>
+            <a:endParaRPr lang="zh-CN" altLang="en-US" sz="1400" spc="-8" dirty="0">
+              <a:solidFill>
+                <a:schemeClr val="dk1"/>
+              </a:solidFill>
+            </a:endParaRPr>
+          </a:p>
+        </p:txBody>
+      </p:sp>
+      <p:sp>
+        <p:nvSpPr>
+          <p:cNvPr id="793" name="OTLSHAPE_M_4bad46065aff44fdba3359342bdb43dd_Shape"/>
+          <p:cNvSpPr/>
+          <p:nvPr>
+            <p:custDataLst>
+              <p:tags r:id="rId51"/>
+            </p:custDataLst>
+          </p:nvPr>
+        </p:nvSpPr>
+        <p:spPr>
+          <a:xfrm rot="16200000">
+            <a:off x="5314032" y="2399804"/>
+            <a:ext cx="165100" cy="165100"/>
+          </a:xfrm>
+          <a:prstGeom prst="flowChartMerge">
+            <a:avLst/>
+          </a:prstGeom>
+          <a:solidFill>
+            <a:srgbClr val="0070C0"/>
+          </a:solidFill>
+          <a:ln w="25400" cap="flat" cmpd="sng" algn="ctr">
+            <a:noFill/>
+            <a:prstDash val="solid"/>
+          </a:ln>
+          <a:effectLst/>
+          <a:scene3d>
+            <a:camera prst="orthographicFront"/>
+            <a:lightRig rig="threePt" dir="t"/>
+          </a:scene3d>
+          <a:sp3d>
+            <a:bevelT h="12700"/>
+          </a:sp3d>
+          <a:extLst>
+            <a:ext uri="{53640926-AAD7-44D8-BBD7-CCE9431645EC}">
+              <a14:shadowObscured xmlns:a14="http://schemas.microsoft.com/office/drawing/2010/main" val="1"/>
+            </a:ext>
+          </a:extLst>
+        </p:spPr>
+        <p:style>
+          <a:lnRef idx="2">
+            <a:schemeClr val="accent1">
+              <a:shade val="50000"/>
+            </a:schemeClr>
+          </a:lnRef>
+          <a:fillRef idx="1">
+            <a:schemeClr val="accent1"/>
+          </a:fillRef>
+          <a:effectRef idx="0">
+            <a:schemeClr val="accent1"/>
+          </a:effectRef>
+          <a:fontRef idx="minor">
+            <a:schemeClr val="lt1"/>
+          </a:fontRef>
+        </p:style>
+        <p:txBody>
+          <a:bodyPr rtlCol="0" anchor="ctr"/>
+          <a:lstStyle/>
+          <a:p>
+            <a:pPr algn="ctr"/>
+            <a:endParaRPr lang="zh-CN" altLang="en-US" sz="1400"/>
+          </a:p>
+        </p:txBody>
+      </p:sp>
+      <p:sp>
+        <p:nvSpPr>
+          <p:cNvPr id="794" name="OTLSHAPE_M_4bad46065aff44fdba3359342bdb43dd_Title"/>
+          <p:cNvSpPr txBox="1"/>
+          <p:nvPr>
+            <p:custDataLst>
+              <p:tags r:id="rId52"/>
+            </p:custDataLst>
+          </p:nvPr>
+        </p:nvSpPr>
+        <p:spPr>
+          <a:xfrm>
+            <a:off x="5530055" y="2371923"/>
+            <a:ext cx="2213983" cy="215444"/>
+          </a:xfrm>
+          <a:prstGeom prst="rect">
+            <a:avLst/>
+          </a:prstGeom>
+          <a:noFill/>
+        </p:spPr>
+        <p:txBody>
+          <a:bodyPr vert="horz" wrap="square" lIns="0" tIns="0" rIns="0" bIns="0" rtlCol="0" anchor="ctr" anchorCtr="0">
+            <a:spAutoFit/>
+          </a:bodyPr>
+          <a:lstStyle/>
+          <a:p>
+            <a:r>
+              <a:rPr lang="en-US" altLang="zh-CN" sz="1400" spc="-8" dirty="0" smtClean="0">
+                <a:solidFill>
+                  <a:schemeClr val="dk1"/>
+                </a:solidFill>
+              </a:rPr>
+              <a:t>Layered STDP Learning</a:t>
+            </a:r>
+            <a:endParaRPr lang="zh-CN" altLang="en-US" sz="1400" spc="-8" dirty="0">
+              <a:solidFill>
+                <a:schemeClr val="dk1"/>
+              </a:solidFill>
+            </a:endParaRPr>
+          </a:p>
+        </p:txBody>
+      </p:sp>
+    </p:spTree>
+    <p:custDataLst>
+      <p:tags r:id="rId1"/>
+    </p:custDataLst>
+    <p:extLst>
+      <p:ext uri="{BB962C8B-B14F-4D97-AF65-F5344CB8AC3E}">
+        <p14:creationId xmlns:p14="http://schemas.microsoft.com/office/powerpoint/2010/main" val="3077291105"/>
+      </p:ext>
+    </p:extLst>
+  </p:cSld>
+  <p:clrMapOvr>
+    <a:masterClrMapping/>
+  </p:clrMapOvr>
+</p:sld>
+</file>
+
+<file path=ppt/slides/slide12.xml><?xml version="1.0" encoding="utf-8"?>
+<p:sld xmlns:a="http://schemas.openxmlformats.org/drawingml/2006/main" xmlns:r="http://schemas.openxmlformats.org/officeDocument/2006/relationships" xmlns:p="http://schemas.openxmlformats.org/presentationml/2006/main">
+  <p:cSld>
+    <p:spTree>
+      <p:nvGrpSpPr>
+        <p:cNvPr id="1" name=""/>
+        <p:cNvGrpSpPr/>
+        <p:nvPr/>
+      </p:nvGrpSpPr>
+      <p:grpSpPr>
+        <a:xfrm>
+          <a:off x="0" y="0"/>
+          <a:ext cx="0" cy="0"/>
+          <a:chOff x="0" y="0"/>
+          <a:chExt cx="0" cy="0"/>
+        </a:xfrm>
+      </p:grpSpPr>
       <p:sp>
         <p:nvSpPr>
           <p:cNvPr id="134" name="CustomShape 1"/>
@@ -6479,7 +10655,7 @@
               <a:buChar char="•"/>
             </a:pPr>
             <a:r>
-              <a:rPr lang="en-GB" sz="2800">
+              <a:rPr lang="en-GB" sz="2800" dirty="0">
                 <a:solidFill>
                   <a:srgbClr val="000000"/>
                 </a:solidFill>
@@ -6487,7 +10663,7 @@
               </a:rPr>
               <a:t>Validation on Contrastive Divergence</a:t>
             </a:r>
-            <a:endParaRPr/>
+            <a:endParaRPr dirty="0"/>
           </a:p>
           <a:p>
             <a:pPr lvl="1">
@@ -6499,7 +10675,7 @@
               <a:buChar char=""/>
             </a:pPr>
             <a:r>
-              <a:rPr lang="en-GB" sz="2800">
+              <a:rPr lang="en-GB" sz="2800" dirty="0">
                 <a:solidFill>
                   <a:srgbClr val="000000"/>
                 </a:solidFill>
@@ -6507,7 +10683,7 @@
               </a:rPr>
               <a:t>MNIST test</a:t>
             </a:r>
-            <a:endParaRPr/>
+            <a:endParaRPr dirty="0"/>
           </a:p>
           <a:p>
             <a:pPr lvl="1">
@@ -6519,7 +10695,7 @@
               <a:buChar char=""/>
             </a:pPr>
             <a:r>
-              <a:rPr lang="en-GB" sz="2800">
+              <a:rPr lang="en-GB" sz="2800" dirty="0">
                 <a:solidFill>
                   <a:srgbClr val="000000"/>
                 </a:solidFill>
@@ -6527,7 +10703,7 @@
               </a:rPr>
               <a:t>Normal distribution test</a:t>
             </a:r>
-            <a:endParaRPr/>
+            <a:endParaRPr dirty="0"/>
           </a:p>
           <a:p>
             <a:pPr>
@@ -6535,7 +10711,7 @@
                 <a:spcPct val="100000"/>
               </a:lnSpc>
             </a:pPr>
-            <a:endParaRPr/>
+            <a:endParaRPr dirty="0"/>
           </a:p>
         </p:txBody>
       </p:sp>
@@ -6572,6 +10748,505 @@
     </p:tnLst>
   </p:timing>
 </p:sld>
+</file>
+
+<file path=ppt/tags/tag1.xml><?xml version="1.0" encoding="utf-8"?>
+<p:tagLst xmlns:a="http://schemas.openxmlformats.org/drawingml/2006/main" xmlns:r="http://schemas.openxmlformats.org/officeDocument/2006/relationships" xmlns:p="http://schemas.openxmlformats.org/presentationml/2006/main">
+  <p:tag name="__PART_0" val="eyIkaWQiOiIxIiwiQ3VsdHVyZUluZm9OYW1lIjoiemgtQ04iLCJTdHlsZU5hbWUiOiJTdGFuZGFyZCIsIklzVGVtcGxhdGUiOmZhbHNlLCJWZXJzaW9uIjp7IiRpZCI6IjIiLCJWZXJzaW9uIjoiMy4wLjEiLCJPcmlnaW5hbEFzc2VtYmx5VmVyc2lvbiI6IjMuMDMuMDEuMDAiLCJFZGl0aW9uIjoiQmFzaWMiLCJJc1BsdXNFZGl0aW9uIjpmYWxzZX0sIkVmZmVjdCI6MSwiU3R5bGUiOnsiJGlkIjoiMyIsIlRpbWViYW5kU3R5bGUiOnsiJGlkIjoiNCIsIlNjYWxlTWFya2luZyI6MCwiU2hhcGUiOjAsIlNoYXBlU3R5bGUiOnsiJGlkIjoiNSIsIk1hcmdpbiI6eyIkaWQiOiI2IiwiVG9wIjowLCJMZWZ0IjoxMiwiUmlnaHQiOjEyLCJCb3R0b20iOjB9LCJQYWRkaW5nIjp7IiRpZCI6IjciLCJUb3AiOjUsIkxlZnQiOjAsIlJpZ2h0IjowLCJCb3R0b20iOjV9LCJCYWNrZ3JvdW5kIjp7IiRpZCI6IjgiLCJDb2xvciI6eyIkaWQiOiI5IiwiQSI6MjU1LCJSIjo4MCwiRyI6MTQsIkIiOjEyNX19LCJJc1Zpc2libGUiOnRydWUsIldpZHRoIjo4NTguMCwiSGVpZ2h0IjozMC4wLCJCb3JkZXJTdHlsZSI6eyIkaWQiOiIxMCIsIkxpbmVDb2xvciI6eyIkaWQiOiIxMSIsIiR0eXBlIjoiTkxSRS5Db21tb24uRG9tLlNvbGlkQ29sb3JCcnVzaCwgTkxSRS5Db21tb24iLCJDb2xvciI6eyIkaWQiOiIxMiIsIkEiOjI1NSwiUiI6MjU1LCJHIjowLCJCIjowfX0sIkxpbmVXZWlnaHQiOjAuMCwiTGluZVR5cGUiOjAsIlBhcmVudFN0eWxlIjpudWxsfSwiUGFyZW50U3R5bGUiOm51bGx9LCJSaWdodEVuZENhcHNTdHlsZSI6eyIkaWQiOiIxMyIsIkZvbnRTZXR0aW5ncyI6eyIkaWQiOiIxNCIsIkZvbnRTaXplIjoxOCwiRm9udE5hbWUiOiJDYWxpYnJpIiwiSXNCb2xkIjp0cnVlLCJJc0l0YWxpYyI6ZmFsc2UsIklzVW5kZXJsaW5lZCI6ZmFsc2UsIlBhcmVudFN0eWxlIjpudWxsfSwiQXV0b1NpemUiOjAsIkZvcmVncm91bmQiOnsiJGlkIjoiMTUiLCJDb2xvciI6eyIkaWQiOiIxNiIsIkEiOjI1NSwiUiI6MTkyLCJHIjo4MCwiQiI6Nzd9fSwiTWF4V2lkdGgiOiJJbmZpbml0eSIsIk1heEhlaWdodCI6IkluZmluaXR5IiwiU21hcnRGb3JlZ3JvdW5kSXNBY3RpdmUiOmZhbHNlLCJIb3Jpem9udGFsQWxpZ25tZW50IjowLCJWZXJ0aWNhbEFsaWdubWVudCI6MCwiU21hcnRGb3JlZ3JvdW5kIjpudWxsLCJNYXJnaW4iOnsiJGlkIjoiMTciLCJUb3AiOjAsIkxlZnQiOjAsIlJpZ2h0IjoyNSwiQm90dG9tIjowfSwiUGFkZGluZyI6eyIkaWQiOiIxOCIsIlRvcCI6MCwiTGVmdCI6MCwiUmlnaHQiOjAsIkJvdHRvbSI6MH0sIkJhY2tncm91bmQiOnsiJGlkIjoiMTkiLCJDb2xvciI6eyIkaWQiOiIyMCIsIkEiOjg5LCJSIjowLCJHIjowLCJCIjowfX0sIklzVmlzaWJsZSI6ZmFsc2UsIldpZHRoIjowLjAsIkhlaWdodCI6MC4wLCJCb3JkZXJTdHlsZSI6bnVsbCwiUGFyZW50U3R5bGUiOm51bGx9LCJMZWZ0RW5kQ2Fwc1N0eWxlIjp7IiRpZCI6IjIxIiwiRm9udFNldHRpbmdzIjp7IiRpZCI6IjIyIiwiRm9udFNpemUiOjE4LCJGb250TmFtZSI6IkNhbGlicmkiLCJJc0JvbGQiOnRydWUsIklzSXRhbGljIjpmYWxzZSwiSXNVbmRlcmxpbmVkIjpmYWxzZSwiUGFyZW50U3R5bGUiOm51bGx9LCJBdXRvU2l6ZSI6MCwiRm9yZWdyb3VuZCI6eyIkaWQiOiIyMyIsIkNvbG9yIjp7IiRpZCI6IjI0IiwiQSI6MjU1LCJSIjoxOTIsIkciOjgwLCJCIjo3N319LCJNYXhXaWR0aCI6IkluZmluaXR5IiwiTWF4SGVpZ2h0IjoiSW5maW5pdHkiLCJTbWFydEZvcmVncm91bmRJc0FjdGl2ZSI6ZmFsc2UsIkhvcml6b250YWxBbGlnbm1lbnQiOjAsIlZlcnRpY2FsQWxpZ25tZW50IjowLCJTbWFydEZvcmVncm91bmQiOm51bGwsIk1hcmdpbiI6eyIkaWQiOiIyNSIsIlRvcCI6MCwiTGVmdCI6MjUsIlJpZ2h0IjowLCJCb3R0b20iOjB9LCJQYWRkaW5nIjp7IiRpZCI6IjI2IiwiVG9wIjowLCJMZWZ0IjowLCJSaWdodCI6MCwiQm90dG9tIjowfSwiQmFja2dyb3VuZCI6eyIkaWQiOiIyNyIsIkNvbG9yIjp7IiRyZWYiOiIyMCJ9fSwiSXNWaXNpYmxlIjpmYWxzZSwiV2lkdGgiOjAuMCwiSGVpZ2h0IjowLjAsIkJvcmRlclN0eWxlIjpudWxsLCJQYXJlbnRTdHlsZSI6bnVsbH0sIlRvZGF5VGV4dFN0eWxlIjp7IiRpZCI6IjI4IiwiRm9udFNldHRpbmdzIjp7IiRpZCI6IjI5IiwiRm9udFNpemUiOjEyLCJGb250TmFtZSI6IkNhbGlicmkiLCJJc0JvbGQiOmZhbHNlLCJJc0l0YWxpYyI6ZmFsc2UsIklzVW5kZXJsaW5lZCI6ZmFsc2UsIlBhcmVudFN0eWxlIjpudWxsfSwiQXV0b1NpemUiOjAsIkZvcmVncm91bmQiOnsiJGlkIjoiMzAiLCJDb2xvciI6eyIkaWQiOiIzMSIsIkEiOjI1NSwiUiI6MCwiRyI6MCwiQiI6MH19LCJNYXhXaWR0aCI6MjAwLjAsIk1heEhlaWdodCI6IkluZmluaXR5IiwiU21hcnRGb3JlZ3JvdW5kSXNBY3RpdmUiOmZhbHNlLCJIb3Jpem9udGFsQWxpZ25tZW50IjowLCJWZXJ0aWNhbEFsaWdubWVudCI6MCwiU21hcnRGb3JlZ3JvdW5kIjpudWxsLCJNYXJnaW4iOnsiJGlkIjoiMzIiLCJUb3AiOjAsIkxlZnQiOjAsIlJpZ2h0IjowLCJCb3R0b20iOjB9LCJQYWRkaW5nIjp7IiRpZCI6IjMzIiwiVG9wIjowLCJMZWZ0IjowLCJSaWdodCI6MCwiQm90dG9tIjowfSwiQmFja2dyb3VuZCI6eyIkaWQiOiIzNCIsIkNvbG9yIjp7IiRyZWYiOiIyMCJ9fSwiSXNWaXNpYmxlIjp0cnVlLCJXaWR0aCI6MC4wLCJIZWlnaHQiOjAuMCwiQm9yZGVyU3R5bGUiOm51bGwsIlBhcmVudFN0eWxlIjpudWxsfSwiVG9kYXlNYXJrZXJTdHlsZSI6eyIkaWQiOiIzNSIsIk1hcmdpbiI6eyIkaWQiOiIzNiIsIlRvcCI6MCwiTGVmdCI6MCwiUmlnaHQiOjAsIkJvdHRvbSI6MH0sIlBhZGRpbmciOnsiJGlkIjoiMzciLCJUb3AiOjAsIkxlZnQiOjAsIlJpZ2h0IjowLCJCb3R0b20iOjB9LCJCYWNrZ3JvdW5kIjp7IiRpZCI6IjM4IiwiQ29sb3IiOnsiJGlkIjoiMzkiLCJBIjoyNTUsIlIiOjI1NSwiRyI6MCwiQiI6MH19LCJJc1Zpc2libGUiOnRydWUsIldpZHRoIjowLjAsIkhlaWdodCI6MC4wLCJCb3JkZXJTdHlsZSI6bnVsbCwiUGFyZW50U3R5bGUiOm51bGx9LCJTY2FsZVN0eWxlIjp7IiRpZCI6IjQwIiwiU2hvd1NlZ21lbnRTZXBhcmF0b3JzIjp0cnVlLCJTZWdtZW50U2VwYXJhdG9yT3BhY2l0eSI6MzAsIkZvbnRTZXR0aW5ncyI6eyIkaWQiOiI0MSIsIkZvbnRTaXplIjoxMiwiRm9udE5hbWUiOiJDYWxpYnJpIiwiSXNCb2xkIjpmYWxzZSwiSXNJdGFsaWMiOmZhbHNlLCJJc1VuZGVybGluZWQiOmZhbHNlLCJQYXJlbnRTdHlsZSI6bnVsbH0sIkF1dG9TaXplIjowLCJGb3JlZ3JvdW5kIjp7IiRpZCI6IjQyIiwiQ29sb3IiOnsiJGlkIjoiNDMiLCJBIjoyNTUsIlIiOjI1NSwiRyI6MjU1LCJCIjoyNTV9fSwiTWF4V2lkdGgiOjIwMC4wLCJNYXhIZWlnaHQiOiJJbmZpbml0eSIsIlNtYXJ0Rm9yZWdyb3VuZElzQWN0aXZlIjpmYWxzZSwiSG9yaXpvbnRhbEFsaWdubWVudCI6MCwiVmVydGljYWxBbGlnbm1lbnQiOjEsIlNtYXJ0Rm9yZWdyb3VuZCI6bnVsbCwiTWFyZ2luIjp7IiRpZCI6IjQ0IiwiVG9wIjowLCJMZWZ0Ijo1LCJSaWdodCI6MCwiQm90dG9tIjowfSwiUGFkZGluZyI6eyIkaWQiOiI0NSIsIlRvcCI6MCwiTGVmdCI6MCwiUmlnaHQiOjAsIkJvdHRvbSI6MH0sIkJhY2tncm91bmQiOnsiJGlkIjoiNDYiLCJDb2xvciI6eyIkcmVmIjoiMjAifX0sIklzVmlzaWJsZSI6dHJ1ZSwiV2lkdGgiOjAuMCwiSGVpZ2h0IjowLjAsIkJvcmRlclN0eWxlIjpudWxsLCJQYXJlbnRTdHlsZSI6bnVsbH0sIkVsYXBzZWRUaW1lQmFja2dyb3VuZCI6eyIkaWQiOiI0NyIsIkNvbG9yIjp7IiRpZCI6IjQ4IiwiQSI6MTkxLCJSIjoyNTUsIkciOjAsIkIiOjB9fSwiQXBwZW5kWWVhck9uWWVhckNoYW5nZSI6dHJ1ZSwiRWxhcHNlZFRpbWVGb3JtYXQiOjIsIlRvZGF5TWFya2VyUG9zaXRpb24iOjMsIlF1aWNrUG9zaXRpb24iOjEsIkFic29sdXRlUG9zaXRpb24iOjI0MC4wLCJNYXJnaW4iOnsiJGlkIjoiNDkiLCJUb3AiOjAsIkxlZnQiOjEwLCJSaWdodCI6MTAsIkJvdHRvbSI6MH0sIlBhZGRpbmciOnsiJGlkIjoiNTAiLCJUb3AiOjAsIkxlZnQiOjAsIlJpZ2h0IjowLCJCb3R0b20iOjB9LCJCYWNrZ3JvdW5kIjp7IiRpZCI6IjUxIiwiQ29sb3IiOnsiJGlkIjoiNTIiLCJBIjoyNTUsIlIiOjMxLCJHIjo3MywiQiI6MTI1fX0sIklzVmlzaWJsZSI6dHJ1ZSwiV2lkdGgiOjAuMCwiSGVpZ2h0IjowLjAsIkJvcmRlclN0eWxlIjpudWxsLCJQYXJlbnRTdHlsZSI6bnVsbH0sIkRlZmF1bHRNaWxlc3RvbmVTdHlsZSI6eyIkaWQiOiI1MyIsIlNoYXBlIjoyLCJDb25uZWN0b3JNYXJnaW4iOnsiJGlkIjoiNTQiLCJUb3AiOjAsIkxlZnQiOjIsIlJpZ2h0IjoyLCJCb3R0b20iOjB9LCJDb25uZWN0b3JTdHlsZSI6eyIkaWQiOiI1NSIsIkxpbmVDb2xvciI6eyIkaWQiOiI1NiIsIiR0eXBlIjoiTkxSRS5Db21tb24uRG9tLlNvbGlkQ29sb3JCcnVzaCwgTkxSRS5Db21tb24iLCJDb2xvciI6eyIkaWQiOiI1NyIsIkEiOjI1NSwiUiI6MzEsIkciOjczLCJCIjoxMjZ9fSwiTGluZVdlaWdodCI6MS4wLCJMaW5lVHlwZSI6MCwiUGFyZW50U3R5bGUiOm51bGx9LCJJc0JlbG93VGltZWJhbmQiOmZhbHNlLCJIaWRlRGF0ZSI6ZmFsc2UsIlNoYXBlU2l6ZSI6MSwiU3BhY2luZyI6MS4wLCJQYWRkaW5nIjp7IiRpZCI6IjU4IiwiVG9wIjo3LCJMZWZ0IjozLCJSaWdodCI6MCwiQm90dG9tIjoyfSwiU2hhcGVTdHlsZSI6eyIkaWQiOiI1OSIsIk1hcmdpbiI6eyIkaWQiOiI2MCIsIlRvcCI6MCwiTGVmdCI6MCwiUmlnaHQiOjAsIkJvdHRvbSI6MH0sIlBhZGRpbmciOnsiJGlkIjoiNjEiLCJUb3AiOjAsIkxlZnQiOjAsIlJpZ2h0IjowLCJCb3R0b20iOjB9LCJCYWNrZ3JvdW5kIjpudWxsLCJJc1Zpc2libGUiOnRydWUsIldpZHRoIjoxOC4wLCJIZWlnaHQiOjIwLjAsIkJvcmRlclN0eWxlIjp7IiRpZCI6IjYyIiwiTGluZUNvbG9yIjp7IiRpZCI6IjYzIiwiJHR5cGUiOiJOTFJFLkNvbW1vbi5Eb20uU29saWRDb2xvckJydXNoLCBOTFJFLkNvbW1vbiIsIkNvbG9yIjp7IiRpZCI6IjY0IiwiQSI6MjU1LCJSIjoyNTUsIkciOjAsIkIiOjB9fSwiTGluZVdlaWdodCI6MC4wLCJMaW5lVHlwZSI6MCwiUGFyZW50U3R5bGUiOm51bGx9LCJQYXJlbnRTdHlsZSI6bnVsbH0sIlRpdGxlU3R5bGUiOnsiJGlkIjoiNjUiLCJGb250U2V0dGluZ3MiOnsiJGlkIjoiNjYiLCJGb250U2l6ZSI6MTEsIkZvbnROYW1lIjoiQ2FsaWJyaSIsIklzQm9sZCI6dHJ1ZSwiSXNJdGFsaWMiOmZhbHNlLCJJc1VuZGVybGluZWQiOmZhbHNlLCJQYXJlbnRTdHlsZSI6bnVsbH0sIkF1dG9TaXplIjowLCJGb3JlZ3JvdW5kIjp7IiRpZCI6IjY3IiwiQ29sb3IiOnsiJGlkIjoiNjgiLCJBIjoyNTUsIlIiOjAsIkciOjAsIkIiOjB9fSwiTWF4V2lkdGgiOjIwMC4wLCJNYXhIZWlnaHQiOiJJbmZpbml0eSIsIlNtYXJ0Rm9yZWdyb3VuZElzQWN0aXZlIjpmYWxzZSwiSG9yaXpvbnRhbEFsaWdubWVudCI6MCwiVmVydGljYWxBbGlnbm1lbnQiOjAsIlNtYXJ0Rm9yZWdyb3VuZCI6bnVsbCwiTWFyZ2luIjp7IiRpZCI6IjY5IiwiVG9wIjowLCJMZWZ0IjowLCJSaWdodCI6MCwiQm90dG9tIjowfSwiUGFkZGluZyI6eyIkaWQiOiI3MCIsIlRvcCI6MCwiTGVmdCI6MCwiUmlnaHQiOjAsIkJvdHRvbSI6MH0sIkJhY2tncm91bmQiOnsiJGlkIjoiNzEiLCJDb2xvciI6eyIkcmVmIjoiMjAifX0sIklzVmlzaWJsZSI6dHJ1ZSwiV2lkdGgiOjAuMCwiSGVpZ2h0IjowLjAsIkJvcmRlclN0eWxlIjpudWxsLCJQYXJlbnRTdHlsZSI6bnVsbH0sIkRhdGVTdHlsZSI6eyIkaWQiOiI3MiIsIkZvbnRTZXR0aW5ncyI6eyIkaWQiOiI3MyIsIkZvbnRTaXplIjoxMCwiRm9udE5hbWUiOiJDYWxpYnJpIiwiSXNCb2xkIjpmYWxzZSwiSXNJdGFsaWMiOmZhbHNlLCJJc1VuZGVybGluZWQiOmZhbHNlLCJQYXJlbnRTdHlsZSI6bnVsbH0sIkF1dG9TaXplIjowLCJGb3JlZ3JvdW5kIjp7IiRpZCI6Ijc0IiwiQ29sb3IiOnsiJGlkIjoiNzUiLCJBIjoyNTUsIlIiOjMxLCJHIjo3MywiQiI6MTI2fX0sIk1heFdpZHRoIjoyMDAuMCwiTWF4SGVpZ2h0IjoiSW5maW5pdHkiLCJTbWFydEZvcmVncm91bmRJc0FjdGl2ZSI6ZmFsc2UsIkhvcml6b250YWxBbGlnbm1lbnQiOjAsIlZlcnRpY2FsQWxpZ25tZW50IjowLCJTbWFydEZvcmVncm91bmQiOm51bGwsIk1hcmdpbiI6eyIkaWQiOiI3NiIsIlRvcCI6MCwiTGVmdCI6MCwiUmlnaHQiOjAsIkJvdHRvbSI6MH0sIlBhZGRpbmciOnsiJGlkIjoiNzciLCJUb3AiOjAsIkxlZnQiOjAsIlJpZ2h0IjowLCJCb3R0b20iOjB9LCJCYWNrZ3JvdW5kIjp7IiRpZCI6Ijc4IiwiQ29sb3IiOnsiJHJlZiI6IjIwIn19LCJJc1Zpc2libGUiOnRydWUsIldpZHRoIjowLjAsIkhlaWdodCI6MC4wLCJCb3JkZXJTdHlsZSI6bnVsbCwiUGFyZW50U3R5bGUiOm51bGx9LCJEYXRlRm9ybWF0Ijp7IiRpZCI6Ijc5IiwiRm9ybWF0U3RyaW5nIjoiTS9kL3l5eXkiLCJTZXBhcmF0b3IiOiIvIiwiVXNlSW50ZXJuYXRpb25hbERhdGVGb3JtYXQiOmZhbHNlfSwiSXNWaXNpYmxlIjp0cnVlLCJQYXJlbnRTdHlsZSI6bnVsbH0sIkRlZmF1bHRUYXNrU3R5bGUiOnsiJGlkIjoiODAiLCJTaGFwZSI6MCwiU2hhcGVUaGlja25lc3MiOjEsIkR1cmF0aW9uRm9ybWF0IjowLCJJbmNsdWRlTm9uV29ya2luZ0RheXNJbkR1cmF0aW9uIjp0cnVlLCJQZXJjZW50YWdlQ29tcGxldGVTdHlsZSI6eyIkaWQiOiI4MSIsIkZvbnRTZXR0aW5ncyI6eyIkaWQiOiI4MiIsIkZvbnRTaXplIjoxMCwiRm9udE5hbWUiOiJDYWxpYnJpIiwiSXNCb2xkIjpmYWxzZSwiSXNJdGFsaWMiOmZhbHNlLCJJc1VuZGVybGluZWQiOmZhbHNlLCJQYXJlbnRTdHlsZSI6bnVsbH0sIkF1dG9TaXplIjowLCJGb3JlZ3JvdW5kIjp7IiRpZCI6IjgzIiwiQ29sb3IiOnsiJGlkIjoiODQiLCJBIjoyNTUsIlIiOjE5MiwiRyI6ODAsIkIiOjc3fX0sIk1heFdpZHRoIjoyMDAuMCwiTWF4SGVpZ2h0IjoiSW5maW5pdHkiLCJTbWFydEZvcmVncm91bmRJc0FjdGl2ZSI6ZmFsc2UsIkhvcml6b250YWxBbGlnbm1lbnQiOjAsIlZlcnRpY2FsQWxpZ25tZW50IjowLCJTbWFydEZvcmVncm91bmQiOm51bGwsIk1hcmdpbiI6eyIkaWQiOiI4NSIsIlRvcCI6MCwiTGVmdCI6MCwiUmlnaHQiOjAsIkJvdHRvbSI6MH0sIlBhZGRpbmciOnsiJGlkIjoiODYiLCJUb3AiOjAsIkxlZnQiOjAsIlJpZ2h0IjowLCJCb3R0b20iOjB9LCJCYWNrZ3JvdW5kIjp7IiRpZCI6Ijg3IiwiQ29sb3IiOnsiJHJlZiI6IjIwIn19LCJJc1Zpc2libGUiOnRydWUsIldpZHRoIjowLjAsIkhlaWdodCI6MC4wLCJCb3JkZXJTdHlsZSI6bnVsbCwiUGFyZW50U3R5bGUiOm51bGx9LCJEdXJhdGlvblN0eWxlIjp7IiRpZCI6Ijg4IiwiRm9udFNldHRpbmdzIjp7IiRpZCI6Ijg5IiwiRm9udFNpemUiOjEwLCJGb250TmFtZSI6IkNhbGlicmkiLCJJc0JvbGQiOmZhbHNlLCJJc0l0YWxpYyI6ZmFsc2UsIklzVW5kZXJsaW5lZCI6ZmFsc2UsIlBhcmVudFN0eWxlIjpudWxsfSwiQXV0b1NpemUiOjAsIkZvcmVncm91bmQiOnsiJGlkIjoiOTAiLCJDb2xvciI6eyIkaWQiOiI5MSIsIkEiOjI1NSwiUiI6MTkyLCJHIjo4MCwiQiI6Nzd9fSwiTWF4V2lkdGgiOjIwMC4wLCJNYXhIZWlnaHQiOiJJbmZpbml0eSIsIlNtYXJ0Rm9yZWdyb3VuZElzQWN0aXZlIjpmYWxzZSwiSG9yaXpvbnRhbEFsaWdubWVudCI6MCwiVmVydGljYWxBbGlnbm1lbnQiOjAsIlNtYXJ0Rm9yZWdyb3VuZCI6bnVsbCwiTWFyZ2luIjp7IiRpZCI6IjkyIiwiVG9wIjowLCJMZWZ0IjowLCJSaWdodCI6MCwiQm90dG9tIjowfSwiUGFkZGluZyI6eyIkaWQiOiI5MyIsIlRvcCI6MCwiTGVmdCI6MCwiUmlnaHQiOjAsIkJvdHRvbSI6MH0sIkJhY2tncm91bmQiOnsiJGlkIjoiOTQiLCJDb2xvciI6eyIkcmVmIjoiMjAifX0sIklzVmlzaWJsZSI6dHJ1ZSwiV2lkdGgiOjAuMCwiSGVpZ2h0IjowLjAsIkJvcmRlclN0eWxlIjpudWxsLCJQYXJlbnRTdHlsZSI6bnVsbH0sIkhvcml6b250YWxDb25uZWN0b3JTdHlsZSI6eyIkaWQiOiI5NSIsIkxpbmVDb2xvciI6eyIkaWQiOiI5NiIsIiR0eXBlIjoiTkxSRS5Db21tb24uRG9tLlNvbGlkQ29sb3JCcnVzaCwgTkxSRS5Db21tb24iLCJDb2xvciI6eyIkaWQiOiI5NyIsIkEiOjI1NSwiUiI6MjA0LCJHIjoyMDQsIkIiOjIwNH19LCJMaW5lV2VpZ2h0IjoxLjAsIkxpbmVUeXBlIjowLCJQYXJlbnRTdHlsZSI6bnVsbH0sIlZlcnRpY2FsQ29ubmVjdG9yU3R5bGUiOnsiJGlkIjoiOTgiLCJMaW5lQ29sb3IiOnsiJGlkIjoiOTkiLCIkdHlwZSI6Ik5MUkUuQ29tbW9uLkRvbS5Tb2xpZENvbG9yQnJ1c2gsIE5MUkUuQ29tbW9uIiwiQ29sb3IiOnsiJGlkIjoiMTAwIiwiQSI6MjU1LCJSIjoyMDQsIkciOjIwNCwiQiI6MjA0fX0sIkxpbmVXZWlnaHQiOjAuMCwiTGluZVR5cGUiOjAsIlBhcmVudFN0eWxlIjpudWxsfSwiTWFyZ2luIjpudWxsLCJTdGFydERhdGVQb3NpdGlvbiI6NCwiRW5kRGF0ZVBvc2l0aW9uIjo0LCJUaXRsZVBvc2l0aW9uIjo1LCJEdXJhdGlvblBvc2l0aW9uIjo2LCJQZXJjZW50YWdlQ29tcGxldGVkUG9zaXRpb24iOjYsIlNwYWNpbmciOjUsIklzQmVsb3dUaW1lYmFuZCI6dHJ1ZSwiUGVyY2VudGFnZUNvbXBsZXRlU2hhcGVPcGFjaXR5IjozNSwiU2hhcGVTdHlsZSI6eyIkaWQiOiIxMDEiLCJNYXJnaW4iOnsiJGlkIjoiMTAyIiwiVG9wIjowLCJMZWZ0Ijo0LCJSaWdodCI6NCwiQm90dG9tIjowfSwiUGFkZGluZyI6eyIkaWQiOiIxMDMiLCJUb3AiOjAsIkxlZnQiOjAsIlJpZ2h0IjowLCJCb3R0b20iOjB9LCJCYWNrZ3JvdW5kIjpudWxsLCJJc1Zpc2libGUiOnRydWUsIldpZHRoIjowLjAsIkhlaWdodCI6MTYuMCwiQm9yZGVyU3R5bGUiOnsiJGlkIjoiMTA0IiwiTGluZUNvbG9yIjp7IiRpZCI6IjEwNSIsIiR0eXBlIjoiTkxSRS5Db21tb24uRG9tLlNvbGlkQ29sb3JCcnVzaCwgTkxSRS5Db21tb24iLCJDb2xvciI6eyIkaWQiOiIxMDYiLCJBIjoyNTUsIlIiOjI1NSwiRyI6MCwiQiI6MH19LCJMaW5lV2VpZ2h0IjowLjAsIkxpbmVUeXBlIjowLCJQYXJlbnRTdHlsZSI6bnVsbH0sIlBhcmVudFN0eWxlIjpudWxsfSwiVGl0bGVTdHlsZSI6eyIkaWQiOiIxMDciLCJGb250U2V0dGluZ3MiOnsiJGlkIjoiMTA4IiwiRm9udFNpemUiOjExLCJGb250TmFtZSI6IkNhbGlicmkiLCJJc0JvbGQiOnRydWUsIklzSXRhbGljIjpmYWxzZSwiSXNVbmRlcmxpbmVkIjpmYWxzZSwiUGFyZW50U3R5bGUiOm51bGx9LCJBdXRvU2l6ZSI6MCwiRm9yZWdyb3VuZCI6eyIkaWQiOiIxMDkiLCJDb2xvciI6eyIkaWQiOiIxMTAiLCJBIjoyNTUsIlIiOjAsIkciOjAsIkIiOjB9fSwiTWF4V2lkdGgiOjcyMC4wLCJNYXhIZWlnaHQiOiJJbmZpbml0eSIsIlNtYXJ0Rm9yZWdyb3VuZElzQWN0aXZlIjpmYWxzZSwiSG9yaXpvbnRhbEFsaWdubWVudCI6MCwiVmVydGljYWxBbGlnbm1lbnQiOjAsIlNtYXJ0Rm9yZWdyb3VuZCI6bnVsbCwiTWFyZ2luIjp7IiRpZCI6IjExMSIsIlRvcCI6MCwiTGVmdCI6MCwiUmlnaHQiOjAsIkJvdHRvbSI6MH0sIlBhZGRpbmciOnsiJGlkIjoiMTEyIiwiVG9wIjowLCJMZWZ0IjowLCJSaWdodCI6MCwiQm90dG9tIjowfSwiQmFja2dyb3VuZCI6eyIkaWQiOiIxMTMiLCJDb2xvciI6eyIkcmVmIjoiMjAifX0sIklzVmlzaWJsZSI6dHJ1ZSwiV2lkdGgiOjAuMCwiSGVpZ2h0IjowLjAsIkJvcmRlclN0eWxlIjpudWxsLCJQYXJlbnRTdHlsZSI6bnVsbH0sIkRhdGVTdHlsZSI6eyIkaWQiOiIxMTQiLCJGb250U2V0dGluZ3MiOnsiJGlkIjoiMTE1IiwiRm9udFNpemUiOjEwLCJGb250TmFtZSI6IkNhbGlicmkiLCJJc0JvbGQiOmZhbHNlLCJJc0l0YWxpYyI6ZmFsc2UsIklzVW5kZXJsaW5lZCI6ZmFsc2UsIlBhcmVudFN0eWxlIjpudWxsfSwiQXV0b1NpemUiOjAsIkZvcmVncm91bmQiOnsiJGlkIjoiMTE2IiwiQ29sb3IiOnsiJGlkIjoiMTE3IiwiQSI6MjU1LCJSIjozMSwiRyI6NzMsIkIiOjEyNn19LCJNYXhXaWR0aCI6MjAwLjAsIk1heEhlaWdodCI6IkluZmluaXR5IiwiU21hcnRGb3JlZ3JvdW5kSXNBY3RpdmUiOmZhbHNlLCJIb3Jpem9udGFsQWxpZ25tZW50IjowLCJWZXJ0aWNhbEFsaWdubWVudCI6MCwiU21hcnRGb3JlZ3JvdW5kIjpudWxsLCJNYXJnaW4iOnsiJGlkIjoiMTE4IiwiVG9wIjowLCJMZWZ0IjowLCJSaWdodCI6MCwiQm90dG9tIjowfSwiUGFkZGluZyI6eyIkaWQiOiIxMTkiLCJUb3AiOjAsIkxlZnQiOjAsIlJpZ2h0IjowLCJCb3R0b20iOjB9LCJCYWNrZ3JvdW5kIjp7IiRpZCI6IjEyMCIsIkNvbG9yIjp7IiRyZWYiOiIyMCJ9fSwiSXNWaXNpYmxlIjp0cnVlLCJXaWR0aCI6MC4wLCJIZWlnaHQiOjAuMCwiQm9yZGVyU3R5bGUiOm51bGwsIlBhcmVudFN0eWxlIjpudWxsfSwiRGF0ZUZvcm1hdCI6eyIkaWQiOiIxMjEiLCJGb3JtYXRTdHJpbmciOiJNL2QveXl5eSIsIlNlcGFyYXRvciI6Ii8iLCJVc2VJbnRlcm5hdGlvbmFsRGF0ZUZvcm1hdCI6ZmFsc2V9LCJJc1Zpc2libGUiOnRydWUsIlBhcmVudFN0eWxlIjpudWxsfSwiU2hvd0VsYXBzZWRUaW1lR3JhZGllbnRTdHlsZSI6ZmFsc2V9LCJTY2FsZSI6eyIkaWQiOiIxMjIiLCJTdGFydERhdGUiOiIyMDE1LTEwLTAxVDAwOjAwOjAwWiIsIkVuZERhdGUiOiIyMDE2LTEyLTAxVDIzOjU5OjU5Ljk5OVoiLCJGb3JtYXQiOiJNTU0iLCJUeXBlIjozLCJBdXRvRGF0ZVJhbmdlIjp0cnVlLCJXb3JraW5nRGF5cyI6MzEsIlRvZGF5TWFya2VyVGV4dCI6IlRvZGF5IiwiQXV0b1NjYWxlVHlwZSI6ZmFsc2V9LCJNaWxlc3RvbmVzIjpbeyIkaWQiOiIxMjMiLCJEYXRlIjoiMjAxNS0xMC0xMFQyMzo1OTo1OS45OTlaIiwiU3R5bGUiOnsiJGlkIjoiMTI0IiwiU2hhcGUiOjIsIkNvbm5lY3Rvck1hcmdpbiI6eyIkcmVmIjoiNTQifSwiQ29ubmVjdG9yU3R5bGUiOnsiJGlkIjoiMTI1IiwiTGluZUNvbG9yIjp7IiRpZCI6IjEyNiIsIiR0eXBlIjoiTkxSRS5Db21tb24uRG9tLlNvbGlkQ29sb3JCcnVzaCwgTkxSRS5Db21tb24iLCJDb2xvciI6eyIkaWQiOiIxMjciLCJBIjoxMjcsIlIiOjIzNCwiRyI6MjIsIkIiOjMwfX0sIkxpbmVXZWlnaHQiOjEuMCwiTGluZVR5cGUiOjAsIlBhcmVudFN0eWxlIjp7IiRyZWYiOiI1NSJ9fSwiSXNCZWxvd1RpbWViYW5kIjpmYWxzZSwiSGlkZURhdGUiOmZhbHNlLCJTaGFwZVNpemUiOjEsIlNwYWNpbmciOjEuMCwiUGFkZGluZyI6eyIkcmVmIjoiNTgifSwiU2hhcGVTdHlsZSI6eyIkaWQiOiIxMjgiLCJNYXJnaW4iOnsiJHJlZiI6IjYwIn0sIlBhZGRpbmciOnsiJHJlZiI6IjYxIn0sIkJhY2tncm91bmQiOnsiJGlkIjoiMTI5IiwiQ29sb3IiOnsiJGlkIjoiMTMwIiwiQSI6MjU1LCJSIjoyMzQsIkciOjIyLCJCIjozMH19LCJJc1Zpc2libGUiOnRydWUsIldpZHRoIjoxOC4wLCJIZWlnaHQiOjIwLjAsIkJvcmRlclN0eWxlIjp7IiRpZCI6IjEzMSIsIkxpbmVDb2xvciI6eyIkcmVmIjoiNjMifSwiTGluZVdlaWdodCI6MC4wLCJMaW5lVHlwZSI6MCwiUGFyZW50U3R5bGUiOnsiJHJlZiI6IjYyIn19LCJQYXJlbnRTdHlsZSI6eyIkcmVmIjoiNTkifX0sIlRpdGxlU3R5bGUiOnsiJGlkIjoiMTMyIiwiRm9udFNldHRpbmdzIjp7IiRpZCI6IjEzMyIsIkZvbnRTaXplIjoxMSwiRm9udE5hbWUiOiJDYWxpYnJpIiwiSXNCb2xkIjp0cnVlLCJJc0l0YWxpYyI6ZmFsc2UsIklzVW5kZXJsaW5lZCI6ZmFsc2UsIlBhcmVudFN0eWxlIjp7IiRyZWYiOiI2NiJ9fSwiQXV0b1NpemUiOjAsIkZvcmVncm91bmQiOnsiJHJlZiI6IjY3In0sIk1heFdpZHRoIjoyMDAuMCwiTWF4SGVpZ2h0IjoiSW5maW5pdHkiLCJTbWFydEZvcmVncm91bmRJc0FjdGl2ZSI6ZmFsc2UsIkhvcml6b250YWxBbGlnbm1lbnQiOjAsIlZlcnRpY2FsQWxpZ25tZW50IjowLCJTbWFydEZvcmVncm91bmQiOm51bGwsIk1hcmdpbiI6eyIkcmVmIjoiNjkifSwiUGFkZGluZyI6eyIkcmVmIjoiNzAifSwiQmFja2dyb3VuZCI6eyIkcmVmIjoiNzEifSwiSXNWaXNpYmxlIjp0cnVlLCJXaWR0aCI6MC4wLCJIZWlnaHQiOjAuMCwiQm9yZGVyU3R5bGUiOnsiJGlkIjoiMTM0IiwiTGluZUNvbG9yIjpudWxsLCJMaW5lV2VpZ2h0IjowLjAsIkxpbmVUeXBlIjowLCJQYXJlbnRTdHlsZSI6bnVsbH0sIlBhcmVudFN0eWxlIjp7IiRyZWYiOiI2NSJ9fSwiRGF0ZVN0eWxlIjp7IiRpZCI6IjEzNSIsIkZvbnRTZXR0aW5ncyI6eyIkaWQiOiIxMzYiLCJGb250U2l6ZSI6MTAsIkZvbnROYW1lIjoiQ2FsaWJyaSIsIklzQm9sZCI6ZmFsc2UsIklzSXRhbGljIjpmYWxzZSwiSXNVbmRlcmxpbmVkIjpmYWxzZSwiUGFyZW50U3R5bGUiOnsiJHJlZiI6IjczIn19LCJBdXRvU2l6ZSI6MCwiRm9yZWdyb3VuZCI6eyIkcmVmIjoiNzQifSwiTWF4V2lkdGgiOjIwMC4wLCJNYXhIZWlnaHQiOiJJbmZpbml0eSIsIlNtYXJ0Rm9yZWdyb3VuZElzQWN0aXZlIjpmYWxzZSwiSG9yaXpvbnRhbEFsaWdubWVudCI6MCwiVmVydGljYWxBbGlnbm1lbnQiOjAsIlNtYXJ0Rm9yZWdyb3VuZCI6bnVsbCwiTWFyZ2luIjp7IiRyZWYiOiI3NiJ9LCJQYWRkaW5nIjp7IiRyZWYiOiI3NyJ9LCJCYWNrZ3JvdW5kIjp7IiRyZWYiOiI3OCJ9LCJJc1Zpc2libGUiOnRydWUsIldpZHRoIjowLjAsIkhlaWdodCI6MC4wLCJCb3JkZXJTdHlsZSI6eyIkaWQiOiIxMzciLCJMaW5lQ29sb3IiOm51bGwsIkxpbmVXZWlnaHQiOjAuMCwiTGluZVR5cGUiOjAsIlBhcmVudFN0eWxlIjpudWxsfSwiUGFyZW50U3R5bGUiOnsiJHJlZiI6IjcyIn19LCJEYXRlRm9ybWF0Ijp7IiRyZWYiOiI3OSJ9LCJJc1Zpc2libGUiOnRydWUsIlBhcmVudFN0eWxlIjp7IiRyZWYiOiI1MyJ9fSwiUG9zaXRpb24iOnsiJGlkIjoiMTM4IiwiUmF0aW8iOjAuMjUwNzMxMDY3NDIxOTk1NTgsIklzQ3VzdG9tIjp0cnVlfSwiSWQiOiI0YmFkNDYwNi01YWZmLTQ0ZmQtYmEzMy01OTM0MmJkYjQzZGQiLCJJbXBvcnRJZCI6bnVsbCwiVGl0bGUiOiJDb250cmFzdGl2ZSBEaXZlcmdlbmNlIiwiTm90ZSI6bnVsbCwiSHlwZXJsaW5rIjpudWxsLCJJc0NoYW5nZWQiOmZhbHNlLCJJc05ldyI6ZmFsc2V9LHsiJGlkIjoiMTM5IiwiRGF0ZSI6IjIwMTUtMTAtMjNUMjM6NTk6NTkuOTk5WiIsIlN0eWxlIjp7IiRpZCI6IjE0MCIsIlNoYXBlIjoyLCJDb25uZWN0b3JNYXJnaW4iOnsiJHJlZiI6IjU0In0sIkNvbm5lY3RvclN0eWxlIjp7IiRpZCI6IjE0MSIsIkxpbmVDb2xvciI6eyIkaWQiOiIxNDIiLCIkdHlwZSI6Ik5MUkUuQ29tbW9uLkRvbS5Tb2xpZENvbG9yQnJ1c2gsIE5MUkUuQ29tbW9uIiwiQ29sb3IiOnsiJGlkIjoiMTQzIiwiQSI6MTI3LCJSIjoyMzQsIkciOjIyLCJCIjozMH19LCJMaW5lV2VpZ2h0IjoxLjAsIkxpbmVUeXBlIjowLCJQYXJlbnRTdHlsZSI6eyIkcmVmIjoiNTUifX0sIklzQmVsb3dUaW1lYmFuZCI6ZmFsc2UsIkhpZGVEYXRlIjpmYWxzZSwiU2hhcGVTaXplIjoxLCJTcGFjaW5nIjoxLjAsIlBhZGRpbmciOnsiJHJlZiI6IjU4In0sIlNoYXBlU3R5bGUiOnsiJGlkIjoiMTQ0IiwiTWFyZ2luIjp7IiRyZWYiOiI2MCJ9LCJQYWRkaW5nIjp7IiRyZWYiOiI2MSJ9LCJCYWNrZ3JvdW5kIjp7IiRpZCI6IjE0NSIsIkNvbG9yIjp7IiRpZCI6IjE0NiIsIkEiOjI1NSwiUiI6MjM0LCJHIjoyMiwiQiI6MzB9fSwiSXNWaXNpYmxlIjp0cnVlLCJXaWR0aCI6MTguMCwiSGVpZ2h0IjoyMC4wLCJCb3JkZXJTdHlsZSI6eyIkaWQiOiIxNDciLCJMaW5lQ29sb3IiOnsiJHJlZiI6IjYzIn0sIkxpbmVXZWlnaHQiOjAuMCwiTGluZVR5cGUiOjAsIlBhcmVudFN0eWxlIjp7IiRyZWYiOiI2MiJ9fSwiUGFyZW50U3R5bGUiOnsiJHJlZiI6IjU5In19LCJUaXRsZVN0eWxlIjp7IiRpZCI6IjE0OCIsIkZvbnRTZXR0aW5ncyI6eyIkaWQiOiIxNDkiLCJGb250U2l6ZSI6MTEsIkZvbnROYW1lIjoiQ2FsaWJyaSIsIklzQm9sZCI6dHJ1ZSwiSXNJdGFsaWMiOmZhbHNlLCJJc1VuZGVybGluZWQiOmZhbHNlLCJQYXJlbnRTdHlsZSI6eyIkcmVmIjoiNjYifX0sIkF1dG9TaXplIjowLCJGb3JlZ3JvdW5kIjp7IiRyZWYiOiI2NyJ9LCJNYXhXaWR0aCI6MjAwLjAsIk1heEhlaWdodCI6IkluZmluaXR5IiwiU21hcnRGb3JlZ3JvdW5kSXNBY3RpdmUiOmZhbHNlLCJIb3Jpem9udGFsQWxpZ25tZW50IjowLCJWZXJ0aWNhbEFsaWdubWVudCI6MCwiU21hcnRGb3JlZ3JvdW5kIjpudWxsLCJNYXJnaW4iOnsiJHJlZiI6IjY5In0sIlBhZGRpbmciOnsiJHJlZiI6IjcwIn0sIkJhY2tncm91bmQiOnsiJHJlZiI6IjcxIn0sIklzVmlzaWJsZSI6dHJ1ZSwiV2lkdGgiOjAuMCwiSGVpZ2h0IjowLjAsIkJvcmRlclN0eWxlIjp7IiRpZCI6IjE1MCIsIkxpbmVDb2xvciI6bnVsbCwiTGluZVdlaWdodCI6MC4wLCJMaW5lVHlwZSI6MCwiUGFyZW50U3R5bGUiOm51bGx9LCJQYXJlbnRTdHlsZSI6eyIkcmVmIjoiNjUifX0sIkRhdGVTdHlsZSI6eyIkaWQiOiIxNTEiLCJGb250U2V0dGluZ3MiOnsiJGlkIjoiMTUyIiwiRm9udFNpemUiOjEwLCJGb250TmFtZSI6IkNhbGlicmkiLCJJc0JvbGQiOmZhbHNlLCJJc0l0YWxpYyI6ZmFsc2UsIklzVW5kZXJsaW5lZCI6ZmFsc2UsIlBhcmVudFN0eWxlIjp7IiRyZWYiOiI3MyJ9fSwiQXV0b1NpemUiOjAsIkZvcmVncm91bmQiOnsiJHJlZiI6Ijc0In0sIk1heFdpZHRoIjoyMDAuMCwiTWF4SGVpZ2h0IjoiSW5maW5pdHkiLCJTbWFydEZvcmVncm91bmRJc0FjdGl2ZSI6ZmFsc2UsIkhvcml6b250YWxBbGlnbm1lbnQiOjAsIlZlcnRpY2FsQWxpZ25tZW50IjowLCJTbWFydEZvcmVncm91bmQiOm51bGwsIk1hcmdpbiI6eyIkcmVmIjoiNzYifSwiUGFkZGluZyI6eyIkcmVmIjoiNzcifSwiQmFja2dyb3VuZCI6eyIkcmVmIjoiNzgifSwiSXNWaXNpYmxlIjp0cnVlLCJXaWR0aCI6MC4wLCJIZWlnaHQiOjAuMCwiQm9yZGVyU3R5bGUiOnsiJGlkIjoiMTUzIiwiTGluZUNvbG9yIjpudWxsLCJMaW5lV2VpZ2h0IjowLjAsIkxpbmVUeXBlIjowLCJQYXJlbnRTdHlsZSI6bnVsbH0sIlBhcmVudFN0eWxlIjp7IiRyZWYiOiI3MiJ9fSwiRGF0ZUZvcm1hdCI6eyIkcmVmIjoiNzkifSwiSXNWaXNpYmxlIjp0cnVlLCJQYXJlbnRTdHlsZSI6eyIkcmVmIjoiNTMifX0sIlBvc2l0aW9uIjp7IiRpZCI6IjE1NCIsIlJhdGlvIjowLjEzNTEyMTY5MzU1MjI3NjI0LCJJc0N1c3RvbSI6dHJ1ZX0sIklkIjoiYmMwMjhiMDEtYjlhMS00M2U5LWFkMTItOTQ3ZmEzYTFkZTIyIiwiSW1wb3J0SWQiOm51bGwsIlRpdGxlIjoiUkJNIFZhbGlkYXRpb2luIiwiTm90ZSI6bnVsbCwiSHlwZXJsaW5rIjpudWxsLCJJc0NoYW5nZWQiOmZhbHNlLCJJc05ldyI6ZmFsc2V9LHsiJGlkIjoiMTU1IiwiRGF0ZSI6IjIwMTUtMTEtMTBUMjM6NTk6NTkuOTk5WiIsIlN0eWxlIjp7IiRpZCI6IjE1NiIsIlNoYXBlIjoyLCJDb25uZWN0b3JNYXJnaW4iOnsiJHJlZiI6IjU0In0sIkNvbm5lY3RvclN0eWxlIjp7IiRpZCI6IjE1NyIsIkxpbmVDb2xvciI6eyIkaWQiOiIxNTgiLCIkdHlwZSI6Ik5MUkUuQ29tbW9uLkRvbS5Tb2xpZENvbG9yQnJ1c2gsIE5MUkUuQ29tbW9uIiwiQ29sb3IiOnsiJGlkIjoiMTU5IiwiQSI6MTI3LCJSIjoyMzQsIkciOjIyLCJCIjozMH19LCJMaW5lV2VpZ2h0IjoxLjAsIkxpbmVUeXBlIjowLCJQYXJlbnRTdHlsZSI6eyIkcmVmIjoiNTUifX0sIklzQmVsb3dUaW1lYmFuZCI6ZmFsc2UsIkhpZGVEYXRlIjpmYWxzZSwiU2hhcGVTaXplIjoxLCJTcGFjaW5nIjoxLjAsIlBhZGRpbmciOnsiJHJlZiI6IjU4In0sIlNoYXBlU3R5bGUiOnsiJGlkIjoiMTYwIiwiTWFyZ2luIjp7IiRyZWYiOiI2MCJ9LCJQYWRkaW5nIjp7IiRyZWYiOiI2MSJ9LCJCYWNrZ3JvdW5kIjp7IiRpZCI6IjE2MSIsIkNvbG9yIjp7IiRpZCI6IjE2MiIsIkEiOjI1NSwiUiI6MjM0LCJHIjoyMiwiQiI6MzB9fSwiSXNWaXNpYmxlIjp0cnVlLCJXaWR0aCI6MTguMCwiSGVpZ2h0IjoyMC4wLCJCb3JkZXJTdHlsZSI6eyIkaWQiOiIxNjMiLCJMaW5lQ29sb3IiOnsiJHJlZiI6IjYzIn0sIkxpbmVXZWlnaHQiOjAuMCwiTGluZVR5cGUiOjAsIlBhcmVudFN0eWxlIjp7IiRyZWYiOiI2MiJ9fSwiUGFyZW50U3R5bGUiOnsiJHJlZiI6IjU5In19LCJUaXRsZVN0eWxlIjp7IiRpZCI6IjE2NCIsIkZvbnRTZXR0aW5ncyI6eyIkaWQiOiIxNjUiLCJGb250U2l6ZSI6MTEsIkZvbnROYW1lIjoiQ2FsaWJyaSIsIklzQm9sZCI6dHJ1ZSwiSXNJdGFsaWMiOmZhbHNlLCJJc1VuZGVybGluZWQiOmZhbHNlLCJQYXJlbnRTdHlsZSI6eyIkcmVmIjoiNjYifX0sIkF1dG9TaXplIjowLCJGb3JlZ3JvdW5kIjp7IiRyZWYiOiI2NyJ9LCJNYXhXaWR0aCI6MjAwLjAsIk1heEhlaWdodCI6IkluZmluaXR5IiwiU21hcnRGb3JlZ3JvdW5kSXNBY3RpdmUiOmZhbHNlLCJIb3Jpem9udGFsQWxpZ25tZW50IjowLCJWZXJ0aWNhbEFsaWdubWVudCI6MCwiU21hcnRGb3JlZ3JvdW5kIjpudWxsLCJNYXJnaW4iOnsiJHJlZiI6IjY5In0sIlBhZGRpbmciOnsiJHJlZiI6IjcwIn0sIkJhY2tncm91bmQiOnsiJHJlZiI6IjcxIn0sIklzVmlzaWJsZSI6dHJ1ZSwiV2lkdGgiOjAuMCwiSGVpZ2h0IjowLjAsIkJvcmRlclN0eWxlIjp7IiRpZCI6IjE2NiIsIkxpbmVDb2xvciI6bnVsbCwiTGluZVdlaWdodCI6MC4wLCJMaW5lVHlwZSI6MCwiUGFyZW50U3R5bGUiOm51bGx9LCJQYXJlbnRTdHlsZSI6eyIkcmVmIjoiNjUifX0sIkRhdGVTdHlsZSI6eyIkaWQiOiIxNjciLCJGb250U2V0dGluZ3MiOnsiJGlkIjoiMTY4IiwiRm9udFNpemUiOjEwLCJGb250TmFtZSI6IkNhbGlicmkiLCJJc0JvbGQiOmZhbHNlLCJJc0l0YWxpYyI6ZmFsc2UsIklzVW5kZXJsaW5lZCI6ZmFsc2UsIlBhcmVudFN0eWxlIjp7IiRyZWYiOiI3MyJ9fSwiQXV0b1NpemUiOjAsIkZvcmVncm91bmQiOnsiJHJlZiI6Ijc0In0sIk1heFdpZHRoIjoyMDAuMCwiTWF4SGVpZ2h0IjoiSW5maW5pdHkiLCJTbWFydEZvcmVncm91bmRJc0FjdGl2ZSI6ZmFsc2UsIkhvcml6b250YWxBbGlnbm1lbnQiOjAsIlZlcnRpY2FsQWxpZ25tZW50IjowLCJTbWFydEZvcmVncm91bmQiOm51bGwsIk1hcmdpbiI6eyIkcmVmIjoiNzYifSwiUGFkZGluZyI6eyIkcmVmIjoiNzcifSwiQmFja2dyb3VuZCI6eyIkcmVmIjoiNzgifSwiSXNWaXNpYmxlIjp0cnVlLCJXaWR0aCI6MC4wLCJIZWlnaHQiOjAuMCwiQm9yZGVyU3R5bGUiOnsiJGlkIjoiMTY5IiwiTGluZUNvbG9yIjpudWxsLCJMaW5lV2VpZ2h0IjowLjAsIkxpbmVUeXBlIjowLCJQYXJlbnRTdHlsZSI6bnVsbH0sIlBhcmVudFN0eWxlIjp7IiRyZWYiOiI3MiJ9fSwiRGF0ZUZvcm1hdCI6eyIkcmVmIjoiNzkifSwiSXNWaXNpYmxlIjp0cnVlLCJQYXJlbnRTdHlsZSI6eyIkcmVmIjoiNTMifX0sIlBvc2l0aW9uIjp7IiRpZCI6IjE3MCIsIlJhdGlvIjowLjAsIklzQ3VzdG9tIjpmYWxzZX0sIklkIjoiMGY0ZGQ5ZGQtZTA5Mi00ZTkzLWI5NTUtNjc4YWM3Nzg0MmFkIiwiSW1wb3J0SWQiOm51bGwsIlRpdGxlIjoiTWF0aHMgb2YgREJOIiwiTm90ZSI6bnVsbCwiSHlwZXJsaW5rIjpudWxsLCJJc0NoYW5nZWQiOmZhbHNlLCJJc05ldyI6ZmFsc2V9LHsiJGlkIjoiMTcxIiwiRGF0ZSI6IjIwMTUtMTItMjVUMjM6NTk6NTkuOTk5WiIsIlN0eWxlIjp7IiRpZCI6IjE3MiIsIlNoYXBlIjoyLCJDb25uZWN0b3JNYXJnaW4iOnsiJHJlZiI6IjU0In0sIkNvbm5lY3RvclN0eWxlIjp7IiRpZCI6IjE3MyIsIkxpbmVDb2xvciI6eyIkaWQiOiIxNzQiLCIkdHlwZSI6Ik5MUkUuQ29tbW9uLkRvbS5Tb2xpZENvbG9yQnJ1c2gsIE5MUkUuQ29tbW9uIiwiQ29sb3IiOnsiJGlkIjoiMTc1IiwiQSI6MTI3LCJSIjoyMzQsIkciOjIyLCJCIjozMH19LCJMaW5lV2VpZ2h0IjoxLjAsIkxpbmVUeXBlIjowLCJQYXJlbnRTdHlsZSI6eyIkcmVmIjoiNTUifX0sIklzQmVsb3dUaW1lYmFuZCI6ZmFsc2UsIkhpZGVEYXRlIjpmYWxzZSwiU2hhcGVTaXplIjoxLCJTcGFjaW5nIjoxLjAsIlBhZGRpbmciOnsiJHJlZiI6IjU4In0sIlNoYXBlU3R5bGUiOnsiJGlkIjoiMTc2IiwiTWFyZ2luIjp7IiRyZWYiOiI2MCJ9LCJQYWRkaW5nIjp7IiRyZWYiOiI2MSJ9LCJCYWNrZ3JvdW5kIjp7IiRpZCI6IjE3NyIsIkNvbG9yIjp7IiRpZCI6IjE3OCIsIkEiOjI1NSwiUiI6MjM0LCJHIjoyMiwiQiI6MzB9fSwiSXNWaXNpYmxlIjp0cnVlLCJXaWR0aCI6MTguMCwiSGVpZ2h0IjoyMC4wLCJCb3JkZXJTdHlsZSI6eyIkaWQiOiIxNzkiLCJMaW5lQ29sb3IiOnsiJHJlZiI6IjYzIn0sIkxpbmVXZWlnaHQiOjAuMCwiTGluZVR5cGUiOjAsIlBhcmVudFN0eWxlIjp7IiRyZWYiOiI2MiJ9fSwiUGFyZW50U3R5bGUiOnsiJHJlZiI6IjU5In19LCJUaXRsZVN0eWxlIjp7IiRpZCI6IjE4MCIsIkZvbnRTZXR0aW5ncyI6eyIkaWQiOiIxODEiLCJGb250U2l6ZSI6MTEsIkZvbnROYW1lIjoiQ2FsaWJyaSIsIklzQm9sZCI6dHJ1ZSwiSXNJdGFsaWMiOmZhbHNlLCJJc1VuZGVybGluZWQiOmZhbHNlLCJQYXJlbnRTdHlsZSI6eyIkcmVmIjoiNjYifX0sIkF1dG9TaXplIjowLCJGb3JlZ3JvdW5kIjp7IiRyZWYiOiI2NyJ9LCJNYXhXaWR0aCI6MjAwLjAsIk1heEhlaWdodCI6IkluZmluaXR5IiwiU21hcnRGb3JlZ3JvdW5kSXNBY3RpdmUiOmZhbHNlLCJIb3Jpem9udGFsQWxpZ25tZW50IjowLCJWZXJ0aWNhbEFsaWdubWVudCI6MCwiU21hcnRGb3JlZ3JvdW5kIjpudWxsLCJNYXJnaW4iOnsiJHJlZiI6IjY5In0sIlBhZGRpbmciOnsiJHJlZiI6IjcwIn0sIkJhY2tncm91bmQiOnsiJHJlZiI6IjcxIn0sIklzVmlzaWJsZSI6dHJ1ZSwiV2lkdGgiOjAuMCwiSGVpZ2h0IjowLjAsIkJvcmRlclN0eWxlIjp7IiRpZCI6IjE4MiIsIkxpbmVDb2xvciI6bnVsbCwiTGluZVdlaWdodCI6MC4wLCJMaW5lVHlwZSI6MCwiUGFyZW50U3R5bGUiOm51bGx9LCJQYXJlbnRTdHlsZSI6eyIkcmVmIjoiNjUifX0sIkRhdGVTdHlsZSI6eyIkaWQiOiIxODMiLCJGb250U2V0dGluZ3MiOnsiJGlkIjoiMTg0IiwiRm9udFNpemUiOjEwLCJGb250TmFtZSI6IkNhbGlicmkiLCJJc0JvbGQiOmZhbHNlLCJJc0l0YWxpYyI6ZmFsc2UsIklzVW5kZXJsaW5lZCI6ZmFsc2UsIlBhcmVudFN0eWxlIjp7IiRyZWYiOiI3MyJ9fSwiQXV0b1NpemUiOjAsIkZvcmVncm91bmQiOnsiJHJlZiI6Ijc0In0sIk1heFdpZHRoIjoyMDAuMCwiTWF4SGVpZ2h0IjoiSW5maW5pdHkiLCJTbWFydEZvcmVncm91bmRJc0FjdGl2ZSI6ZmFsc2UsIkhvcml6b250YWxBbGlnbm1lbnQiOjAsIlZlcnRpY2FsQWxpZ25tZW50IjowLCJTbWFydEZvcmVncm91bmQiOm51bGwsIk1hcmdpbiI6eyIkcmVmIjoiNzYifSwiUGFkZGluZyI6eyIkcmVmIjoiNzcifSwiQmFja2dyb3VuZCI6eyIkcmVmIjoiNzgifSwiSXNWaXNpYmxlIjp0cnVlLCJXaWR0aCI6MC4wLCJIZWlnaHQiOjAuMCwiQm9yZGVyU3R5bGUiOnsiJGlkIjoiMTg1IiwiTGluZUNvbG9yIjpudWxsLCJMaW5lV2VpZ2h0IjowLjAsIkxpbmVUeXBlIjowLCJQYXJlbnRTdHlsZSI6bnVsbH0sIlBhcmVudFN0eWxlIjp7IiRyZWYiOiI3MiJ9fSwiRGF0ZUZvcm1hdCI6eyIkcmVmIjoiNzkifSwiSXNWaXNpYmxlIjp0cnVlLCJQYXJlbnRTdHlsZSI6eyIkcmVmIjoiNTMifX0sIlBvc2l0aW9uIjp7IiRpZCI6IjE4NiIsIlJhdGlvIjowLjI2NzA5NzA2NTMwMTU4OSwiSXNDdXN0b20iOnRydWV9LCJJZCI6ImI3NTM4NTRmLTc1MDMtNDUwMi04MDA3LWVjYWM2NzBhZGFjMSIsIkltcG9ydElkIjpudWxsLCJUaXRsZSI6IlByYXRpY2FsIFRyYWluaW5nIE1ldGhvZHMiLCJOb3RlIjpudWxsLCJIeXBlcmxpbmsiOm51bGwsIklzQ2hhbmdlZCI6ZmFsc2UsIklzTmV3IjpmYWxzZX1dLCJUYXNrcyI6W3siJGlkIjoiMTg3IiwiR3JvdXBOYW1lIjpudWxsLCJTdGFydERhdGUiOiIyMDE1LTEwLTAxVDAwOjAwOjAwWiIsIkVuZERhdGUiOiIyMDE1LTExLTAxVDIzOjU5OjU5Ljk5OVoiLCJQZXJjZW50YWdlQ29tcGxldGUiOm51bGwsIlN0eWxlIjp7IiRpZCI6IjE4OCIsIlNoYXBlIjowLCJTaGFwZVRoaWNrbmVzcyI6MSwiRHVyYXRpb25Gb3JtYXQiOjAsIkluY2x1ZGVOb25Xb3JraW5nRGF5c0luRHVyYXRpb24iOnRydWUsIlBlcmNlbnRhZ2VDb21wbGV0ZVN0eWxlIjp7IiRpZCI6IjE4OSIsIkZvbnRTZXR0aW5ncyI6eyIkaWQiOiIxOTAiLCJGb250U2l6ZSI6MTAsIkZvbnROYW1lIjoiQ2FsaWJyaSIsIklzQm9sZCI6ZmFsc2UsIklzSXRhbGljIjpmYWxzZSwiSXNVbmRlcmxpbmVkIjpmYWxzZSwiUGFyZW50U3R5bGUiOnsiJHJlZiI6IjgyIn19LCJBdXRvU2l6ZSI6MCwiRm9yZWdyb3VuZCI6eyIkcmVmIjoiODMifSwiTWF4V2lkdGgiOjIwMC4wLCJNYXhIZWlnaHQiOiJJbmZpbml0eSIsIlNtYXJ0Rm9yZWdyb3VuZElzQWN0aXZlIjpmYWxzZSwiSG9yaXpvbnRhbEFsaWdubWVudCI6MCwiVmVydGljYWxBbGlnbm1lbnQiOjAsIlNtYXJ0Rm9yZWdyb3VuZCI6bnVsbCwiTWFyZ2luIjp7IiRyZWYiOiI4NSJ9LCJQYWRkaW5nIjp7IiRyZWYiOiI4NiJ9LCJCYWNrZ3JvdW5kIjp7IiRyZWYiOiI4NyJ9LCJJc1Zpc2libGUiOnRydWUsIldpZHRoIjowLjAsIkhlaWdodCI6MC4wLCJCb3JkZXJTdHlsZSI6eyIkaWQiOiIxOTEiLCJMaW5lQ29sb3IiOm51bGwsIkxpbmVXZWlnaHQiOjAuMCwiTGluZVR5cGUiOjAsIlBhcmVudFN0eWxlIjpudWxsfSwiUGFyZW50U3R5bGUiOnsiJHJlZiI6IjgxIn19LCJEdXJhdGlvblN0eWxlIjp7IiRpZCI6IjE5MiIsIkZvbnRTZXR0aW5ncyI6eyIkaWQiOiIxOTMiLCJGb250U2l6ZSI6MTAsIkZvbnROYW1lIjoiQ2FsaWJyaSIsIklzQm9sZCI6ZmFsc2UsIklzSXRhbGljIjpmYWxzZSwiSXNVbmRlcmxpbmVkIjpmYWxzZSwiUGFyZW50U3R5bGUiOnsiJHJlZiI6Ijg5In19LCJBdXRvU2l6ZSI6MCwiRm9yZWdyb3VuZCI6eyIkcmVmIjoiOTAifSwiTWF4V2lkdGgiOjIwMC4wLCJNYXhIZWlnaHQiOiJJbmZpbml0eSIsIlNtYXJ0Rm9yZWdyb3VuZElzQWN0aXZlIjpmYWxzZSwiSG9yaXpvbnRhbEFsaWdubWVudCI6MCwiVmVydGljYWxBbGlnbm1lbnQiOjAsIlNtYXJ0Rm9yZWdyb3VuZCI6bnVsbCwiTWFyZ2luIjp7IiRyZWYiOiI5MiJ9LCJQYWRkaW5nIjp7IiRyZWYiOiI5MyJ9LCJCYWNrZ3JvdW5kIjp7IiRyZWYiOiI5NCJ9LCJJc1Zpc2libGUiOnRydWUsIldpZHRoIjowLjAsIkhlaWdodCI6MC4wLCJCb3JkZXJTdHlsZSI6eyIkaWQiOiIxOTQiLCJMaW5lQ29sb3IiOm51bGwsIkxpbmVXZWlnaHQiOjAuMCwiTGluZVR5cGUiOjAsIlBhcmVudFN0eWxlIjpudWxsfSwiUGFyZW50U3R5bGUiOnsiJHJlZiI6Ijg4In19LCJIb3Jpem9udGFsQ29ubmVjdG9yU3R5bGUiOnsiJGlkIjoiMTk1IiwiTGluZUNvbG9yIjp7IiRyZWYiOiI5NiJ9LCJMaW5lV2VpZ2h0IjoxLjAsIkxpbmVUeXBlIjowLCJQYXJlbnRTdHlsZSI6eyIkcmVmIjoiOTUifX0sIlZlcnRpY2FsQ29ubmVjdG9yU3R5bGUiOnsiJGlkIjoiMTk2IiwiTGluZUNvbG9yIjp7IiRyZWYiOiI5OSJ9LCJMaW5lV2VpZ2h0IjowLjAsIkxpbmVUeXBlIjowLCJQYXJlbnRTdHlsZSI6eyIkcmVmIjoiOTgifX0sIk1hcmdpbiI6bnVsbCwiU3RhcnREYXRlUG9zaXRpb24iOjQsIkVuZERhdGVQb3NpdGlvbiI6NCwiVGl0bGVQb3NpdGlvbiI6NSwiRHVyYXRpb25Qb3NpdGlvbiI6NiwiUGVyY2VudGFnZUNvbXBsZXRlZFBvc2l0aW9uIjo2LCJTcGFjaW5nIjo1LCJJc0JlbG93VGltZWJhbmQiOnRydWUsIlBlcmNlbnRhZ2VDb21wbGV0ZVNoYXBlT3BhY2l0eSI6MzUsIlNoYXBlU3R5bGUiOnsiJGlkIjoiMTk3IiwiTWFyZ2luIjp7IiRyZWYiOiIxMDIifSwiUGFkZGluZyI6eyIkcmVmIjoiMTAzIn0sIkJhY2tncm91bmQiOnsiJGlkIjoiMTk4IiwiQ29sb3IiOnsiJGlkIjoiMTk5IiwiQSI6MjU1LCJSIjoxNTAsIkciOjIxNCwiQiI6NjZ9fSwiSXNWaXNpYmxlIjp0cnVlLCJXaWR0aCI6MC4wLCJIZWlnaHQiOjE2LjAsIkJvcmRlclN0eWxlIjp7IiRpZCI6IjIwMCIsIkxpbmVDb2xvciI6eyIkcmVmIjoiMTA1In0sIkxpbmVXZWlnaHQiOjAuMCwiTGluZVR5cGUiOjAsIlBhcmVudFN0eWxlIjp7IiRyZWYiOiIxMDQifX0sIlBhcmVudFN0eWxlIjp7IiRyZWYiOiIxMDEifX0sIlRpdGxlU3R5bGUiOnsiJGlkIjoiMjAxIiwiRm9udFNldHRpbmdzIjp7IiRpZCI6IjIwMiIsIkZvbnRTaXplIjoxMSwiRm9udE5hbWUiOiJDYWxpYnJpIiwiSXNCb2xkIjp0cnVlLCJJc0l0YWxpYyI6ZmFsc2UsIklzVW5kZXJsaW5lZCI6ZmFsc2UsIlBhcmVudFN0eWxlIjp7IiRyZWYiOiIxMDgifX0sIkF1dG9TaXplIjowLCJGb3JlZ3JvdW5kIjp7IiRyZWYiOiIxMDkifSwiTWF4V2lkdGgiOjcyMC4wLCJNYXhIZWlnaHQiOiJJbmZpbml0eSIsIlNtYXJ0Rm9yZWdyb3VuZElzQWN0aXZlIjpmYWxzZSwiSG9yaXpvbnRhbEFsaWdubWVudCI6MCwiVmVydGljYWxBbGlnbm1lbnQiOjAsIlNtYXJ0Rm9yZWdyb3VuZCI6bnVsbCwiTWFyZ2luIjp7IiRyZWYiOiIxMTEifSwiUGFkZGluZyI6eyIkcmVmIjoiMTEyIn0sIkJhY2tncm91bmQiOnsiJHJlZiI6IjExMyJ9LCJJc1Zpc2libGUiOnRydWUsIldpZHRoIjowLjAsIkhlaWdodCI6MC4wLCJCb3JkZXJTdHlsZSI6eyIkaWQiOiIyMDMiLCJMaW5lQ29sb3IiOm51bGwsIkxpbmVXZWlnaHQiOjAuMCwiTGluZVR5cGUiOjAsIlBhcmVudFN0eWxlIjpudWxsfSwiUGFyZW50U3R5bGUiOnsiJHJlZiI6IjEwNyJ9fSwiRGF0ZVN0eWxlIjp7IiRpZCI6IjIwNCIsIkZvbnRTZXR0aW5ncyI6eyIkaWQiOiIyMDUiLCJGb250U2l6ZSI6MTAsIkZvbnROYW1lIjoiQ2FsaWJyaSIsIklzQm9sZCI6ZmFsc2UsIklzSXRhbGljIjpmYWxzZSwiSXNVbmRlcmxpbmVkIjpmYWxzZSwiUGFyZW50U3R5bGUiOnsiJHJlZiI6IjExNSJ9fSwiQXV0b1NpemUiOjAsIkZvcmVncm91bmQiOnsiJHJlZiI6IjExNiJ9LCJNYXhXaWR0aCI6MjAwLjAsIk1heEhlaWdodCI6IkluZmluaXR5IiwiU21hcnRGb3JlZ3JvdW5kSXNBY3RpdmUiOmZhbHNlLCJIb3Jpem9udGFsQWxpZ25tZW50IjowLCJWZXJ0aWNhbEFsaWdubWVudCI6MCwiU21hcnRGb3JlZ3JvdW5kIjpudWxsLCJNYXJnaW4iOnsiJHJlZiI6IjExOCJ9LCJQYWRkaW5nIjp7IiRyZWYiOiIxMTkifSwiQmFja2dyb3VuZCI6eyIkcmVmIjoiMTIwIn0sIklzVmlzaWJsZSI6dHJ1ZSwiV2lkdGgiOjAuMCwiSGVpZ2h0IjowLjAsIkJvcmRlclN0eWxlIjp7IiRpZCI6IjIwNiIsIkxpbmVDb2xvciI6bnVsbCwiTGluZVdlaWdodCI6MC4wLCJMaW5lVHlwZSI6MCwiUGFyZW50U3R5bGUiOm51bGx9LCJQYXJlbnRTdHlsZSI6eyIkcmVmIjoiMTE0In19LCJEYXRlRm9ybWF0Ijp7IiRyZWYiOiIxMjEifSwiSXNWaXNpYmxlIjp0cnVlLCJQYXJlbnRTdHlsZSI6eyIkcmVmIjoiODAifX0sIkluZGV4IjoxLCJJZCI6ImFmOGFiYTY2LTk0ODQtNGYyNi1iOTI5LTI5ZGQxNmFmMTNiYiIsIkltcG9ydElkIjpudWxsLCJUaXRsZSI6IlJCTSIsIk5vdGUiOm51bGwsIkh5cGVybGluayI6bnVsbCwiSXNDaGFuZ2VkIjpmYWxzZSwiSXNOZXciOmZhbHNlfSx7IiRpZCI6IjIwNyIsIkdyb3VwTmFtZSI6bnVsbCwiU3RhcnREYXRlIjoiMjAxNS0xMS0wMVQwMDowMDowMFoiLCJFbmREYXRlIjoiMjAxNS0xMi0wMVQyMzo1OTo1OS45OTlaIiwiUGVyY2VudGFnZUNvbXBsZXRlIjpudWxsLCJTdHlsZSI6eyIkaWQiOiIyMDgiLCJTaGFwZSI6MCwiU2hhcGVUaGlja25lc3MiOjEsIkR1cmF0aW9uRm9ybWF0IjowLCJJbmNsdWRlTm9uV29ya2luZ0RheXNJbkR1cmF0aW9uIjp0cnVlLCJQZXJjZW50YWdlQ29tcGxldGVTdHlsZSI6eyIkaWQiOiIyMDkiLCJGb250U2V0dGluZ3MiOnsiJGlkIjoiMjEwIiwiRm9udFNpemUiOjEwLCJGb250TmFtZSI6IkNhbGlicmkiLCJJc0JvbGQiOmZhbHNlLCJJc0l0YWxpYyI6ZmFsc2UsIklzVW5kZXJsaW5lZCI6ZmFsc2UsIlBhcmVudFN0eWxlIjp7IiRyZWYiOiI4MiJ9fSwiQXV0b1NpemUiOjAsIkZvcmVncm91bmQiOnsiJHJlZiI6IjgzIn0sIk1heFdpZHRoIjoyMDAuMCwiTWF4SGVpZ2h0IjoiSW5maW5pdHkiLCJTbWFydEZvcmVncm91bmRJc0FjdGl2ZSI6ZmFsc2UsIkhvcml6b250YWxBbGlnbm1lbnQiOjAsIlZlcnRpY2FsQWxpZ25tZW50IjowLCJTbWFydEZvcmVncm91bmQiOm51bGwsIk1hcmdpbiI6eyIkcmVmIjoiODUifSwiUGFkZGluZyI6eyIkcmVmIjoiODYifSwiQmFja2dyb3VuZCI6eyIkcmVmIjoiODcifSwiSXNWaXNpYmxlIjp0cnVlLCJXaWR0aCI6MC4wLCJIZWlnaHQiOjAuMCwiQm9yZGVyU3R5bGUiOnsiJGlkIjoiMjExIiwiTGluZUNvbG9yIjpudWxsLCJMaW5lV2VpZ2h0IjowLjAsIkxpbmVUeXBlIjowLCJQYXJlbnRTdHlsZSI6bnVsbH0sIlBhcmVudFN0eWxlIjp7IiRyZWYiOiI4MSJ9fSwiRHVyYXRpb25TdHlsZSI6eyIkaWQiOiIyMTIiLCJGb250U2V0dGluZ3MiOnsiJGlkIjoiMjEzIiwiRm9udFNpemUiOjEwLCJGb250TmFtZSI6IkNhbGlicmkiLCJJc0JvbGQiOmZhbHNlLCJJc0l0YWxpYyI6ZmFsc2UsIklzVW5kZXJsaW5lZCI6ZmFsc2UsIlBhcmVudFN0eWxlIjp7IiRyZWYiOiI4OSJ9fSwiQXV0b1NpemUiOjAsIkZvcmVncm91bmQiOnsiJHJlZiI6IjkwIn0sIk1heFdpZHRoIjoyMDAuMCwiTWF4SGVpZ2h0IjoiSW5maW5pdHkiLCJTbWFydEZvcmVncm91bmRJc0FjdGl2ZSI6ZmFsc2UsIkhvcml6b250YWxBbGlnbm1lbnQiOjAsIlZlcnRpY2FsQWxpZ25tZW50IjowLCJTbWFydEZvcmVncm91bmQiOm51bGwsIk1hcmdpbiI6eyIkcmVmIjoiOTIifSwiUGFkZGluZyI6eyIkcmVmIjoiOTMifSwiQmFja2dyb3VuZCI6eyIkcmVmIjoiOTQifSwiSXNWaXNpYmxlIjp0cnVlLCJXaWR0aCI6MC4wLCJIZWlnaHQiOjAuMCwiQm9yZGVyU3R5bGUiOnsiJGlkIjoiMjE0IiwiTGluZUNvbG9yIjpudWxsLCJMaW5lV2VpZ2h0IjowLjAsIkxpbmVUeXBlIjowLCJQYXJlbnRTdHlsZSI6bnVsbH0sIlBhcmVudFN0eWxlIjp7IiRyZWYiOiI4OCJ9fSwiSG9yaXpvbnRhbENvbm5lY3RvclN0eWxlIjp7IiRpZCI6IjIxNSIsIkxpbmVDb2xvciI6eyIkcmVmIjoiOTYifSwiTGluZVdlaWdodCI6MS4wLCJMaW5lVHlwZSI6MCwiUGFyZW50U3R5bGUiOnsiJHJlZiI6Ijk1In19LCJWZXJ0aWNhbENvbm5lY3RvclN0eWxlIjp7IiRpZCI6IjIxNiIsIkxpbmVDb2xvciI6eyIkcmVmIjoiOTkifSwiTGluZVdlaWdodCI6MC4wLCJMaW5lVHlwZSI6MCwiUGFyZW50U3R5bGUiOnsiJHJlZiI6Ijk4In19LCJNYXJnaW4iOm51bGwsIlN0YXJ0RGF0ZVBvc2l0aW9uIjo0LCJFbmREYXRlUG9zaXRpb24iOjQsIlRpdGxlUG9zaXRpb24iOjUsIkR1cmF0aW9uUG9zaXRpb24iOjYsIlBlcmNlbnRhZ2VDb21wbGV0ZWRQb3NpdGlvbiI6NiwiU3BhY2luZyI6NSwiSXNCZWxvd1RpbWViYW5kIjp0cnVlLCJQZXJjZW50YWdlQ29tcGxldGVTaGFwZU9wYWNpdHkiOjM1LCJTaGFwZVN0eWxlIjp7IiRpZCI6IjIxNyIsIk1hcmdpbiI6eyIkcmVmIjoiMTAyIn0sIlBhZGRpbmciOnsiJHJlZiI6IjEwMyJ9LCJCYWNrZ3JvdW5kIjp7IiRpZCI6IjIxOCIsIkNvbG9yIjp7IiRpZCI6IjIxOSIsIkEiOjI1NSwiUiI6MTUwLCJHIjoyMTQsIkIiOjY2fX0sIklzVmlzaWJsZSI6dHJ1ZSwiV2lkdGgiOjAuMCwiSGVpZ2h0IjoxNi4wLCJCb3JkZXJTdHlsZSI6eyIkaWQiOiIyMjAiLCJMaW5lQ29sb3IiOnsiJHJlZiI6IjEwNSJ9LCJMaW5lV2VpZ2h0IjowLjAsIkxpbmVUeXBlIjowLCJQYXJlbnRTdHlsZSI6eyIkcmVmIjoiMTA0In19LCJQYXJlbnRTdHlsZSI6eyIkcmVmIjoiMTAxIn19LCJUaXRsZVN0eWxlIjp7IiRpZCI6IjIyMSIsIkZvbnRTZXR0aW5ncyI6eyIkaWQiOiIyMjIiLCJGb250U2l6ZSI6MTEsIkZvbnROYW1lIjoiQ2FsaWJyaSIsIklzQm9sZCI6dHJ1ZSwiSXNJdGFsaWMiOmZhbHNlLCJJc1VuZGVybGluZWQiOmZhbHNlLCJQYXJlbnRTdHlsZSI6eyIkcmVmIjoiMTA4In19LCJBdXRvU2l6ZSI6MCwiRm9yZWdyb3VuZCI6eyIkcmVmIjoiMTA5In0sIk1heFdpZHRoIjo3MjAuMCwiTWF4SGVpZ2h0IjoiSW5maW5pdHkiLCJTbWFydEZvcmVncm91bmRJc0FjdGl2ZSI6ZmFsc2UsIkhvcml6b250YWxBbGlnbm1lbnQiOjAsIlZlcnRpY2FsQWxpZ25tZW50IjowLCJTbWFydEZvcmVncm91bmQiOm51bGwsIk1hcmdpbiI6eyIkcmVmIjoiMTExIn0sIlBhZGRpbmciOnsiJHJlZiI6IjExMiJ9LCJCYWNrZ3JvdW5kIjp7IiRyZWYiOiIxMTMifSwiSXNWaXNpYmxlIjp0cnVlLCJXaWR0aCI6MC4wLCJIZWlnaHQiOjAuMCwiQm9yZGVyU3R5bGUiOnsiJGlkIjoiMjIzIiwiTGluZUNvbG9yIjpudWxsLCJMaW5lV2VpZ2h0IjowLjAsIkxpbmVUeXBlIjowLCJQYXJlbnRTdHlsZSI6bnVsbH0sIlBhcmVudFN0eWxlIjp7IiRyZWYiOiIxMDcifX0sIkRhdGVTdHlsZSI6eyIkaWQiOiIyMjQiLCJGb250U2V0dGluZ3MiOnsiJGlkIjoiMjI1IiwiRm9udFNpemUiOjEwLCJGb250TmFtZSI6IkNhbGlicmkiLCJJc0JvbGQiOmZhbHNlLCJJc0l0YWxpYyI6ZmFsc2UsIklzVW5kZXJsaW5lZCI6ZmFsc2UsIlBhcmVudFN0eWxlIjp7IiRyZWYiOiIxMTUifX0sIkF1dG9TaXplIjowLCJGb3JlZ3JvdW5kIjp7IiRyZWYiOiIxMTYifSwiTWF4V2lkdGgiOjIwMC4wLCJNYXhIZWlnaHQiOiJJbmZpbml0eSIsIlNtYXJ0Rm9yZWdyb3VuZElzQWN0aXZlIjpmYWxzZSwiSG9yaXpvbnRhbEFsaWdubWVudCI6MCwiVmVydGljYWxBbGlnbm1lbnQiOjAsIlNtYXJ0Rm9yZWdyb3VuZCI6bnVsbCwiTWFyZ2luIjp7IiRyZWYiOiIxMTgifSwiUGFkZGluZyI6eyIkcmVmIjoiMTE5In0sIkJhY2tncm91bmQiOnsiJHJlZiI6IjEyMCJ9LCJJc1Zpc2libGUiOnRydWUsIldpZHRoIjowLjAsIkhlaWdodCI6MC4wLCJCb3JkZXJTdHlsZSI6eyIkaWQiOiIyMjYiLCJMaW5lQ29sb3IiOm51bGwsIkxpbmVXZWlnaHQiOjAuMCwiTGluZVR5cGUiOjAsIlBhcmVudFN0eWxlIjpudWxsfSwiUGFyZW50U3R5bGUiOnsiJHJlZiI6IjExNCJ9fSwiRGF0ZUZvcm1hdCI6eyIkcmVmIjoiMTIxIn0sIklzVmlzaWJsZSI6dHJ1ZSwiUGFyZW50U3R5bGUiOnsiJHJlZiI6IjgwIn19LCJJbmRleCI6MiwiSWQiOiIyMzVlNDZmNC03NDE2LTRkMDYtYTA1My02N2E0OWQ1MDI2YTgiLCJJbXBvcnRJZCI6bnVsbCwiVGl0bGUiOiJEQk4iLCJOb3RlIjpudWxsLCJIeXBlcmxpbmsiOm51bGwsIklzQ2hhbmdlZCI6ZmFsc2UsIklzTmV3IjpmYWxzZX0seyIkaWQiOiIyMjciLCJHcm91cE5hbWUiOm51bGwsIlN0YXJ0RGF0ZSI6IjIwMTUtMTItMDFUMDA6MDA6MDBaIiwiRW5kRGF0ZSI6IjIwMTYtMDMtMDFUMjM6NTk6NTkuOTk5WiIsIlBlcmNlbnRhZ2VDb21wbGV0ZSI6bnVsbCwiU3R5bGUiOnsiJGlkIjoiMjI4IiwiU2hhcGUiOjAsIlNoYXBlVGhpY2tuZXNzIjoxLCJEdXJhdGlvbkZvcm1hdCI6MCwiSW5jbHVkZU5vbldvcmtpbmdEYXlzSW5EdXJhdGlvbiI6dHJ1ZSwiUGVyY2VudGFnZUNvbXBsZXRlU3R5bGUiOnsiJGlkIjoiMjI5IiwiRm9udFNldHRpbmdzIjp7IiRpZCI6IjIzMCIsIkZvbnRTaXplIjoxMCwiRm9udE5hbWUiOiJDYWxpYnJpIiwiSXNCb2xkIjpmYWxzZSwiSXNJdGFsaWMiOmZhbHNlLCJJc1VuZGVybGluZWQiOmZhbHNlLCJQYXJlbnRTdHlsZSI6eyIkcmVmIjoiODIifX0sIkF1dG9TaXplIjowLCJGb3JlZ3JvdW5kIjp7IiRyZWYiOiI4MyJ9LCJNYXhXaWR0aCI6MjAwLjAsIk1heEhlaWdodCI6IkluZmluaXR5IiwiU21hcnRGb3JlZ3JvdW5kSXNBY3RpdmUiOmZhbHNlLCJIb3Jpem9udGFsQWxpZ25tZW50IjowLCJWZXJ0aWNhbEFsaWdubWVudCI6MCwiU21hcnRGb3JlZ3JvdW5kIjpudWxsLCJNYXJnaW4iOnsiJHJlZiI6Ijg1In0sIlBhZGRpbmciOnsiJHJlZiI6Ijg2In0sIkJhY2tncm91bmQiOnsiJHJlZiI6Ijg3In0sIklzVmlzaWJsZSI6dHJ1ZSwiV2lkdGgiOjAuMCwiSGVpZ2h0IjowLjAsIkJvcmRlclN0eWxlIjp7IiRpZCI6IjIzMSIsIkxpbmVDb2xvciI6bnVsbCwiTGluZVdlaWdodCI6MC4wLCJMaW5lVHlwZSI6MCwiUGFyZW50U3R5bGUiOm51bGx9LCJQYXJlbnRTdHlsZSI6eyIkcmVmIjoiODEifX0sIkR1cmF0aW9uU3R5bGUiOnsiJGlkIjoiMjMyIiwiRm9udFNldHRpbmdzIjp7IiRpZCI6IjIzMyIsIkZvbnRTaXplIjoxMCwiRm9udE5hbWUiOiJDYWxpYnJpIiwiSXNCb2xkIjpmYWxzZSwiSXNJdGFsaWMiOmZhbHNlLCJJc1VuZGVybGluZWQiOmZhbHNlLCJQYXJlbnRTdHlsZSI6eyIkcmVmIjoiODkifX0sIkF1dG9TaXplIjowLCJGb3JlZ3JvdW5kIjp7IiRyZWYiOiI5MCJ9LCJNYXhXaWR0aCI6MjAwLjAsIk1heEhlaWdodCI6IkluZmluaXR5IiwiU21hcnRGb3JlZ3JvdW5kSXNBY3RpdmUiOmZhbHNlLCJIb3Jpem9udGFsQWxpZ25tZW50IjowLCJWZXJ0aWNhbEFsaWdubWVudCI6MCwiU21hcnRGb3JlZ3JvdW5kIjpudWxsLCJNYXJnaW4iOnsiJHJlZiI6IjkyIn0sIlBhZGRpbmciOnsiJHJlZiI6IjkzIn0sIkJhY2tncm91bmQiOnsiJHJlZiI6Ijk0In0sIklzVmlzaWJsZSI6dHJ1ZSwiV2lkdGgiOjAuMCwiSGVpZ2h0IjowLjAsIkJvcmRlclN0eWxlIjp7IiRpZCI6IjIzNCIsIkxpbmVDb2xvciI6bnVsbCwiTGluZVdlaWdodCI6MC4wLCJMaW5lVHlwZSI6MCwiUGFyZW50U3R5bGUiOm51bGx9LCJQYXJlbnRTdHlsZSI6eyIkcmVmIjoiODgifX0sIkhvcml6b250YWxDb25uZWN0b3JTdHlsZSI6eyIkaWQiOiIyMzUiLCJMaW5lQ29sb3IiOnsiJHJlZiI6Ijk2In0sIkxpbmVXZWlnaHQiOjEuMCwiTGluZVR5cGUiOjAsIlBhcmVudFN0eWxlIjp7IiRyZWYiOiI5NSJ9fSwiVmVydGljYWxDb25uZWN0b3JTdHlsZSI6eyIkaWQiOiIyMzYiLCJMaW5lQ29sb3IiOnsiJHJlZiI6Ijk5In0sIkxpbmVXZWlnaHQiOjAuMCwiTGluZVR5cGUiOjAsIlBhcmVudFN0eWxlIjp7IiRyZWYiOiI5OCJ9fSwiTWFyZ2luIjpudWxsLCJTdGFydERhdGVQb3NpdGlvbiI6NCwiRW5kRGF0ZVBvc2l0aW9uIjo0LCJUaXRsZVBvc2l0aW9uIjo1LCJEdXJhdGlvblBvc2l0aW9uIjo2LCJQZXJjZW50YWdlQ29tcGxldGVkUG9zaXRpb24iOjYsIlNwYWNpbmciOjUsIklzQmVsb3dUaW1lYmFuZCI6dHJ1ZSwiUGVyY2VudGFnZUNvbXBsZXRlU2hhcGVPcGFjaXR5IjozNSwiU2hhcGVTdHlsZSI6eyIkaWQiOiIyMzciLCJNYXJnaW4iOnsiJHJlZiI6IjEwMiJ9LCJQYWRkaW5nIjp7IiRyZWYiOiIxMDMifSwiQmFja2dyb3VuZCI6eyIkaWQiOiIyMzgiLCJDb2xvciI6eyIkaWQiOiIyMzkiLCJBIjoyNTUsIlIiOjQ3LCJHIjo1NCwiQiI6MTUzfX0sIklzVmlzaWJsZSI6dHJ1ZSwiV2lkdGgiOjAuMCwiSGVpZ2h0IjoxNi4wLCJCb3JkZXJTdHlsZSI6eyIkaWQiOiIyNDAiLCJMaW5lQ29sb3IiOnsiJHJlZiI6IjEwNSJ9LCJMaW5lV2VpZ2h0IjowLjAsIkxpbmVUeXBlIjowLCJQYXJlbnRTdHlsZSI6eyIkcmVmIjoiMTA0In19LCJQYXJlbnRTdHlsZSI6eyIkcmVmIjoiMTAxIn19LCJUaXRsZVN0eWxlIjp7IiRpZCI6IjI0MSIsIkZvbnRTZXR0aW5ncyI6eyIkaWQiOiIyNDIiLCJGb250U2l6ZSI6MTEsIkZvbnROYW1lIjoiQ2FsaWJyaSIsIklzQm9sZCI6dHJ1ZSwiSXNJdGFsaWMiOmZhbHNlLCJJc1VuZGVybGluZWQiOmZhbHNlLCJQYXJlbnRTdHlsZSI6eyIkcmVmIjoiMTA4In19LCJBdXRvU2l6ZSI6MCwiRm9yZWdyb3VuZCI6eyIkcmVmIjoiMTA5In0sIk1heFdpZHRoIjo3MjAuMCwiTWF4SGVpZ2h0IjoiSW5maW5pdHkiLCJTbWFydEZvcmVncm91bmRJc0FjdGl2ZSI6ZmFsc2UsIkhvcml6b250YWxBbGlnbm1lbnQiOjAsIlZlcnRpY2FsQWxpZ25tZW50IjowLCJTbWFydEZvcmVncm91bmQiOm51bGwsIk1hcmdpbiI6eyIkcmVmIjoiMTExIn0sIlBhZGRpbmciOnsiJHJlZiI6IjExMiJ9LCJCYWNrZ3JvdW5kIjp7IiRyZWYiOiIxMTMifSwiSXNWaXNpYmxlIjp0cnVlLCJXaWR0aCI6MC4wLCJIZWlnaHQiOjAuMCwiQm9yZGVyU3R5bGUiOnsiJGlkIjoiMjQzIiwiTGluZUNvbG9yIjpudWxsLCJMaW5lV2VpZ2h0IjowLjAsIkxpbmVUeXBlIjowLCJQYXJlbnRTdHlsZSI6bnVsbH0sIlBhcmVudFN0eWxlIjp7IiRyZWYiOiIxMDcifX0sIkRhdGVTdHlsZSI6eyIkaWQiOiIyNDQiLCJGb250U2V0dGluZ3MiOnsiJGlkIjoiMjQ1IiwiRm9udFNpemUiOjEwLCJGb250TmFtZSI6IkNhbGlicmkiLCJJc0JvbGQiOmZhbHNlLCJJc0l0YWxpYyI6ZmFsc2UsIklzVW5kZXJsaW5lZCI6ZmFsc2UsIlBhcmVudFN0eWxlIjp7IiRyZWYiOiIxMTUifX0sIkF1dG9TaXplIjowLCJGb3JlZ3JvdW5kIjp7IiRyZWYiOiIxMTYifSwiTWF4V2lkdGgiOjIwMC4wLCJNYXhIZWlnaHQiOiJJbmZpbml0eSIsIlNtYXJ0Rm9yZWdyb3VuZElzQWN0aXZlIjpmYWxzZSwiSG9yaXpvbnRhbEFsaWdubWVudCI6MCwiVmVydGljYWxBbGlnbm1lbnQiOjAsIlNtYXJ0Rm9yZWdyb3VuZCI6bnVsbCwiTWFyZ2luIjp7IiRyZWYiOiIxMTgifSwiUGFkZGluZyI6eyIkcmVmIjoiMTE5In0sIkJhY2tncm91bmQiOnsiJHJlZiI6IjEyMCJ9LCJJc1Zpc2libGUiOnRydWUsIldpZHRoIjowLjAsIkhlaWdodCI6MC4wLCJCb3JkZXJTdHlsZSI6eyIkaWQiOiIyNDYiLCJMaW5lQ29sb3IiOm51bGwsIkxpbmVXZWlnaHQiOjAuMCwiTGluZVR5cGUiOjAsIlBhcmVudFN0eWxlIjpudWxsfSwiUGFyZW50U3R5bGUiOnsiJHJlZiI6IjExNCJ9fSwiRGF0ZUZvcm1hdCI6eyIkcmVmIjoiMTIxIn0sIklzVmlzaWJsZSI6dHJ1ZSwiUGFyZW50U3R5bGUiOnsiJHJlZiI6IjgwIn19LCJJbmRleCI6MywiSWQiOiI3N2ViMjJlNy1jZDBiLTRkYzItOTlhNC0yMDBkN2I3ZjEyZWIiLCJJbXBvcnRJZCI6bnVsbCwiVGl0bGUiOiJTUkJNIiwiTm90ZSI6bnVsbCwiSHlwZXJsaW5rIjpudWxsLCJJc0NoYW5nZWQiOmZhbHNlLCJJc05ldyI6ZmFsc2V9LHsiJGlkIjoiMjQ3IiwiR3JvdXBOYW1lIjpudWxsLCJTdGFydERhdGUiOiIyMDE2LTAzLTAxVDAwOjAwOjAwWiIsIkVuZERhdGUiOiIyMDE2LTA2LTAxVDIzOjU5OjU5Ljk5OVoiLCJQZXJjZW50YWdlQ29tcGxldGUiOm51bGwsIlN0eWxlIjp7IiRpZCI6IjI0OCIsIlNoYXBlIjowLCJTaGFwZVRoaWNrbmVzcyI6MSwiRHVyYXRpb25Gb3JtYXQiOjAsIkluY2x1ZGVOb25Xb3JraW5nRGF5c0luRHVyYXRpb24iOnRydWUsIlBlcmNlbnRhZ2VDb21wbGV0ZVN0eWxlIjp7IiRpZCI6IjI0OSIsIkZvbnRTZXR0aW5ncyI6eyIkaWQiOiIyNTAiLCJGb250U2l6ZSI6MTAsIkZvbnROYW1lIjoiQ2FsaWJyaSIsIklzQm9sZCI6ZmFsc2UsIklzSXRhbGljIjpmYWxzZSwiSXNVbmRlcmxpbmVkIjpmYWxzZSwiUGFyZW50U3R5bGUiOnsiJHJlZiI6IjgyIn19LCJBdXRvU2l6ZSI6MCwiRm9yZWdyb3VuZCI6eyIkcmVmIjoiODMifSwiTWF4V2lkdGgiOjIwMC4wLCJNYXhIZWlnaHQiOiJJbmZpbml0eSIsIlNtYXJ0Rm9yZWdyb3VuZElzQWN0aXZlIjpmYWxzZSwiSG9yaXpvbnRhbEFsaWdubWVudCI6MCwiVmVydGljYWxBbGlnbm1lbnQiOjAsIlNtYXJ0Rm9yZWdyb3VuZCI6bnVsbCwiTWFyZ2luIjp7IiRyZWYiOiI4NSJ9LCJQYWRkaW5nIjp7IiRyZWYiOiI4NiJ9LCJCYWNrZ3JvdW5kIjp7IiRyZWYiOiI4NyJ9LCJJc1Zpc2libGUiOnRydWUsIldpZHRoIjowLjAsIkhlaWdodCI6MC4wLCJCb3JkZXJTdHlsZSI6eyIkaWQiOiIyNTEiLCJMaW5lQ29sb3IiOm51bGwsIkxpbmVXZWlnaHQiOjAuMCwiTGluZVR5cGUiOjAsIlBhcmVudFN0eWxlIjpudWxsfSwiUGFyZW50U3R5bGUiOnsiJHJlZiI6IjgxIn19LCJEdXJhdGlvblN0eWxlIjp7IiRpZCI6IjI1MiIsIkZvbnRTZXR0aW5ncyI6eyIkaWQiOiIyNTMiLCJGb250U2l6ZSI6MTAsIkZvbnROYW1lIjoiQ2FsaWJyaSIsIklzQm9sZCI6ZmFsc2UsIklzSXRhbGljIjpmYWxzZSwiSXNVbmRlcmxpbmVkIjpmYWxzZSwiUGFyZW50U3R5bGUiOnsiJHJlZiI6Ijg5In19LCJBdXRvU2l6ZSI6MCwiRm9yZWdyb3VuZCI6eyIkcmVmIjoiOTAifSwiTWF4V2lkdGgiOjIwMC4wLCJNYXhIZWlnaHQiOiJJbmZpbml0eSIsIlNtYXJ0Rm9yZWdyb3VuZElzQWN0aXZlIjpmYWxzZSwiSG9yaXpvbnRhbEFsaWdubWVudCI6MCwiVmVydGljYWxBbGlnbm1lbnQiOjAsIlNtYXJ0Rm9yZWdyb3VuZCI6bnVsbCwiTWFyZ2luIjp7IiRyZWYiOiI5MiJ9LCJQYWRkaW5nIjp7IiRyZWYiOiI5MyJ9LCJCYWNrZ3JvdW5kIjp7IiRyZWYiOiI5NCJ9LCJJc1Zpc2libGUiOnRydWUsIldpZHRoIjowLjAsIkhlaWdodCI6MC4wLCJCb3JkZXJTdHlsZSI6eyIkaWQiOiIyNTQiLCJMaW5lQ29sb3IiOm51bGwsIkxpbmVXZWlnaHQiOjAuMCwiTGluZVR5cGUiOjAsIlBhcmVudFN0eWxlIjpudWxsfSwiUGFyZW50U3R5bGUiOnsiJHJlZiI6Ijg4In19LCJIb3Jpem9udGFsQ29ubmVjdG9yU3R5bGUiOnsiJGlkIjoiMjU1IiwiTGluZUNvbG9yIjp7IiRyZWYiOiI5NiJ9LCJMaW5lV2VpZ2h0IjoxLjAsIkxpbmVUeXBlIjowLCJQYXJlbnRTdHlsZSI6eyIkcmVmIjoiOTUifX0sIlZlcnRpY2FsQ29ubmVjdG9yU3R5bGUiOnsiJGlkIjoiMjU2IiwiTGluZUNvbG9yIjp7IiRyZWYiOiI5OSJ9LCJMaW5lV2VpZ2h0IjowLjAsIkxpbmVUeXBlIjowLCJQYXJlbnRTdHlsZSI6eyIkcmVmIjoiOTgifX0sIk1hcmdpbiI6bnVsbCwiU3RhcnREYXRlUG9zaXRpb24iOjQsIkVuZERhdGVQb3NpdGlvbiI6NCwiVGl0bGVQb3NpdGlvbiI6NSwiRHVyYXRpb25Qb3NpdGlvbiI6NiwiUGVyY2VudGFnZUNvbXBsZXRlZFBvc2l0aW9uIjo2LCJTcGFjaW5nIjo1LCJJc0JlbG93VGltZWJhbmQiOnRydWUsIlBlcmNlbnRhZ2VDb21wbGV0ZVNoYXBlT3BhY2l0eSI6MzUsIlNoYXBlU3R5bGUiOnsiJGlkIjoiMjU3IiwiTWFyZ2luIjp7IiRyZWYiOiIxMDIifSwiUGFkZGluZyI6eyIkcmVmIjoiMTAzIn0sIkJhY2tncm91bmQiOnsiJGlkIjoiMjU4IiwiQ29sb3IiOnsiJGlkIjoiMjU5IiwiQSI6MjU1LCJSIjo0NywiRyI6NTQsIkIiOjE1M319LCJJc1Zpc2libGUiOnRydWUsIldpZHRoIjowLjAsIkhlaWdodCI6MTYuMCwiQm9yZGVyU3R5bGUiOnsiJGlkIjoiMjYwIiwiTGluZUNvbG9yIjp7IiRyZWYiOiIxMDUifSwiTGluZVdlaWdodCI6MC4wLCJMaW5lVHlwZSI6MCwiUGFyZW50U3R5bGUiOnsiJHJlZiI6IjEwNCJ9fSwiUGFyZW50U3R5bGUiOnsiJHJlZiI6IjEwMSJ9fSwiVGl0bGVTdHlsZSI6eyIkaWQiOiIyNjEiLCJGb250U2V0dGluZ3MiOnsiJGlkIjoiMjYyIiwiRm9udFNpemUiOjExLCJGb250TmFtZSI6IkNhbGlicmkiLCJJc0JvbGQiOnRydWUsIklzSXRhbGljIjpmYWxzZSwiSXNVbmRlcmxpbmVkIjpmYWxzZSwiUGFyZW50U3R5bGUiOnsiJHJlZiI6IjEwOCJ9fSwiQXV0b1NpemUiOjAsIkZvcmVncm91bmQiOnsiJHJlZiI6IjEwOSJ9LCJNYXhXaWR0aCI6NzIwLjAsIk1heEhlaWdodCI6IkluZmluaXR5IiwiU21hcnRGb3JlZ3JvdW5kSXNBY3RpdmUiOmZhbHNlLCJIb3Jpem9udGFsQWxpZ25tZW50IjowLCJWZXJ0aWNhbEFsaWdubWVudCI6MCwiU21hcnRGb3JlZ3JvdW5kIjpudWxsLCJNYXJnaW4iOnsiJHJlZiI6IjExMSJ9LCJQYWRkaW5nIjp7IiRyZWYiOiIxMTIifSwiQmFja2dyb3VuZCI6eyIkcmVmIjoiMTEzIn0sIklzVmlzaWJsZSI6dHJ1ZSwiV2lkdGgiOjAuMCwiSGVpZ2h0IjowLjAsIkJvcmRlclN0eWxlIjp7IiRpZCI6IjI2MyIsIkxpbmVDb2xvciI6bnVsbCwiTGluZVdlaWdodCI6MC4wLCJMaW5lVHlwZSI6MCwiUGFyZW50U3R5bGUiOm51bGx9LCJQYXJlbnRTdHlsZSI6eyIkcmVmIjoiMTA3In19LCJEYXRlU3R5bGUiOnsiJGlkIjoiMjY0IiwiRm9udFNldHRpbmdzIjp7IiRpZCI6IjI2NSIsIkZvbnRTaXplIjoxMCwiRm9udE5hbWUiOiJDYWxpYnJpIiwiSXNCb2xkIjpmYWxzZSwiSXNJdGFsaWMiOmZhbHNlLCJJc1VuZGVybGluZWQiOmZhbHNlLCJQYXJlbnRTdHlsZSI6eyIkcmVmIjoiMTE1In19LCJBdXRvU2l6ZSI6MCwiRm9yZWdyb3VuZCI6eyIkcmVmIjoiMTE2In0sIk1heFdpZHRoIjoyMDAuMCwiTWF4SGVpZ2h0IjoiSW5maW5pdHkiLCJTbWFydEZvcmVncm91bmRJc0FjdGl2ZSI6ZmFsc2UsIkhvcml6b250YWxBbGlnbm1lbnQiOjAsIlZlcnRpY2FsQWxpZ25tZW50IjowLCJTbWFydEZvcmVncm91bmQiOm51bGwsIk1hcmdpbiI6eyIkcmVmIjoiMTE4In0sIlBhZGRpbmciOnsiJHJlZiI6IjExOSJ9LCJCYWNrZ3JvdW5kIjp7IiRyZWYiOiIxMjAifSwiSXNWaXNpYmxlIjp0cnVlLCJXaWR0aCI6MC4wLCJIZWlnaHQiOjAuMCwiQm9yZGVyU3R5bGUiOnsiJGlkIjoiMjY2IiwiTGluZUNvbG9yIjpudWxsLCJMaW5lV2VpZ2h0IjowLjAsIkxpbmVUeXBlIjowLCJQYXJlbnRTdHlsZSI6bnVsbH0sIlBhcmVudFN0eWxlIjp7IiRyZWYiOiIxMTQifX0sIkRhdGVGb3JtYXQiOnsiJHJlZiI6IjEyMSJ9LCJJc1Zpc2libGUiOnRydWUsIlBhcmVudFN0eWxlIjp7IiRyZWYiOiI4MCJ9fSwiSW5kZXgiOjQsIklkIjoiMDg2MmZiY2MtZTZmNy00YzQ3LWI5NjMtOTE1NzNlMDA2MDlkIiwiSW1wb3J0SWQiOm51bGwsIlRpdGxlIjoiU0RCTiIsIk5vdGUiOm51bGwsIkh5cGVybGluayI6bnVsbCwiSXNDaGFuZ2VkIjpmYWxzZSwiSXNOZXciOmZhbHNlfSx7IiRpZCI6IjI2NyIsIkdyb3VwTmFtZSI6bnVsbCwiU3RhcnREYXRlIjoiMjAxNi0wNC0wMVQwMDowMDowMFoiLCJFbmREYXRlIjoiMjAxNi0wNy0wMVQyMzo1OTo1OS45OTlaIiwiUGVyY2VudGFnZUNvbXBsZXRlIjpudWxsLCJTdHlsZSI6eyIkaWQiOiIyNjgiLCJTaGFwZSI6MCwiU2hhcGVUaGlja25lc3MiOjEsIkR1cmF0aW9uRm9ybWF0IjowLCJJbmNsdWRlTm9uV29ya2luZ0RheXNJbkR1cmF0aW9uIjp0cnVlLCJQZXJjZW50YWdlQ29tcGxldGVTdHlsZSI6eyIkaWQiOiIyNjkiLCJGb250U2V0dGluZ3MiOnsiJGlkIjoiMjcwIiwiRm9udFNpemUiOjEwLCJGb250TmFtZSI6IkNhbGlicmkiLCJJc0JvbGQiOmZhbHNlLCJJc0l0YWxpYyI6ZmFsc2UsIklzVW5kZXJsaW5lZCI6ZmFsc2UsIlBhcmVudFN0eWxlIjp7IiRyZWYiOiI4MiJ9fSwiQXV0b1NpemUiOjAsIkZvcmVncm91bmQiOnsiJHJlZiI6IjgzIn0sIk1heFdpZHRoIjoyMDAuMCwiTWF4SGVpZ2h0IjoiSW5maW5pdHkiLCJTbWFydEZvcmVncm91bmRJc0FjdGl2ZSI6ZmFsc2UsIkhvcml6b250YWxBbGlnbm1lbnQiOjAsIlZlcnRpY2FsQWxpZ25tZW50IjowLCJTbWFydEZvcmVncm91bmQiOm51bGwsIk1hcmdpbiI6eyIkcmVmIjoiODUifSwiUGFkZGluZyI6eyIkcmVmIjoiODYifSwiQmFja2dyb3VuZCI6eyIkcmVmIjoiODcifSwiSXNWaXNpYmxlIjp0cnVlLCJXaWR0aCI6MC4wLCJIZWlnaHQiOjAuMCwiQm9yZGVyU3R5bGUiOnsiJGlkIjoiMjcxIiwiTGluZUNvbG9yIjpudWxsLCJMaW5lV2VpZ2h0IjowLjAsIkxpbmVUeXBlIjowLCJQYXJlbnRTdHlsZSI6bnVsbH0sIlBhcmVudFN0eWxlIjp7IiRyZWYiOiI4MSJ9fSwiRHVyYXRpb25TdHlsZSI6eyIkaWQiOiIyNzIiLCJGb250U2V0dGluZ3MiOnsiJGlkIjoiMjczIiwiRm9udFNpemUiOjEwLCJGb250TmFtZSI6IkNhbGlicmkiLCJJc0JvbGQiOmZhbHNlLCJJc0l0YWxpYyI6ZmFsc2UsIklzVW5kZXJsaW5lZCI6ZmFsc2UsIlBhcmVudFN0eWxlIjp7IiRyZWYiOiI4OSJ9fSwiQXV0b1NpemUiOjAsIkZvcmVncm91bmQiOnsiJHJlZiI6IjkwIn0sIk1heFdpZHRoIjoyMDAuMCwiTWF4SGVpZ2h0IjoiSW5maW5pdHkiLCJTbWFydEZvcmVncm91bmRJc0FjdGl2ZSI6ZmFsc2UsIkhvcml6b250YWxBbGlnbm1lbnQiOjAsIlZlcnRpY2FsQWxpZ25tZW50IjowLCJTbWFydEZvcmVncm91bmQiOm51bGwsIk1hcmdpbiI6eyIkcmVmIjoiOTIifSwiUGFkZGluZyI6eyIkcmVmIjoiOTMifSwiQmFja2dyb3VuZCI6eyIkcmVmIjoiOTQifSwiSXNWaXNpYmxlIjp0cnVlLCJXaWR0aCI6MC4wLCJIZWlnaHQiOjAuMCwiQm9yZGVyU3R5bGUiOnsiJGlkIjoiMjc0IiwiTGluZUNvbG9yIjpudWxsLCJMaW5lV2VpZ2h0IjowLjAsIkxpbmVUeXBlIjowLCJQYXJlbnRTdHlsZSI6bnVsbH0sIlBhcmVudFN0eWxlIjp7IiRyZWYiOiI4OCJ9fSwiSG9yaXpvbnRhbENvbm5lY3RvclN0eWxlIjp7IiRpZCI6IjI3NSIsIkxpbmVDb2xvciI6eyIkcmVmIjoiOTYifSwiTGluZVdlaWdodCI6MS4wLCJMaW5lVHlwZSI6MCwiUGFyZW50U3R5bGUiOnsiJHJlZiI6Ijk1In19LCJWZXJ0aWNhbENvbm5lY3RvclN0eWxlIjp7IiRpZCI6IjI3NiIsIkxpbmVDb2xvciI6eyIkcmVmIjoiOTkifSwiTGluZVdlaWdodCI6MC4wLCJMaW5lVHlwZSI6MCwiUGFyZW50U3R5bGUiOnsiJHJlZiI6Ijk4In19LCJNYXJnaW4iOm51bGwsIlN0YXJ0RGF0ZVBvc2l0aW9uIjo0LCJFbmREYXRlUG9zaXRpb24iOjQsIlRpdGxlUG9zaXRpb24iOjUsIkR1cmF0aW9uUG9zaXRpb24iOjYsIlBlcmNlbnRhZ2VDb21wbGV0ZWRQb3NpdGlvbiI6NiwiU3BhY2luZyI6NSwiSXNCZWxvd1RpbWViYW5kIjp0cnVlLCJQZXJjZW50YWdlQ29tcGxldGVTaGFwZU9wYWNpdHkiOjM1LCJTaGFwZVN0eWxlIjp7IiRpZCI6IjI3NyIsIk1hcmdpbiI6eyIkcmVmIjoiMTAyIn0sIlBhZGRpbmciOnsiJHJlZiI6IjEwMyJ9LCJCYWNrZ3JvdW5kIjp7IiRpZCI6IjI3OCIsIkNvbG9yIjp7IiRpZCI6IjI3OSIsIkEiOjI1NSwiUiI6NDcsIkciOjU0LCJCIjoxNTN9fSwiSXNWaXNpYmxlIjp0cnVlLCJXaWR0aCI6MC4wLCJIZWlnaHQiOjE2LjAsIkJvcmRlclN0eWxlIjp7IiRpZCI6IjI4MCIsIkxpbmVDb2xvciI6eyIkcmVmIjoiMTA1In0sIkxpbmVXZWlnaHQiOjAuMCwiTGluZVR5cGUiOjAsIlBhcmVudFN0eWxlIjp7IiRyZWYiOiIxMDQifX0sIlBhcmVudFN0eWxlIjp7IiRyZWYiOiIxMDEifX0sIlRpdGxlU3R5bGUiOnsiJGlkIjoiMjgxIiwiRm9udFNldHRpbmdzIjp7IiRpZCI6IjI4MiIsIkZvbnRTaXplIjoxMSwiRm9udE5hbWUiOiJDYWxpYnJpIiwiSXNCb2xkIjp0cnVlLCJJc0l0YWxpYyI6ZmFsc2UsIklzVW5kZXJsaW5lZCI6ZmFsc2UsIlBhcmVudFN0eWxlIjp7IiRyZWYiOiIxMDgifX0sIkF1dG9TaXplIjowLCJGb3JlZ3JvdW5kIjp7IiRyZWYiOiIxMDkifSwiTWF4V2lkdGgiOjcyMC4wLCJNYXhIZWlnaHQiOiJJbmZpbml0eSIsIlNtYXJ0Rm9yZWdyb3VuZElzQWN0aXZlIjpmYWxzZSwiSG9yaXpvbnRhbEFsaWdubWVudCI6MCwiVmVydGljYWxBbGlnbm1lbnQiOjAsIlNtYXJ0Rm9yZWdyb3VuZCI6bnVsbCwiTWFyZ2luIjp7IiRyZWYiOiIxMTEifSwiUGFkZGluZyI6eyIkcmVmIjoiMTEyIn0sIkJhY2tncm91bmQiOnsiJHJlZiI6IjExMyJ9LCJJc1Zpc2libGUiOnRydWUsIldpZHRoIjowLjAsIkhlaWdodCI6MC4wLCJCb3JkZXJTdHlsZSI6eyIkaWQiOiIyODMiLCJMaW5lQ29sb3IiOm51bGwsIkxpbmVXZWlnaHQiOjAuMCwiTGluZVR5cGUiOjAsIlBhcmVudFN0eWxlIjpudWxsfSwiUGFyZW50U3R5bGUiOnsiJHJlZiI6IjEwNyJ9fSwiRGF0ZVN0eWxlIjp7IiRpZCI6IjI4NCIsIkZvbnRTZXR0aW5ncyI6eyIkaWQiOiIyODUiLCJGb250U2l6ZSI6MTAsIkZvbnROYW1lIjoiQ2FsaWJyaSIsIklzQm9sZCI6ZmFsc2UsIklzSXRhbGljIjpmYWxzZSwiSXNVbmRlcmxpbmVkIjpmYWxzZSwiUGFyZW50U3R5bGUiOnsiJHJlZiI6IjExNSJ9fSwiQXV0b1NpemUiOjAsIkZvcmVncm91bmQiOnsiJHJlZiI6IjExNiJ9LCJNYXhXaWR0aCI6MjAwLjAsIk1heEhlaWdodCI6IkluZmluaXR5IiwiU21hcnRGb3JlZ3JvdW5kSXNBY3RpdmUiOmZhbHNlLCJIb3Jpem9udGFsQWxpZ25tZW50IjowLCJWZXJ0aWNhbEFsaWdubWVudCI6MCwiU21hcnRGb3JlZ3JvdW5kIjpudWxsLCJNYXJnaW4iOnsiJHJlZiI6IjExOCJ9LCJQYWRkaW5nIjp7IiRyZWYiOiIxMTkifSwiQmFja2dyb3VuZCI6eyIkcmVmIjoiMTIwIn0sIklzVmlzaWJsZSI6dHJ1ZSwiV2lkdGgiOjAuMCwiSGVpZ2h0IjowLjAsIkJvcmRlclN0eWxlIjp7IiRpZCI6IjI4NiIsIkxpbmVDb2xvciI6bnVsbCwiTGluZVdlaWdodCI6MC4wLCJMaW5lVHlwZSI6MCwiUGFyZW50U3R5bGUiOm51bGx9LCJQYXJlbnRTdHlsZSI6eyIkcmVmIjoiMTE0In19LCJEYXRlRm9ybWF0Ijp7IiRyZWYiOiIxMjEifSwiSXNWaXNpYmxlIjp0cnVlLCJQYXJlbnRTdHlsZSI6eyIkcmVmIjoiODAifX0sIkluZGV4Ijo1LCJJZCI6IjlhYzhkMTgxLTg2ZTctNDAzNS1hMjczLTBhM2E2ZTc3NGVlNiIsIkltcG9ydElkIjpudWxsLCJUaXRsZSI6IkJlbmNoYXJrcyIsIk5vdGUiOm51bGwsIkh5cGVybGluayI6bnVsbCwiSXNDaGFuZ2VkIjpmYWxzZSwiSXNOZXciOmZhbHNlfSx7IiRpZCI6IjI4NyIsIkdyb3VwTmFtZSI6bnVsbCwiU3RhcnREYXRlIjoiMjAxNi0wNi0wMVQwMDowMDowMFoiLCJFbmREYXRlIjoiMjAxNi0xMi0wMVQyMzo1OTo1OS45OTlaIiwiUGVyY2VudGFnZUNvbXBsZXRlIjpudWxsLCJTdHlsZSI6eyIkaWQiOiIyODgiLCJTaGFwZSI6MCwiU2hhcGVUaGlja25lc3MiOjEsIkR1cmF0aW9uRm9ybWF0IjowLCJJbmNsdWRlTm9uV29ya2luZ0RheXNJbkR1cmF0aW9uIjp0cnVlLCJQZXJjZW50YWdlQ29tcGxldGVTdHlsZSI6eyIkaWQiOiIyODkiLCJGb250U2V0dGluZ3MiOnsiJGlkIjoiMjkwIiwiRm9udFNpemUiOjEwLCJGb250TmFtZSI6IkNhbGlicmkiLCJJc0JvbGQiOmZhbHNlLCJJc0l0YWxpYyI6ZmFsc2UsIklzVW5kZXJsaW5lZCI6ZmFsc2UsIlBhcmVudFN0eWxlIjp7IiRyZWYiOiI4MiJ9fSwiQXV0b1NpemUiOjAsIkZvcmVncm91bmQiOnsiJHJlZiI6IjgzIn0sIk1heFdpZHRoIjoyMDAuMCwiTWF4SGVpZ2h0IjoiSW5maW5pdHkiLCJTbWFydEZvcmVncm91bmRJc0FjdGl2ZSI6ZmFsc2UsIkhvcml6b250YWxBbGlnbm1lbnQiOjAsIlZlcnRpY2FsQWxpZ25tZW50IjowLCJTbWFydEZvcmVncm91bmQiOm51bGwsIk1hcmdpbiI6eyIkcmVmIjoiODUifSwiUGFkZGluZyI6eyIkcmVmIjoiODYifSwiQmFja2dyb3VuZCI6eyIkcmVmIjoiODcifSwiSXNWaXNpYmxlIjp0cnVlLCJXaWR0aCI6MC4wLCJIZWlnaHQiOjAuMCwiQm9yZGVyU3R5bGUiOnsiJGlkIjoiMjkxIiwiTGluZUNvbG9yIjpudWxsLCJMaW5lV2VpZ2h0IjowLjAsIkxpbmVUeXBlIjowLCJQYXJlbnRTdHlsZSI6bnVsbH0sIlBhcmVudFN0eWxlIjp7IiRyZWYiOiI4MSJ9fSwiRHVyYXRpb25TdHlsZSI6eyIkaWQiOiIyOTIiLCJGb250U2V0dGluZ3MiOnsiJGlkIjoiMjkzIiwiRm9udFNpemUiOjEwLCJGb250TmFtZSI6IkNhbGlicmkiLCJJc0JvbGQiOmZhbHNlLCJJc0l0YWxpYyI6ZmFsc2UsIklzVW5kZXJsaW5lZCI6ZmFsc2UsIlBhcmVudFN0eWxlIjp7IiRyZWYiOiI4OSJ9fSwiQXV0b1NpemUiOjAsIkZvcmVncm91bmQiOnsiJHJlZiI6IjkwIn0sIk1heFdpZHRoIjoyMDAuMCwiTWF4SGVpZ2h0IjoiSW5maW5pdHkiLCJTbWFydEZvcmVncm91bmRJc0FjdGl2ZSI6ZmFsc2UsIkhvcml6b250YWxBbGlnbm1lbnQiOjAsIlZlcnRpY2FsQWxpZ25tZW50IjowLCJTbWFydEZvcmVncm91bmQiOm51bGwsIk1hcmdpbiI6eyIkcmVmIjoiOTIifSwiUGFkZGluZyI6eyIkcmVmIjoiOTMifSwiQmFja2dyb3VuZCI6eyIkcmVmIjoiOTQifSwiSXNWaXNpYmxlIjp0cnVlLCJXaWR0aCI6MC4wLCJIZWlnaHQiOjAuMCwiQm9yZGVyU3R5bGUiOnsiJGlkIjoiMjk0IiwiTGluZUNvbG9yIjpudWxsLCJMaW5lV2VpZ2h0IjowLjAsIkxpbmVUeXBlIjowLCJQYXJlbnRTdHlsZSI6bnVsbH0sIlBhcmVudFN0eWxlIjp7IiRyZWYiOiI4OCJ9fSwiSG9yaXpvbnRhbENvbm5lY3RvclN0eWxlIjp7IiRpZCI6IjI5NSIsIkxpbmVDb2xvciI6eyIkcmVmIjoiOTYifSwiTGluZVdlaWdodCI6MS4wLCJMaW5lVHlwZSI6MCwiUGFyZW50U3R5bGUiOnsiJHJlZiI6Ijk1In19LCJWZXJ0aWNhbENvbm5lY3RvclN0eWxlIjp7IiRpZCI6IjI5NiIsIkxpbmVDb2xvciI6eyIkcmVmIjoiOTkifSwiTGluZVdlaWdodCI6MC4wLCJMaW5lVHlwZSI6MCwiUGFyZW50U3R5bGUiOnsiJHJlZiI6Ijk4In19LCJNYXJnaW4iOm51bGwsIlN0YXJ0RGF0ZVBvc2l0aW9uIjo0LCJFbmREYXRlUG9zaXRpb24iOjQsIlRpdGxlUG9zaXRpb24iOjUsIkR1cmF0aW9uUG9zaXRpb24iOjYsIlBlcmNlbnRhZ2VDb21wbGV0ZWRQb3NpdGlvbiI6NiwiU3BhY2luZyI6NSwiSXNCZWxvd1RpbWViYW5kIjp0cnVlLCJQZXJjZW50YWdlQ29tcGxldGVTaGFwZU9wYWNpdHkiOjM1LCJTaGFwZVN0eWxlIjp7IiRpZCI6IjI5NyIsIk1hcmdpbiI6eyIkcmVmIjoiMTAyIn0sIlBhZGRpbmciOnsiJHJlZiI6IjEwMyJ9LCJCYWNrZ3JvdW5kIjp7IiRpZCI6IjI5OCIsIkNvbG9yIjp7IiRpZCI6IjI5OSIsIkEiOjI1NSwiUiI6NDcsIkciOjU0LCJCIjoxNTN9fSwiSXNWaXNpYmxlIjp0cnVlLCJXaWR0aCI6MC4wLCJIZWlnaHQiOjE2LjAsIkJvcmRlclN0eWxlIjp7IiRpZCI6IjMwMCIsIkxpbmVDb2xvciI6eyIkcmVmIjoiMTA1In0sIkxpbmVXZWlnaHQiOjAuMCwiTGluZVR5cGUiOjAsIlBhcmVudFN0eWxlIjp7IiRyZWYiOiIxMDQifX0sIlBhcmVudFN0eWxlIjp7IiRyZWYiOiIxMDEifX0sIlRpdGxlU3R5bGUiOnsiJGlkIjoiMzAxIiwiRm9udFNldHRpbmdzIjp7IiRpZCI6IjMwMiIsIkZvbnRTaXplIjoxMSwiRm9udE5hbWUiOiJDYWxpYnJpIiwiSXNCb2xkIjp0cnVlLCJJc0l0YWxpYyI6ZmFsc2UsIklzVW5kZXJsaW5lZCI6ZmFsc2UsIlBhcmVudFN0eWxlIjp7IiRyZWYiOiIxMDgifX0sIkF1dG9TaXplIjowLCJGb3JlZ3JvdW5kIjp7IiRyZWYiOiIxMDkifSwiTWF4V2lkdGgiOjcyMC4wLCJNYXhIZWlnaHQiOiJJbmZpbml0eSIsIlNtYXJ0Rm9yZWdyb3VuZElzQWN0aXZlIjpmYWxzZSwiSG9yaXpvbnRhbEFsaWdubWVudCI6MCwiVmVydGljYWxBbGlnbm1lbnQiOjAsIlNtYXJ0Rm9yZWdyb3VuZCI6bnVsbCwiTWFyZ2luIjp7IiRyZWYiOiIxMTEifSwiUGFkZGluZyI6eyIkcmVmIjoiMTEyIn0sIkJhY2tncm91bmQiOnsiJHJlZiI6IjExMyJ9LCJJc1Zpc2libGUiOnRydWUsIldpZHRoIjowLjAsIkhlaWdodCI6MC4wLCJCb3JkZXJTdHlsZSI6eyIkaWQiOiIzMDMiLCJMaW5lQ29sb3IiOm51bGwsIkxpbmVXZWlnaHQiOjAuMCwiTGluZVR5cGUiOjAsIlBhcmVudFN0eWxlIjpudWxsfSwiUGFyZW50U3R5bGUiOnsiJHJlZiI6IjEwNyJ9fSwiRGF0ZVN0eWxlIjp7IiRpZCI6IjMwNCIsIkZvbnRTZXR0aW5ncyI6eyIkaWQiOiIzMDUiLCJGb250U2l6ZSI6MTAsIkZvbnROYW1lIjoiQ2FsaWJyaSIsIklzQm9sZCI6ZmFsc2UsIklzSXRhbGljIjpmYWxzZSwiSXNVbmRlcmxpbmVkIjpmYWxzZSwiUGFyZW50U3R5bGUiOnsiJHJlZiI6IjExNSJ9fSwiQXV0b1NpemUiOjAsIkZvcmVncm91bmQiOnsiJHJlZiI6IjExNiJ9LCJNYXhXaWR0aCI6MjAwLjAsIk1heEhlaWdodCI6IkluZmluaXR5IiwiU21hcnRGb3JlZ3JvdW5kSXNBY3RpdmUiOmZhbHNlLCJIb3Jpem9udGFsQWxpZ25tZW50IjowLCJWZXJ0aWNhbEFsaWdubWVudCI6MCwiU21hcnRGb3JlZ3JvdW5kIjpudWxsLCJNYXJnaW4iOnsiJHJlZiI6IjExOCJ9LCJQYWRkaW5nIjp7IiRyZWYiOiIxMTkifSwiQmFja2dyb3VuZCI6eyIkcmVmIjoiMTIwIn0sIklzVmlzaWJsZSI6dHJ1ZSwiV2lkdGgiOjAuMCwiSGVpZ2h0IjowLjAsIkJvcmRlclN0eWxlIjp7IiRpZCI6IjMwNiIsIkxpbmVDb2xvciI6bnVsbCwiTGluZVdlaWdodCI6MC4wLCJMaW5lVHlwZSI6MCwiUGFyZW50U3R5bGUiOm51bGx9LCJQYXJlbnRTdHlsZSI6eyIkcmVmIjoiMTE0In19LCJEYXRlRm9ybWF0Ijp7IiRyZWYiOiIxMjEifSwiSXNWaXNpYmxlIjp0cnVlLCJQYXJlbnRTdHlsZSI6eyIkcmVmIjoiODAifX0sIkluZGV4Ijo2LCJJZCI6ImUxYWI0NmU4LWQxNzAtNDVmOS05NDZhLThhZjg4OTJjNTBmOCIsIkltcG9ydElkIjpudWxsLCJUaXRsZSI6IlRoZXNpcyBXcml0aW5nIiwiTm90ZSI6bnVsbCwiSHlwZXJsaW5rIjpudWxsLCJJc0NoYW5nZWQiOmZhbHNlLCJJc05ldyI6ZmFsc2V9XSwiTXNQcm9qZWN0SXRlbXNUcmVlIjp7IiRpZCI6IjMwNyIsIlJvb3QiOnsiJGlkIjoiMzA4IiwiSW1wb3J0SWQiOm51bGwsIklzSW1wb3J0ZWQiOmZhbHNlLCJDaGlsZHJlbiI6W119fSwiU2V0dGluZ3MiOnsiJGlkIjoiMzA5IiwiSW1wYU9wdGlvbnMiOnsiJGlkIjoiMzEwIiwiTGVmdFRvUmlnaHQiOmZhbHNlLCJQYXlsb2FkT3B0aW9ucyI6Mn0sIlVzZUNvbXByZXNzaW9uIjpmYWxzZSwiQ29tcHJlc2lvblBlcmNlbnRhZ2UiOjAuMCwiSW5hY3RpdmVJbnRlcnZhbFdpZHRoVGhyZXNob2xkIjowLjAsIkluYWN0aXZlSW50ZXJ2YWxXaWR0aCI6MC4wLCJTcGxpdFRhc2tzIjpmYWxzZSwiVXNlQ2x1c3RlciI6ZmFsc2UsIkVwc2lsb24iOjAuMCwiTWluUG9pbnRzVG9Gb3JtQUNsdXN0ZXIiOjAsIkdlbmVyYXRlSW52aXNpYmxlU2hhcGVzIjpmYWxzZSwiU21hcnRUaW1lbGluZVRhc2tQZXJjZW50YWdlRml0IjpmYWxzZX0sIklzTmV3Ijp0cnVlLCJJbXBvcnRUeXBlIjowLCJGaWxlUGF0aCI6bnVsbCwiVGltZWxpbmVJbXBvcnRlZCI6ZmFsc2V9"/>
+  <p:tag name="__MASTER" val="__part_0"/>
+</p:tagLst>
+</file>
+
+<file path=ppt/tags/tag10.xml><?xml version="1.0" encoding="utf-8"?>
+<p:tagLst xmlns:a="http://schemas.openxmlformats.org/drawingml/2006/main" xmlns:r="http://schemas.openxmlformats.org/officeDocument/2006/relationships" xmlns:p="http://schemas.openxmlformats.org/presentationml/2006/main">
+  <p:tag name="OTLMARKERSHAPE" val="OTL"/>
+</p:tagLst>
+</file>
+
+<file path=ppt/tags/tag11.xml><?xml version="1.0" encoding="utf-8"?>
+<p:tagLst xmlns:a="http://schemas.openxmlformats.org/drawingml/2006/main" xmlns:r="http://schemas.openxmlformats.org/officeDocument/2006/relationships" xmlns:p="http://schemas.openxmlformats.org/presentationml/2006/main">
+  <p:tag name="OTLMARKERSHAPE" val="OTL"/>
+</p:tagLst>
+</file>
+
+<file path=ppt/tags/tag12.xml><?xml version="1.0" encoding="utf-8"?>
+<p:tagLst xmlns:a="http://schemas.openxmlformats.org/drawingml/2006/main" xmlns:r="http://schemas.openxmlformats.org/officeDocument/2006/relationships" xmlns:p="http://schemas.openxmlformats.org/presentationml/2006/main">
+  <p:tag name="OTLMARKERSHAPE" val="OTL"/>
+</p:tagLst>
+</file>
+
+<file path=ppt/tags/tag13.xml><?xml version="1.0" encoding="utf-8"?>
+<p:tagLst xmlns:a="http://schemas.openxmlformats.org/drawingml/2006/main" xmlns:r="http://schemas.openxmlformats.org/officeDocument/2006/relationships" xmlns:p="http://schemas.openxmlformats.org/presentationml/2006/main">
+  <p:tag name="OTLMARKERSHAPE" val="OTL"/>
+</p:tagLst>
+</file>
+
+<file path=ppt/tags/tag14.xml><?xml version="1.0" encoding="utf-8"?>
+<p:tagLst xmlns:a="http://schemas.openxmlformats.org/drawingml/2006/main" xmlns:r="http://schemas.openxmlformats.org/officeDocument/2006/relationships" xmlns:p="http://schemas.openxmlformats.org/presentationml/2006/main">
+  <p:tag name="OTLMARKERSHAPE" val="OTL"/>
+</p:tagLst>
+</file>
+
+<file path=ppt/tags/tag15.xml><?xml version="1.0" encoding="utf-8"?>
+<p:tagLst xmlns:a="http://schemas.openxmlformats.org/drawingml/2006/main" xmlns:r="http://schemas.openxmlformats.org/officeDocument/2006/relationships" xmlns:p="http://schemas.openxmlformats.org/presentationml/2006/main">
+  <p:tag name="OTLMARKERSHAPE" val="OTL"/>
+</p:tagLst>
+</file>
+
+<file path=ppt/tags/tag16.xml><?xml version="1.0" encoding="utf-8"?>
+<p:tagLst xmlns:a="http://schemas.openxmlformats.org/drawingml/2006/main" xmlns:r="http://schemas.openxmlformats.org/officeDocument/2006/relationships" xmlns:p="http://schemas.openxmlformats.org/presentationml/2006/main">
+  <p:tag name="OTLMARKERSHAPE" val="OTL"/>
+</p:tagLst>
+</file>
+
+<file path=ppt/tags/tag17.xml><?xml version="1.0" encoding="utf-8"?>
+<p:tagLst xmlns:a="http://schemas.openxmlformats.org/drawingml/2006/main" xmlns:r="http://schemas.openxmlformats.org/officeDocument/2006/relationships" xmlns:p="http://schemas.openxmlformats.org/presentationml/2006/main">
+  <p:tag name="OTLMARKERSHAPE" val="OTL"/>
+</p:tagLst>
+</file>
+
+<file path=ppt/tags/tag18.xml><?xml version="1.0" encoding="utf-8"?>
+<p:tagLst xmlns:a="http://schemas.openxmlformats.org/drawingml/2006/main" xmlns:r="http://schemas.openxmlformats.org/officeDocument/2006/relationships" xmlns:p="http://schemas.openxmlformats.org/presentationml/2006/main">
+  <p:tag name="OTLMARKERSHAPE" val="OTL"/>
+</p:tagLst>
+</file>
+
+<file path=ppt/tags/tag19.xml><?xml version="1.0" encoding="utf-8"?>
+<p:tagLst xmlns:a="http://schemas.openxmlformats.org/drawingml/2006/main" xmlns:r="http://schemas.openxmlformats.org/officeDocument/2006/relationships" xmlns:p="http://schemas.openxmlformats.org/presentationml/2006/main">
+  <p:tag name="OTLMARKERSHAPE" val="OTL"/>
+</p:tagLst>
+</file>
+
+<file path=ppt/tags/tag2.xml><?xml version="1.0" encoding="utf-8"?>
+<p:tagLst xmlns:a="http://schemas.openxmlformats.org/drawingml/2006/main" xmlns:r="http://schemas.openxmlformats.org/officeDocument/2006/relationships" xmlns:p="http://schemas.openxmlformats.org/presentationml/2006/main">
+  <p:tag name="OTLMARKERSHAPE" val="OTL"/>
+</p:tagLst>
+</file>
+
+<file path=ppt/tags/tag20.xml><?xml version="1.0" encoding="utf-8"?>
+<p:tagLst xmlns:a="http://schemas.openxmlformats.org/drawingml/2006/main" xmlns:r="http://schemas.openxmlformats.org/officeDocument/2006/relationships" xmlns:p="http://schemas.openxmlformats.org/presentationml/2006/main">
+  <p:tag name="OTLMARKERSHAPE" val="OTL"/>
+</p:tagLst>
+</file>
+
+<file path=ppt/tags/tag21.xml><?xml version="1.0" encoding="utf-8"?>
+<p:tagLst xmlns:a="http://schemas.openxmlformats.org/drawingml/2006/main" xmlns:r="http://schemas.openxmlformats.org/officeDocument/2006/relationships" xmlns:p="http://schemas.openxmlformats.org/presentationml/2006/main">
+  <p:tag name="OTLMARKERSHAPE" val="OTL"/>
+</p:tagLst>
+</file>
+
+<file path=ppt/tags/tag22.xml><?xml version="1.0" encoding="utf-8"?>
+<p:tagLst xmlns:a="http://schemas.openxmlformats.org/drawingml/2006/main" xmlns:r="http://schemas.openxmlformats.org/officeDocument/2006/relationships" xmlns:p="http://schemas.openxmlformats.org/presentationml/2006/main">
+  <p:tag name="OTLMARKERSHAPE" val="OTL"/>
+</p:tagLst>
+</file>
+
+<file path=ppt/tags/tag23.xml><?xml version="1.0" encoding="utf-8"?>
+<p:tagLst xmlns:a="http://schemas.openxmlformats.org/drawingml/2006/main" xmlns:r="http://schemas.openxmlformats.org/officeDocument/2006/relationships" xmlns:p="http://schemas.openxmlformats.org/presentationml/2006/main">
+  <p:tag name="OTLMARKERSHAPE" val="OTL"/>
+</p:tagLst>
+</file>
+
+<file path=ppt/tags/tag24.xml><?xml version="1.0" encoding="utf-8"?>
+<p:tagLst xmlns:a="http://schemas.openxmlformats.org/drawingml/2006/main" xmlns:r="http://schemas.openxmlformats.org/officeDocument/2006/relationships" xmlns:p="http://schemas.openxmlformats.org/presentationml/2006/main">
+  <p:tag name="OTLMARKERSHAPE" val="OTL"/>
+</p:tagLst>
+</file>
+
+<file path=ppt/tags/tag25.xml><?xml version="1.0" encoding="utf-8"?>
+<p:tagLst xmlns:a="http://schemas.openxmlformats.org/drawingml/2006/main" xmlns:r="http://schemas.openxmlformats.org/officeDocument/2006/relationships" xmlns:p="http://schemas.openxmlformats.org/presentationml/2006/main">
+  <p:tag name="OTLMARKERSHAPE" val="OTL"/>
+</p:tagLst>
+</file>
+
+<file path=ppt/tags/tag26.xml><?xml version="1.0" encoding="utf-8"?>
+<p:tagLst xmlns:a="http://schemas.openxmlformats.org/drawingml/2006/main" xmlns:r="http://schemas.openxmlformats.org/officeDocument/2006/relationships" xmlns:p="http://schemas.openxmlformats.org/presentationml/2006/main">
+  <p:tag name="OTLMARKERSHAPE" val="OTL"/>
+</p:tagLst>
+</file>
+
+<file path=ppt/tags/tag27.xml><?xml version="1.0" encoding="utf-8"?>
+<p:tagLst xmlns:a="http://schemas.openxmlformats.org/drawingml/2006/main" xmlns:r="http://schemas.openxmlformats.org/officeDocument/2006/relationships" xmlns:p="http://schemas.openxmlformats.org/presentationml/2006/main">
+  <p:tag name="OTLMARKERSHAPE" val="OTL"/>
+</p:tagLst>
+</file>
+
+<file path=ppt/tags/tag28.xml><?xml version="1.0" encoding="utf-8"?>
+<p:tagLst xmlns:a="http://schemas.openxmlformats.org/drawingml/2006/main" xmlns:r="http://schemas.openxmlformats.org/officeDocument/2006/relationships" xmlns:p="http://schemas.openxmlformats.org/presentationml/2006/main">
+  <p:tag name="OTLMARKERSHAPE" val="OTL"/>
+</p:tagLst>
+</file>
+
+<file path=ppt/tags/tag29.xml><?xml version="1.0" encoding="utf-8"?>
+<p:tagLst xmlns:a="http://schemas.openxmlformats.org/drawingml/2006/main" xmlns:r="http://schemas.openxmlformats.org/officeDocument/2006/relationships" xmlns:p="http://schemas.openxmlformats.org/presentationml/2006/main">
+  <p:tag name="OTLMARKERSHAPE" val="OTL"/>
+</p:tagLst>
+</file>
+
+<file path=ppt/tags/tag3.xml><?xml version="1.0" encoding="utf-8"?>
+<p:tagLst xmlns:a="http://schemas.openxmlformats.org/drawingml/2006/main" xmlns:r="http://schemas.openxmlformats.org/officeDocument/2006/relationships" xmlns:p="http://schemas.openxmlformats.org/presentationml/2006/main">
+  <p:tag name="OTLMARKERSHAPE" val="OTL"/>
+</p:tagLst>
+</file>
+
+<file path=ppt/tags/tag30.xml><?xml version="1.0" encoding="utf-8"?>
+<p:tagLst xmlns:a="http://schemas.openxmlformats.org/drawingml/2006/main" xmlns:r="http://schemas.openxmlformats.org/officeDocument/2006/relationships" xmlns:p="http://schemas.openxmlformats.org/presentationml/2006/main">
+  <p:tag name="OTLMARKERSHAPE" val="OTL"/>
+</p:tagLst>
+</file>
+
+<file path=ppt/tags/tag31.xml><?xml version="1.0" encoding="utf-8"?>
+<p:tagLst xmlns:a="http://schemas.openxmlformats.org/drawingml/2006/main" xmlns:r="http://schemas.openxmlformats.org/officeDocument/2006/relationships" xmlns:p="http://schemas.openxmlformats.org/presentationml/2006/main">
+  <p:tag name="OTLMARKERSHAPE" val="OTL"/>
+</p:tagLst>
+</file>
+
+<file path=ppt/tags/tag32.xml><?xml version="1.0" encoding="utf-8"?>
+<p:tagLst xmlns:a="http://schemas.openxmlformats.org/drawingml/2006/main" xmlns:r="http://schemas.openxmlformats.org/officeDocument/2006/relationships" xmlns:p="http://schemas.openxmlformats.org/presentationml/2006/main">
+  <p:tag name="OTLMARKERSHAPE" val="OTL"/>
+</p:tagLst>
+</file>
+
+<file path=ppt/tags/tag33.xml><?xml version="1.0" encoding="utf-8"?>
+<p:tagLst xmlns:a="http://schemas.openxmlformats.org/drawingml/2006/main" xmlns:r="http://schemas.openxmlformats.org/officeDocument/2006/relationships" xmlns:p="http://schemas.openxmlformats.org/presentationml/2006/main">
+  <p:tag name="OTLMARKERSHAPE" val="OTL"/>
+</p:tagLst>
+</file>
+
+<file path=ppt/tags/tag34.xml><?xml version="1.0" encoding="utf-8"?>
+<p:tagLst xmlns:a="http://schemas.openxmlformats.org/drawingml/2006/main" xmlns:r="http://schemas.openxmlformats.org/officeDocument/2006/relationships" xmlns:p="http://schemas.openxmlformats.org/presentationml/2006/main">
+  <p:tag name="OTLMARKERSHAPE" val="OTL"/>
+</p:tagLst>
+</file>
+
+<file path=ppt/tags/tag35.xml><?xml version="1.0" encoding="utf-8"?>
+<p:tagLst xmlns:a="http://schemas.openxmlformats.org/drawingml/2006/main" xmlns:r="http://schemas.openxmlformats.org/officeDocument/2006/relationships" xmlns:p="http://schemas.openxmlformats.org/presentationml/2006/main">
+  <p:tag name="OTLMARKERSHAPE" val="OTL"/>
+</p:tagLst>
+</file>
+
+<file path=ppt/tags/tag36.xml><?xml version="1.0" encoding="utf-8"?>
+<p:tagLst xmlns:a="http://schemas.openxmlformats.org/drawingml/2006/main" xmlns:r="http://schemas.openxmlformats.org/officeDocument/2006/relationships" xmlns:p="http://schemas.openxmlformats.org/presentationml/2006/main">
+  <p:tag name="OTLMARKERSHAPE" val="OTL"/>
+</p:tagLst>
+</file>
+
+<file path=ppt/tags/tag37.xml><?xml version="1.0" encoding="utf-8"?>
+<p:tagLst xmlns:a="http://schemas.openxmlformats.org/drawingml/2006/main" xmlns:r="http://schemas.openxmlformats.org/officeDocument/2006/relationships" xmlns:p="http://schemas.openxmlformats.org/presentationml/2006/main">
+  <p:tag name="OTLMARKERSHAPE" val="OTL"/>
+</p:tagLst>
+</file>
+
+<file path=ppt/tags/tag38.xml><?xml version="1.0" encoding="utf-8"?>
+<p:tagLst xmlns:a="http://schemas.openxmlformats.org/drawingml/2006/main" xmlns:r="http://schemas.openxmlformats.org/officeDocument/2006/relationships" xmlns:p="http://schemas.openxmlformats.org/presentationml/2006/main">
+  <p:tag name="OTLMARKERSHAPE" val="OTL"/>
+</p:tagLst>
+</file>
+
+<file path=ppt/tags/tag39.xml><?xml version="1.0" encoding="utf-8"?>
+<p:tagLst xmlns:a="http://schemas.openxmlformats.org/drawingml/2006/main" xmlns:r="http://schemas.openxmlformats.org/officeDocument/2006/relationships" xmlns:p="http://schemas.openxmlformats.org/presentationml/2006/main">
+  <p:tag name="OTLMARKERSHAPE" val="OTL"/>
+</p:tagLst>
+</file>
+
+<file path=ppt/tags/tag4.xml><?xml version="1.0" encoding="utf-8"?>
+<p:tagLst xmlns:a="http://schemas.openxmlformats.org/drawingml/2006/main" xmlns:r="http://schemas.openxmlformats.org/officeDocument/2006/relationships" xmlns:p="http://schemas.openxmlformats.org/presentationml/2006/main">
+  <p:tag name="OTLMARKERSHAPE" val="OTL"/>
+</p:tagLst>
+</file>
+
+<file path=ppt/tags/tag40.xml><?xml version="1.0" encoding="utf-8"?>
+<p:tagLst xmlns:a="http://schemas.openxmlformats.org/drawingml/2006/main" xmlns:r="http://schemas.openxmlformats.org/officeDocument/2006/relationships" xmlns:p="http://schemas.openxmlformats.org/presentationml/2006/main">
+  <p:tag name="OTLMARKERSHAPE" val="OTL"/>
+</p:tagLst>
+</file>
+
+<file path=ppt/tags/tag41.xml><?xml version="1.0" encoding="utf-8"?>
+<p:tagLst xmlns:a="http://schemas.openxmlformats.org/drawingml/2006/main" xmlns:r="http://schemas.openxmlformats.org/officeDocument/2006/relationships" xmlns:p="http://schemas.openxmlformats.org/presentationml/2006/main">
+  <p:tag name="OTLMARKERSHAPE" val="OTL"/>
+</p:tagLst>
+</file>
+
+<file path=ppt/tags/tag42.xml><?xml version="1.0" encoding="utf-8"?>
+<p:tagLst xmlns:a="http://schemas.openxmlformats.org/drawingml/2006/main" xmlns:r="http://schemas.openxmlformats.org/officeDocument/2006/relationships" xmlns:p="http://schemas.openxmlformats.org/presentationml/2006/main">
+  <p:tag name="OTLMARKERSHAPE" val="OTL"/>
+</p:tagLst>
+</file>
+
+<file path=ppt/tags/tag43.xml><?xml version="1.0" encoding="utf-8"?>
+<p:tagLst xmlns:a="http://schemas.openxmlformats.org/drawingml/2006/main" xmlns:r="http://schemas.openxmlformats.org/officeDocument/2006/relationships" xmlns:p="http://schemas.openxmlformats.org/presentationml/2006/main">
+  <p:tag name="OTLMARKERSHAPE" val="OTL"/>
+</p:tagLst>
+</file>
+
+<file path=ppt/tags/tag44.xml><?xml version="1.0" encoding="utf-8"?>
+<p:tagLst xmlns:a="http://schemas.openxmlformats.org/drawingml/2006/main" xmlns:r="http://schemas.openxmlformats.org/officeDocument/2006/relationships" xmlns:p="http://schemas.openxmlformats.org/presentationml/2006/main">
+  <p:tag name="OTLMARKERSHAPE" val="OTL"/>
+</p:tagLst>
+</file>
+
+<file path=ppt/tags/tag45.xml><?xml version="1.0" encoding="utf-8"?>
+<p:tagLst xmlns:a="http://schemas.openxmlformats.org/drawingml/2006/main" xmlns:r="http://schemas.openxmlformats.org/officeDocument/2006/relationships" xmlns:p="http://schemas.openxmlformats.org/presentationml/2006/main">
+  <p:tag name="OTLMARKERSHAPE" val="OTL"/>
+</p:tagLst>
+</file>
+
+<file path=ppt/tags/tag46.xml><?xml version="1.0" encoding="utf-8"?>
+<p:tagLst xmlns:a="http://schemas.openxmlformats.org/drawingml/2006/main" xmlns:r="http://schemas.openxmlformats.org/officeDocument/2006/relationships" xmlns:p="http://schemas.openxmlformats.org/presentationml/2006/main">
+  <p:tag name="OTLMARKERSHAPE" val="OTL"/>
+</p:tagLst>
+</file>
+
+<file path=ppt/tags/tag47.xml><?xml version="1.0" encoding="utf-8"?>
+<p:tagLst xmlns:a="http://schemas.openxmlformats.org/drawingml/2006/main" xmlns:r="http://schemas.openxmlformats.org/officeDocument/2006/relationships" xmlns:p="http://schemas.openxmlformats.org/presentationml/2006/main">
+  <p:tag name="OTLMARKERSHAPE" val="OTL"/>
+</p:tagLst>
+</file>
+
+<file path=ppt/tags/tag48.xml><?xml version="1.0" encoding="utf-8"?>
+<p:tagLst xmlns:a="http://schemas.openxmlformats.org/drawingml/2006/main" xmlns:r="http://schemas.openxmlformats.org/officeDocument/2006/relationships" xmlns:p="http://schemas.openxmlformats.org/presentationml/2006/main">
+  <p:tag name="OTLMARKERSHAPE" val="OTL"/>
+</p:tagLst>
+</file>
+
+<file path=ppt/tags/tag49.xml><?xml version="1.0" encoding="utf-8"?>
+<p:tagLst xmlns:a="http://schemas.openxmlformats.org/drawingml/2006/main" xmlns:r="http://schemas.openxmlformats.org/officeDocument/2006/relationships" xmlns:p="http://schemas.openxmlformats.org/presentationml/2006/main">
+  <p:tag name="OTLMARKERSHAPE" val="OTL"/>
+</p:tagLst>
+</file>
+
+<file path=ppt/tags/tag5.xml><?xml version="1.0" encoding="utf-8"?>
+<p:tagLst xmlns:a="http://schemas.openxmlformats.org/drawingml/2006/main" xmlns:r="http://schemas.openxmlformats.org/officeDocument/2006/relationships" xmlns:p="http://schemas.openxmlformats.org/presentationml/2006/main">
+  <p:tag name="OTLMARKERSHAPE" val="OTL"/>
+</p:tagLst>
+</file>
+
+<file path=ppt/tags/tag50.xml><?xml version="1.0" encoding="utf-8"?>
+<p:tagLst xmlns:a="http://schemas.openxmlformats.org/drawingml/2006/main" xmlns:r="http://schemas.openxmlformats.org/officeDocument/2006/relationships" xmlns:p="http://schemas.openxmlformats.org/presentationml/2006/main">
+  <p:tag name="OTLMARKERSHAPE" val="OTL"/>
+</p:tagLst>
+</file>
+
+<file path=ppt/tags/tag51.xml><?xml version="1.0" encoding="utf-8"?>
+<p:tagLst xmlns:a="http://schemas.openxmlformats.org/drawingml/2006/main" xmlns:r="http://schemas.openxmlformats.org/officeDocument/2006/relationships" xmlns:p="http://schemas.openxmlformats.org/presentationml/2006/main">
+  <p:tag name="OTLMARKERSHAPE" val="OTL"/>
+</p:tagLst>
+</file>
+
+<file path=ppt/tags/tag52.xml><?xml version="1.0" encoding="utf-8"?>
+<p:tagLst xmlns:a="http://schemas.openxmlformats.org/drawingml/2006/main" xmlns:r="http://schemas.openxmlformats.org/officeDocument/2006/relationships" xmlns:p="http://schemas.openxmlformats.org/presentationml/2006/main">
+  <p:tag name="OTLMARKERSHAPE" val="OTL"/>
+</p:tagLst>
+</file>
+
+<file path=ppt/tags/tag53.xml><?xml version="1.0" encoding="utf-8"?>
+<p:tagLst xmlns:a="http://schemas.openxmlformats.org/drawingml/2006/main" xmlns:r="http://schemas.openxmlformats.org/officeDocument/2006/relationships" xmlns:p="http://schemas.openxmlformats.org/presentationml/2006/main">
+  <p:tag name="OTLMARKERSHAPE" val="OTL"/>
+</p:tagLst>
+</file>
+
+<file path=ppt/tags/tag54.xml><?xml version="1.0" encoding="utf-8"?>
+<p:tagLst xmlns:a="http://schemas.openxmlformats.org/drawingml/2006/main" xmlns:r="http://schemas.openxmlformats.org/officeDocument/2006/relationships" xmlns:p="http://schemas.openxmlformats.org/presentationml/2006/main">
+  <p:tag name="OTLMARKERSHAPE" val="OTL"/>
+</p:tagLst>
+</file>
+
+<file path=ppt/tags/tag55.xml><?xml version="1.0" encoding="utf-8"?>
+<p:tagLst xmlns:a="http://schemas.openxmlformats.org/drawingml/2006/main" xmlns:r="http://schemas.openxmlformats.org/officeDocument/2006/relationships" xmlns:p="http://schemas.openxmlformats.org/presentationml/2006/main">
+  <p:tag name="OTLMARKERSHAPE" val="OTL"/>
+</p:tagLst>
+</file>
+
+<file path=ppt/tags/tag56.xml><?xml version="1.0" encoding="utf-8"?>
+<p:tagLst xmlns:a="http://schemas.openxmlformats.org/drawingml/2006/main" xmlns:r="http://schemas.openxmlformats.org/officeDocument/2006/relationships" xmlns:p="http://schemas.openxmlformats.org/presentationml/2006/main">
+  <p:tag name="OTLMARKERSHAPE" val="OTL"/>
+</p:tagLst>
+</file>
+
+<file path=ppt/tags/tag57.xml><?xml version="1.0" encoding="utf-8"?>
+<p:tagLst xmlns:a="http://schemas.openxmlformats.org/drawingml/2006/main" xmlns:r="http://schemas.openxmlformats.org/officeDocument/2006/relationships" xmlns:p="http://schemas.openxmlformats.org/presentationml/2006/main">
+  <p:tag name="OTLMARKERSHAPE" val="OTL"/>
+</p:tagLst>
+</file>
+
+<file path=ppt/tags/tag58.xml><?xml version="1.0" encoding="utf-8"?>
+<p:tagLst xmlns:a="http://schemas.openxmlformats.org/drawingml/2006/main" xmlns:r="http://schemas.openxmlformats.org/officeDocument/2006/relationships" xmlns:p="http://schemas.openxmlformats.org/presentationml/2006/main">
+  <p:tag name="OTLMARKERSHAPE" val="OTL"/>
+</p:tagLst>
+</file>
+
+<file path=ppt/tags/tag59.xml><?xml version="1.0" encoding="utf-8"?>
+<p:tagLst xmlns:a="http://schemas.openxmlformats.org/drawingml/2006/main" xmlns:r="http://schemas.openxmlformats.org/officeDocument/2006/relationships" xmlns:p="http://schemas.openxmlformats.org/presentationml/2006/main">
+  <p:tag name="OTLMARKERSHAPE" val="OTL"/>
+</p:tagLst>
+</file>
+
+<file path=ppt/tags/tag6.xml><?xml version="1.0" encoding="utf-8"?>
+<p:tagLst xmlns:a="http://schemas.openxmlformats.org/drawingml/2006/main" xmlns:r="http://schemas.openxmlformats.org/officeDocument/2006/relationships" xmlns:p="http://schemas.openxmlformats.org/presentationml/2006/main">
+  <p:tag name="OTLMARKERSHAPE" val="OTL"/>
+</p:tagLst>
+</file>
+
+<file path=ppt/tags/tag60.xml><?xml version="1.0" encoding="utf-8"?>
+<p:tagLst xmlns:a="http://schemas.openxmlformats.org/drawingml/2006/main" xmlns:r="http://schemas.openxmlformats.org/officeDocument/2006/relationships" xmlns:p="http://schemas.openxmlformats.org/presentationml/2006/main">
+  <p:tag name="OTLMARKERSHAPE" val="OTL"/>
+</p:tagLst>
+</file>
+
+<file path=ppt/tags/tag61.xml><?xml version="1.0" encoding="utf-8"?>
+<p:tagLst xmlns:a="http://schemas.openxmlformats.org/drawingml/2006/main" xmlns:r="http://schemas.openxmlformats.org/officeDocument/2006/relationships" xmlns:p="http://schemas.openxmlformats.org/presentationml/2006/main">
+  <p:tag name="OTLMARKERSHAPE" val="OTL"/>
+</p:tagLst>
+</file>
+
+<file path=ppt/tags/tag62.xml><?xml version="1.0" encoding="utf-8"?>
+<p:tagLst xmlns:a="http://schemas.openxmlformats.org/drawingml/2006/main" xmlns:r="http://schemas.openxmlformats.org/officeDocument/2006/relationships" xmlns:p="http://schemas.openxmlformats.org/presentationml/2006/main">
+  <p:tag name="OTLMARKERSHAPE" val="OTL"/>
+</p:tagLst>
+</file>
+
+<file path=ppt/tags/tag63.xml><?xml version="1.0" encoding="utf-8"?>
+<p:tagLst xmlns:a="http://schemas.openxmlformats.org/drawingml/2006/main" xmlns:r="http://schemas.openxmlformats.org/officeDocument/2006/relationships" xmlns:p="http://schemas.openxmlformats.org/presentationml/2006/main">
+  <p:tag name="OTLMARKERSHAPE" val="OTL"/>
+</p:tagLst>
+</file>
+
+<file path=ppt/tags/tag64.xml><?xml version="1.0" encoding="utf-8"?>
+<p:tagLst xmlns:a="http://schemas.openxmlformats.org/drawingml/2006/main" xmlns:r="http://schemas.openxmlformats.org/officeDocument/2006/relationships" xmlns:p="http://schemas.openxmlformats.org/presentationml/2006/main">
+  <p:tag name="OTLMARKERSHAPE" val="OTL"/>
+</p:tagLst>
+</file>
+
+<file path=ppt/tags/tag65.xml><?xml version="1.0" encoding="utf-8"?>
+<p:tagLst xmlns:a="http://schemas.openxmlformats.org/drawingml/2006/main" xmlns:r="http://schemas.openxmlformats.org/officeDocument/2006/relationships" xmlns:p="http://schemas.openxmlformats.org/presentationml/2006/main">
+  <p:tag name="OTLMARKERSHAPE" val="OTL"/>
+</p:tagLst>
+</file>
+
+<file path=ppt/tags/tag66.xml><?xml version="1.0" encoding="utf-8"?>
+<p:tagLst xmlns:a="http://schemas.openxmlformats.org/drawingml/2006/main" xmlns:r="http://schemas.openxmlformats.org/officeDocument/2006/relationships" xmlns:p="http://schemas.openxmlformats.org/presentationml/2006/main">
+  <p:tag name="OTLMARKERSHAPE" val="OTL"/>
+</p:tagLst>
+</file>
+
+<file path=ppt/tags/tag67.xml><?xml version="1.0" encoding="utf-8"?>
+<p:tagLst xmlns:a="http://schemas.openxmlformats.org/drawingml/2006/main" xmlns:r="http://schemas.openxmlformats.org/officeDocument/2006/relationships" xmlns:p="http://schemas.openxmlformats.org/presentationml/2006/main">
+  <p:tag name="OTLMARKERSHAPE" val="OTL"/>
+</p:tagLst>
+</file>
+
+<file path=ppt/tags/tag68.xml><?xml version="1.0" encoding="utf-8"?>
+<p:tagLst xmlns:a="http://schemas.openxmlformats.org/drawingml/2006/main" xmlns:r="http://schemas.openxmlformats.org/officeDocument/2006/relationships" xmlns:p="http://schemas.openxmlformats.org/presentationml/2006/main">
+  <p:tag name="OTLMARKERSHAPE" val="OTL"/>
+</p:tagLst>
+</file>
+
+<file path=ppt/tags/tag69.xml><?xml version="1.0" encoding="utf-8"?>
+<p:tagLst xmlns:a="http://schemas.openxmlformats.org/drawingml/2006/main" xmlns:r="http://schemas.openxmlformats.org/officeDocument/2006/relationships" xmlns:p="http://schemas.openxmlformats.org/presentationml/2006/main">
+  <p:tag name="OTLMARKERSHAPE" val="OTL"/>
+</p:tagLst>
+</file>
+
+<file path=ppt/tags/tag7.xml><?xml version="1.0" encoding="utf-8"?>
+<p:tagLst xmlns:a="http://schemas.openxmlformats.org/drawingml/2006/main" xmlns:r="http://schemas.openxmlformats.org/officeDocument/2006/relationships" xmlns:p="http://schemas.openxmlformats.org/presentationml/2006/main">
+  <p:tag name="OTLMARKERSHAPE" val="OTL"/>
+</p:tagLst>
+</file>
+
+<file path=ppt/tags/tag70.xml><?xml version="1.0" encoding="utf-8"?>
+<p:tagLst xmlns:a="http://schemas.openxmlformats.org/drawingml/2006/main" xmlns:r="http://schemas.openxmlformats.org/officeDocument/2006/relationships" xmlns:p="http://schemas.openxmlformats.org/presentationml/2006/main">
+  <p:tag name="OTLMARKERSHAPE" val="OTL"/>
+</p:tagLst>
+</file>
+
+<file path=ppt/tags/tag71.xml><?xml version="1.0" encoding="utf-8"?>
+<p:tagLst xmlns:a="http://schemas.openxmlformats.org/drawingml/2006/main" xmlns:r="http://schemas.openxmlformats.org/officeDocument/2006/relationships" xmlns:p="http://schemas.openxmlformats.org/presentationml/2006/main">
+  <p:tag name="OTLMARKERSHAPE" val="OTL"/>
+</p:tagLst>
+</file>
+
+<file path=ppt/tags/tag72.xml><?xml version="1.0" encoding="utf-8"?>
+<p:tagLst xmlns:a="http://schemas.openxmlformats.org/drawingml/2006/main" xmlns:r="http://schemas.openxmlformats.org/officeDocument/2006/relationships" xmlns:p="http://schemas.openxmlformats.org/presentationml/2006/main">
+  <p:tag name="OTLMARKERSHAPE" val="OTL"/>
+</p:tagLst>
+</file>
+
+<file path=ppt/tags/tag73.xml><?xml version="1.0" encoding="utf-8"?>
+<p:tagLst xmlns:a="http://schemas.openxmlformats.org/drawingml/2006/main" xmlns:r="http://schemas.openxmlformats.org/officeDocument/2006/relationships" xmlns:p="http://schemas.openxmlformats.org/presentationml/2006/main">
+  <p:tag name="OTLMARKERSHAPE" val="OTL"/>
+</p:tagLst>
+</file>
+
+<file path=ppt/tags/tag74.xml><?xml version="1.0" encoding="utf-8"?>
+<p:tagLst xmlns:a="http://schemas.openxmlformats.org/drawingml/2006/main" xmlns:r="http://schemas.openxmlformats.org/officeDocument/2006/relationships" xmlns:p="http://schemas.openxmlformats.org/presentationml/2006/main">
+  <p:tag name="OTLMARKERSHAPE" val="OTL"/>
+</p:tagLst>
+</file>
+
+<file path=ppt/tags/tag75.xml><?xml version="1.0" encoding="utf-8"?>
+<p:tagLst xmlns:a="http://schemas.openxmlformats.org/drawingml/2006/main" xmlns:r="http://schemas.openxmlformats.org/officeDocument/2006/relationships" xmlns:p="http://schemas.openxmlformats.org/presentationml/2006/main">
+  <p:tag name="OTLMARKERSHAPE" val="OTL"/>
+</p:tagLst>
+</file>
+
+<file path=ppt/tags/tag76.xml><?xml version="1.0" encoding="utf-8"?>
+<p:tagLst xmlns:a="http://schemas.openxmlformats.org/drawingml/2006/main" xmlns:r="http://schemas.openxmlformats.org/officeDocument/2006/relationships" xmlns:p="http://schemas.openxmlformats.org/presentationml/2006/main">
+  <p:tag name="OTLMARKERSHAPE" val="OTL"/>
+</p:tagLst>
+</file>
+
+<file path=ppt/tags/tag77.xml><?xml version="1.0" encoding="utf-8"?>
+<p:tagLst xmlns:a="http://schemas.openxmlformats.org/drawingml/2006/main" xmlns:r="http://schemas.openxmlformats.org/officeDocument/2006/relationships" xmlns:p="http://schemas.openxmlformats.org/presentationml/2006/main">
+  <p:tag name="OTLMARKERSHAPE" val="OTL"/>
+</p:tagLst>
+</file>
+
+<file path=ppt/tags/tag78.xml><?xml version="1.0" encoding="utf-8"?>
+<p:tagLst xmlns:a="http://schemas.openxmlformats.org/drawingml/2006/main" xmlns:r="http://schemas.openxmlformats.org/officeDocument/2006/relationships" xmlns:p="http://schemas.openxmlformats.org/presentationml/2006/main">
+  <p:tag name="OTLMARKERSHAPE" val="OTL"/>
+</p:tagLst>
+</file>
+
+<file path=ppt/tags/tag79.xml><?xml version="1.0" encoding="utf-8"?>
+<p:tagLst xmlns:a="http://schemas.openxmlformats.org/drawingml/2006/main" xmlns:r="http://schemas.openxmlformats.org/officeDocument/2006/relationships" xmlns:p="http://schemas.openxmlformats.org/presentationml/2006/main">
+  <p:tag name="OTLMARKERSHAPE" val="OTL"/>
+</p:tagLst>
+</file>
+
+<file path=ppt/tags/tag8.xml><?xml version="1.0" encoding="utf-8"?>
+<p:tagLst xmlns:a="http://schemas.openxmlformats.org/drawingml/2006/main" xmlns:r="http://schemas.openxmlformats.org/officeDocument/2006/relationships" xmlns:p="http://schemas.openxmlformats.org/presentationml/2006/main">
+  <p:tag name="OTLMARKERSHAPE" val="OTL"/>
+</p:tagLst>
+</file>
+
+<file path=ppt/tags/tag80.xml><?xml version="1.0" encoding="utf-8"?>
+<p:tagLst xmlns:a="http://schemas.openxmlformats.org/drawingml/2006/main" xmlns:r="http://schemas.openxmlformats.org/officeDocument/2006/relationships" xmlns:p="http://schemas.openxmlformats.org/presentationml/2006/main">
+  <p:tag name="OTLMARKERSHAPE" val="OTL"/>
+</p:tagLst>
+</file>
+
+<file path=ppt/tags/tag81.xml><?xml version="1.0" encoding="utf-8"?>
+<p:tagLst xmlns:a="http://schemas.openxmlformats.org/drawingml/2006/main" xmlns:r="http://schemas.openxmlformats.org/officeDocument/2006/relationships" xmlns:p="http://schemas.openxmlformats.org/presentationml/2006/main">
+  <p:tag name="OTLMARKERSHAPE" val="OTL"/>
+</p:tagLst>
+</file>
+
+<file path=ppt/tags/tag82.xml><?xml version="1.0" encoding="utf-8"?>
+<p:tagLst xmlns:a="http://schemas.openxmlformats.org/drawingml/2006/main" xmlns:r="http://schemas.openxmlformats.org/officeDocument/2006/relationships" xmlns:p="http://schemas.openxmlformats.org/presentationml/2006/main">
+  <p:tag name="OTLMARKERSHAPE" val="OTL"/>
+</p:tagLst>
+</file>
+
+<file path=ppt/tags/tag83.xml><?xml version="1.0" encoding="utf-8"?>
+<p:tagLst xmlns:a="http://schemas.openxmlformats.org/drawingml/2006/main" xmlns:r="http://schemas.openxmlformats.org/officeDocument/2006/relationships" xmlns:p="http://schemas.openxmlformats.org/presentationml/2006/main">
+  <p:tag name="OTLMARKERSHAPE" val="OTL"/>
+</p:tagLst>
+</file>
+
+<file path=ppt/tags/tag9.xml><?xml version="1.0" encoding="utf-8"?>
+<p:tagLst xmlns:a="http://schemas.openxmlformats.org/drawingml/2006/main" xmlns:r="http://schemas.openxmlformats.org/officeDocument/2006/relationships" xmlns:p="http://schemas.openxmlformats.org/presentationml/2006/main">
+  <p:tag name="OTLMARKERSHAPE" val="OTL"/>
+</p:tagLst>
 </file>
 
 <file path=ppt/theme/theme1.xml><?xml version="1.0" encoding="utf-8"?>

</xml_diff>

<commit_message>
hopefully the last update
</commit_message>
<xml_diff>
--- a/2nd_year_int.pptx
+++ b/2nd_year_int.pptx
@@ -1950,11 +1950,7 @@
             </a:r>
             <a:r>
               <a:rPr lang="en-US" altLang="zh-CN" baseline="0" dirty="0" smtClean="0"/>
-              <a:t> not specific </a:t>
-            </a:r>
-            <a:r>
-              <a:rPr lang="en-US" altLang="zh-CN" baseline="0" dirty="0" smtClean="0"/>
-              <a:t>evaluation</a:t>
+              <a:t> not specific evaluation</a:t>
             </a:r>
           </a:p>
           <a:p>
@@ -7200,29 +7196,20 @@
               <a:rPr lang="en-US" sz="2800" dirty="0" smtClean="0">
                 <a:latin typeface="Arial"/>
               </a:rPr>
-              <a:t>Case studies on </a:t>
+              <a:t>Case studies on H/W (</a:t>
+            </a:r>
+            <a:r>
+              <a:rPr lang="en-US" sz="2800" dirty="0" err="1" smtClean="0">
+                <a:latin typeface="Arial"/>
+              </a:rPr>
+              <a:t>SpiNNaker</a:t>
             </a:r>
             <a:r>
               <a:rPr lang="en-US" sz="2800" dirty="0" smtClean="0">
                 <a:latin typeface="Arial"/>
               </a:rPr>
-              <a:t>H/W (</a:t>
-            </a:r>
-            <a:r>
-              <a:rPr lang="en-US" sz="2800" dirty="0" err="1" smtClean="0">
-                <a:latin typeface="Arial"/>
-              </a:rPr>
-              <a:t>SpiNNaker</a:t>
-            </a:r>
-            <a:r>
-              <a:rPr lang="en-US" sz="2800" dirty="0" smtClean="0">
-                <a:latin typeface="Arial"/>
-              </a:rPr>
               <a:t>)</a:t>
             </a:r>
-            <a:endParaRPr lang="en-US" sz="2800" dirty="0" smtClean="0">
-              <a:latin typeface="Arial"/>
-            </a:endParaRPr>
           </a:p>
           <a:p>
             <a:pPr lvl="1"/>
@@ -7769,7 +7756,7 @@
       </p:grpSpPr>
       <p:pic>
         <p:nvPicPr>
-          <p:cNvPr id="3076" name="Picture 4"/>
+          <p:cNvPr id="1026" name="Picture 2"/>
           <p:cNvPicPr>
             <a:picLocks noChangeAspect="1" noChangeArrowheads="1"/>
           </p:cNvPicPr>
@@ -7790,8 +7777,8 @@
         </p:blipFill>
         <p:spPr bwMode="auto">
           <a:xfrm>
-            <a:off x="1636450" y="4602633"/>
-            <a:ext cx="7184022" cy="2066727"/>
+            <a:off x="1569056" y="4612884"/>
+            <a:ext cx="7264860" cy="1966477"/>
           </a:xfrm>
           <a:prstGeom prst="rect">
             <a:avLst/>
@@ -8215,8 +8202,8 @@
         </p:nvSpPr>
         <p:spPr>
           <a:xfrm>
-            <a:off x="4788024" y="6237312"/>
-            <a:ext cx="1008112" cy="216024"/>
+            <a:off x="4716016" y="6165303"/>
+            <a:ext cx="1152128" cy="340295"/>
           </a:xfrm>
           <a:prstGeom prst="rect">
             <a:avLst/>
@@ -15094,23 +15081,8 @@
                 </a:solidFill>
                 <a:latin typeface="Arial"/>
               </a:rPr>
-              <a:t> Among </a:t>
-            </a:r>
-            <a:r>
-              <a:rPr lang="en-GB" sz="2400" dirty="0" smtClean="0">
-                <a:solidFill>
-                  <a:srgbClr val="000000"/>
-                </a:solidFill>
-                <a:latin typeface="Arial"/>
-              </a:rPr>
-              <a:t>SNNs</a:t>
-            </a:r>
-            <a:endParaRPr lang="en-GB" sz="2400" dirty="0" smtClean="0">
-              <a:solidFill>
-                <a:srgbClr val="000000"/>
-              </a:solidFill>
-              <a:latin typeface="Arial"/>
-            </a:endParaRPr>
+              <a:t> Among SNNs</a:t>
+            </a:r>
           </a:p>
           <a:p>
             <a:pPr lvl="1"/>

</xml_diff>